<commit_message>
Added VLFFT to repository Made tentative updates for Israel Training
</commit_message>
<xml_diff>
--- a/slides/Intro to Hyperlink.pptx
+++ b/slides/Intro to Hyperlink.pptx
@@ -298,7 +298,7 @@
               <a:pPr>
                 <a:defRPr/>
               </a:pPr>
-              <a:t>1/25/2012</a:t>
+              <a:t>3/6/2012</a:t>
             </a:fld>
             <a:endParaRPr lang="en-US" dirty="0"/>
           </a:p>
@@ -1693,6 +1693,13 @@
   <p:clrMapOvr>
     <a:masterClrMapping/>
   </p:clrMapOvr>
+  <p:timing>
+    <p:tnLst>
+      <p:par>
+        <p:cTn id="1" dur="indefinite" restart="never" nodeType="tmRoot"/>
+      </p:par>
+    </p:tnLst>
+  </p:timing>
 </p:sldLayout>
 </file>
 
@@ -2103,8 +2110,8 @@
         </p:nvSpPr>
         <p:spPr>
           <a:xfrm>
-            <a:off x="7930120" y="6498264"/>
-            <a:ext cx="856260" cy="276999"/>
+            <a:off x="7419752" y="6498264"/>
+            <a:ext cx="1357103" cy="276999"/>
           </a:xfrm>
           <a:prstGeom prst="rect">
             <a:avLst/>
@@ -2128,6 +2135,26 @@
               </a:spcAft>
               <a:defRPr/>
             </a:pPr>
+            <a:r>
+              <a:rPr lang="en-US" sz="1200" b="1" dirty="0" smtClean="0">
+                <a:ln w="10541" cmpd="sng">
+                  <a:solidFill>
+                    <a:srgbClr val="7D7D7D">
+                      <a:tint val="100000"/>
+                      <a:shade val="100000"/>
+                      <a:satMod val="110000"/>
+                    </a:srgbClr>
+                  </a:solidFill>
+                  <a:prstDash val="solid"/>
+                </a:ln>
+                <a:solidFill>
+                  <a:srgbClr val="000000"/>
+                </a:solidFill>
+                <a:latin typeface="Calibri"/>
+                <a:cs typeface="Arial" charset="0"/>
+              </a:rPr>
+              <a:t>Multicore </a:t>
+            </a:r>
             <a:r>
               <a:rPr lang="en-US" sz="1200" b="1" dirty="0">
                 <a:ln w="10541" cmpd="sng">
@@ -2146,7 +2173,7 @@
                 <a:latin typeface="Calibri"/>
                 <a:cs typeface="Arial" charset="0"/>
               </a:rPr>
-              <a:t>CI Training</a:t>
+              <a:t>Training</a:t>
             </a:r>
           </a:p>
         </p:txBody>
@@ -12824,19 +12851,7 @@
               <a:rPr lang="en-US" sz="4400" dirty="0" smtClean="0">
                 <a:latin typeface="+mj-lt"/>
               </a:rPr>
-              <a:t>Remote/Rx </a:t>
-            </a:r>
-            <a:r>
-              <a:rPr lang="en-US" sz="4400" dirty="0" smtClean="0">
-                <a:latin typeface="+mj-lt"/>
-              </a:rPr>
-              <a:t>Side</a:t>
-            </a:r>
-            <a:r>
-              <a:rPr lang="en-US" sz="4400" dirty="0" smtClean="0">
-                <a:latin typeface="+mj-lt"/>
-              </a:rPr>
-              <a:t>: Example </a:t>
+              <a:t>Remote/Rx Side: Example </a:t>
             </a:r>
             <a:endParaRPr lang="en-US" sz="4400" dirty="0">
               <a:latin typeface="+mj-lt"/>
@@ -16979,19 +16994,7 @@
               <a:rPr lang="en-US" dirty="0" smtClean="0">
                 <a:latin typeface="+mj-lt"/>
               </a:rPr>
-              <a:t>8 segments, each segment of size </a:t>
-            </a:r>
-            <a:r>
-              <a:rPr lang="en-US" dirty="0" smtClean="0">
-                <a:latin typeface="+mj-lt"/>
-              </a:rPr>
-              <a:t>0x0100_0000 </a:t>
-            </a:r>
-            <a:r>
-              <a:rPr lang="en-US" dirty="0" smtClean="0">
-                <a:latin typeface="+mj-lt"/>
-              </a:rPr>
-              <a:t>(16M)</a:t>
+              <a:t>8 segments, each segment of size 0x0100_0000 (16M)</a:t>
             </a:r>
           </a:p>
           <a:p>
@@ -17005,53 +17008,8 @@
               <a:rPr lang="en-US" dirty="0" smtClean="0">
                 <a:latin typeface="+mj-lt"/>
               </a:rPr>
-              <a:t>Addresses start at </a:t>
-            </a:r>
-            <a:r>
-              <a:rPr lang="en-US" dirty="0" smtClean="0">
-                <a:latin typeface="+mj-lt"/>
-              </a:rPr>
-              <a:t>0x8000_0000</a:t>
-            </a:r>
-            <a:r>
-              <a:rPr lang="en-US" dirty="0" smtClean="0">
-                <a:latin typeface="+mj-lt"/>
-              </a:rPr>
-              <a:t>, </a:t>
-            </a:r>
-            <a:r>
-              <a:rPr lang="en-US" dirty="0" smtClean="0">
-                <a:latin typeface="+mj-lt"/>
-              </a:rPr>
-              <a:t>0x8200_0000</a:t>
-            </a:r>
-            <a:r>
-              <a:rPr lang="en-US" dirty="0" smtClean="0">
-                <a:latin typeface="+mj-lt"/>
-              </a:rPr>
-              <a:t>, </a:t>
-            </a:r>
-            <a:r>
-              <a:rPr lang="en-US" dirty="0" smtClean="0">
-                <a:latin typeface="+mj-lt"/>
-              </a:rPr>
-              <a:t>0x8400_0000</a:t>
-            </a:r>
-            <a:r>
-              <a:rPr lang="en-US" dirty="0" smtClean="0">
-                <a:latin typeface="+mj-lt"/>
-              </a:rPr>
-              <a:t>, to </a:t>
-            </a:r>
-            <a:r>
-              <a:rPr lang="en-US" dirty="0" smtClean="0">
-                <a:latin typeface="+mj-lt"/>
-              </a:rPr>
-              <a:t>0x8E00_0000</a:t>
-            </a:r>
-            <a:endParaRPr lang="en-US" dirty="0" smtClean="0">
-              <a:latin typeface="+mj-lt"/>
-            </a:endParaRPr>
+              <a:t>Addresses start at 0x8000_0000, 0x8200_0000, 0x8400_0000, to 0x8E00_0000</a:t>
+            </a:r>
           </a:p>
           <a:p>
             <a:pPr marL="342900" indent="-342900">
@@ -17064,35 +17022,14 @@
               <a:rPr lang="en-US" dirty="0" err="1" smtClean="0">
                 <a:latin typeface="+mj-lt"/>
               </a:rPr>
-              <a:t>t</a:t>
-            </a:r>
-            <a:r>
-              <a:rPr lang="en-US" dirty="0" err="1" smtClean="0">
-                <a:latin typeface="+mj-lt"/>
-              </a:rPr>
-              <a:t>xigmask</a:t>
+              <a:t>txigmask</a:t>
             </a:r>
             <a:r>
               <a:rPr lang="en-US" dirty="0" smtClean="0">
                 <a:latin typeface="+mj-lt"/>
               </a:rPr>
-              <a:t> </a:t>
-            </a:r>
-            <a:r>
-              <a:rPr lang="en-US" dirty="0" smtClean="0">
-                <a:latin typeface="+mj-lt"/>
-              </a:rPr>
-              <a:t>= 7 mask </a:t>
-            </a:r>
-            <a:r>
-              <a:rPr lang="en-US" dirty="0" smtClean="0">
-                <a:latin typeface="+mj-lt"/>
-              </a:rPr>
-              <a:t>0x00FF_FFFF</a:t>
-            </a:r>
-            <a:endParaRPr lang="en-US" dirty="0" smtClean="0">
-              <a:latin typeface="+mj-lt"/>
-            </a:endParaRPr>
+              <a:t> = 7 mask 0x00FF_FFFF</a:t>
+            </a:r>
           </a:p>
           <a:p>
             <a:pPr marL="342900" indent="-342900">
@@ -17105,35 +17042,14 @@
               <a:rPr lang="en-US" dirty="0" err="1" smtClean="0">
                 <a:latin typeface="+mj-lt"/>
               </a:rPr>
-              <a:t>r</a:t>
-            </a:r>
-            <a:r>
-              <a:rPr lang="en-US" dirty="0" err="1" smtClean="0">
-                <a:latin typeface="+mj-lt"/>
-              </a:rPr>
-              <a:t>xsegsel</a:t>
+              <a:t>rxsegsel</a:t>
             </a:r>
             <a:r>
               <a:rPr lang="en-US" dirty="0" smtClean="0">
                 <a:latin typeface="+mj-lt"/>
               </a:rPr>
-              <a:t> </a:t>
-            </a:r>
-            <a:r>
-              <a:rPr lang="en-US" dirty="0" smtClean="0">
-                <a:latin typeface="+mj-lt"/>
-              </a:rPr>
-              <a:t>= 8 mask </a:t>
-            </a:r>
-            <a:r>
-              <a:rPr lang="en-US" dirty="0" smtClean="0">
-                <a:latin typeface="+mj-lt"/>
-              </a:rPr>
-              <a:t>0x00FF_FFFF</a:t>
-            </a:r>
-            <a:endParaRPr lang="en-US" dirty="0" smtClean="0">
-              <a:latin typeface="+mj-lt"/>
-            </a:endParaRPr>
+              <a:t> = 8 mask 0x00FF_FFFF</a:t>
+            </a:r>
           </a:p>
           <a:p>
             <a:pPr marL="342900" indent="-342900">
@@ -17146,17 +17062,8 @@
               <a:rPr lang="en-US" dirty="0" smtClean="0">
                 <a:latin typeface="+mj-lt"/>
               </a:rPr>
-              <a:t>24 bits offset – </a:t>
-            </a:r>
-            <a:r>
-              <a:rPr lang="en-US" dirty="0" smtClean="0">
-                <a:latin typeface="+mj-lt"/>
-              </a:rPr>
-              <a:t>0x067_89a0</a:t>
-            </a:r>
-            <a:endParaRPr lang="en-US" dirty="0" smtClean="0">
-              <a:latin typeface="+mj-lt"/>
-            </a:endParaRPr>
+              <a:t>24 bits offset – 0x067_89a0</a:t>
+            </a:r>
           </a:p>
           <a:p>
             <a:pPr marL="342900" indent="-342900">
@@ -17189,19 +17096,7 @@
               <a:rPr lang="en-US" dirty="0" smtClean="0">
                 <a:latin typeface="+mj-lt"/>
               </a:rPr>
-              <a:t>Row 5	</a:t>
-            </a:r>
-            <a:r>
-              <a:rPr lang="en-US" dirty="0" smtClean="0">
-                <a:latin typeface="+mj-lt"/>
-              </a:rPr>
-              <a:t>0x8A00_0000</a:t>
-            </a:r>
-            <a:r>
-              <a:rPr lang="en-US" dirty="0" smtClean="0">
-                <a:latin typeface="+mj-lt"/>
-              </a:rPr>
-              <a:t>	Size 23</a:t>
+              <a:t>Row 5	0x8A00_0000	Size 23</a:t>
             </a:r>
             <a:br>
               <a:rPr lang="en-US" dirty="0" smtClean="0">
@@ -17221,41 +17116,8 @@
               <a:rPr lang="en-US" dirty="0" smtClean="0">
                 <a:latin typeface="+mj-lt"/>
               </a:rPr>
-              <a:t>On the receive side, the address is </a:t>
-            </a:r>
-            <a:r>
-              <a:rPr lang="en-US" dirty="0" smtClean="0">
-                <a:latin typeface="+mj-lt"/>
-              </a:rPr>
-              <a:t>0x8A00_0000 </a:t>
-            </a:r>
-            <a:r>
-              <a:rPr lang="en-US" dirty="0" smtClean="0">
-                <a:latin typeface="+mj-lt"/>
-              </a:rPr>
-              <a:t>+ </a:t>
-            </a:r>
-            <a:r>
-              <a:rPr lang="en-US" dirty="0" smtClean="0">
-                <a:latin typeface="+mj-lt"/>
-              </a:rPr>
-              <a:t>0x0067_89A0 </a:t>
-            </a:r>
-            <a:r>
-              <a:rPr lang="en-US" dirty="0" smtClean="0">
-                <a:latin typeface="+mj-lt"/>
-              </a:rPr>
-              <a:t>= </a:t>
-            </a:r>
-            <a:r>
-              <a:rPr lang="en-US" dirty="0" smtClean="0">
-                <a:latin typeface="+mj-lt"/>
-              </a:rPr>
-              <a:t>0x8A67_89A0</a:t>
-            </a:r>
-            <a:endParaRPr lang="en-US" dirty="0" smtClean="0">
-              <a:latin typeface="+mj-lt"/>
-            </a:endParaRPr>
+              <a:t>On the receive side, the address is 0x8A00_0000 + 0x0067_89A0 = 0x8A67_89A0</a:t>
+            </a:r>
           </a:p>
         </p:txBody>
       </p:sp>
@@ -17784,19 +17646,7 @@
               <a:rPr lang="en-US" dirty="0" smtClean="0">
                 <a:latin typeface="+mj-lt"/>
               </a:rPr>
-              <a:t>8 segments, 7 each of size </a:t>
-            </a:r>
-            <a:r>
-              <a:rPr lang="en-US" dirty="0" smtClean="0">
-                <a:latin typeface="+mj-lt"/>
-              </a:rPr>
-              <a:t>0x0100_0000 </a:t>
-            </a:r>
-            <a:r>
-              <a:rPr lang="en-US" dirty="0" smtClean="0">
-                <a:latin typeface="+mj-lt"/>
-              </a:rPr>
-              <a:t>(16M)</a:t>
+              <a:t>8 segments, 7 each of size 0x0100_0000 (16M)</a:t>
             </a:r>
           </a:p>
           <a:p>
@@ -17810,55 +17660,7 @@
               <a:rPr lang="en-US" dirty="0" smtClean="0">
                 <a:latin typeface="+mj-lt"/>
               </a:rPr>
-              <a:t>Addresses start at </a:t>
-            </a:r>
-            <a:r>
-              <a:rPr lang="en-US" dirty="0" smtClean="0">
-                <a:latin typeface="+mj-lt"/>
-              </a:rPr>
-              <a:t>0x8000_0000</a:t>
-            </a:r>
-            <a:r>
-              <a:rPr lang="en-US" dirty="0" smtClean="0">
-                <a:latin typeface="+mj-lt"/>
-              </a:rPr>
-              <a:t>, </a:t>
-            </a:r>
-            <a:r>
-              <a:rPr lang="en-US" dirty="0" smtClean="0">
-                <a:latin typeface="+mj-lt"/>
-              </a:rPr>
-              <a:t>0x8100_0000</a:t>
-            </a:r>
-            <a:r>
-              <a:rPr lang="en-US" dirty="0" smtClean="0">
-                <a:latin typeface="+mj-lt"/>
-              </a:rPr>
-              <a:t>, </a:t>
-            </a:r>
-            <a:r>
-              <a:rPr lang="en-US" dirty="0" smtClean="0">
-                <a:latin typeface="+mj-lt"/>
-              </a:rPr>
-              <a:t>0x8200_0000</a:t>
-            </a:r>
-            <a:r>
-              <a:rPr lang="en-US" dirty="0" smtClean="0">
-                <a:latin typeface="+mj-lt"/>
-              </a:rPr>
-              <a:t>, to </a:t>
-            </a:r>
-            <a:r>
-              <a:rPr lang="en-US" dirty="0" smtClean="0">
-                <a:latin typeface="+mj-lt"/>
-              </a:rPr>
-              <a:t>0x8600_0000</a:t>
-            </a:r>
-            <a:r>
-              <a:rPr lang="en-US" dirty="0" smtClean="0">
-                <a:latin typeface="+mj-lt"/>
-              </a:rPr>
-              <a:t>.</a:t>
+              <a:t>Addresses start at 0x8000_0000, 0x8100_0000, 0x8200_0000, to 0x8600_0000.</a:t>
             </a:r>
           </a:p>
           <a:p>
@@ -17878,25 +17680,7 @@
               <a:rPr lang="en-US" dirty="0" smtClean="0">
                 <a:latin typeface="+mj-lt"/>
               </a:rPr>
-              <a:t> = 8 mask </a:t>
-            </a:r>
-            <a:r>
-              <a:rPr lang="en-US" dirty="0" smtClean="0">
-                <a:latin typeface="+mj-lt"/>
-              </a:rPr>
-              <a:t>0x01FF_FFFF  </a:t>
-            </a:r>
-            <a:r>
-              <a:rPr lang="en-US" dirty="0" smtClean="0">
-                <a:latin typeface="+mj-lt"/>
-              </a:rPr>
-              <a:t>Rxsegsel = 9 mask </a:t>
-            </a:r>
-            <a:r>
-              <a:rPr lang="en-US" dirty="0" smtClean="0">
-                <a:latin typeface="+mj-lt"/>
-              </a:rPr>
-              <a:t>0x01FF_FFFF</a:t>
+              <a:t> = 8 mask 0x01FF_FFFF  Rxsegsel = 9 mask 0x01FF_FFFF</a:t>
             </a:r>
             <a:endParaRPr lang="en-US" dirty="0">
               <a:latin typeface="+mj-lt"/>
@@ -17978,13 +17762,7 @@
               <a:rPr lang="en-US" dirty="0" smtClean="0">
                 <a:latin typeface="+mj-lt"/>
               </a:rPr>
-              <a:t>s</a:t>
-            </a:r>
-            <a:r>
-              <a:rPr lang="en-US" dirty="0" smtClean="0">
-                <a:latin typeface="+mj-lt"/>
-              </a:rPr>
-              <a:t>egment </a:t>
+              <a:t>segment </a:t>
             </a:r>
             <a:r>
               <a:rPr lang="en-US" dirty="0">
@@ -18013,19 +17791,7 @@
               <a:rPr lang="en-US" dirty="0" smtClean="0">
                 <a:latin typeface="+mj-lt"/>
               </a:rPr>
-              <a:t>Row 2	</a:t>
-            </a:r>
-            <a:r>
-              <a:rPr lang="en-US" dirty="0" smtClean="0">
-                <a:latin typeface="+mj-lt"/>
-              </a:rPr>
-              <a:t>0x8200_0000</a:t>
-            </a:r>
-            <a:r>
-              <a:rPr lang="en-US" dirty="0" smtClean="0">
-                <a:latin typeface="+mj-lt"/>
-              </a:rPr>
-              <a:t>	Size 23</a:t>
+              <a:t>Row 2	0x8200_0000	Size 23</a:t>
             </a:r>
           </a:p>
           <a:p>
@@ -18046,41 +17812,8 @@
               <a:rPr lang="en-US" dirty="0" smtClean="0">
                 <a:latin typeface="+mj-lt"/>
               </a:rPr>
-              <a:t>On the receive side, the address is </a:t>
-            </a:r>
-            <a:r>
-              <a:rPr lang="en-US" dirty="0" smtClean="0">
-                <a:latin typeface="+mj-lt"/>
-              </a:rPr>
-              <a:t>0x8200_0000 </a:t>
-            </a:r>
-            <a:r>
-              <a:rPr lang="en-US" dirty="0" smtClean="0">
-                <a:latin typeface="+mj-lt"/>
-              </a:rPr>
-              <a:t>+ </a:t>
-            </a:r>
-            <a:r>
-              <a:rPr lang="en-US" dirty="0" smtClean="0">
-                <a:latin typeface="+mj-lt"/>
-              </a:rPr>
-              <a:t>0x0067_89A0 </a:t>
-            </a:r>
-            <a:r>
-              <a:rPr lang="en-US" dirty="0" smtClean="0">
-                <a:latin typeface="+mj-lt"/>
-              </a:rPr>
-              <a:t>= </a:t>
-            </a:r>
-            <a:r>
-              <a:rPr lang="en-US" dirty="0" smtClean="0">
-                <a:latin typeface="+mj-lt"/>
-              </a:rPr>
-              <a:t>0x8267_89A0 </a:t>
-            </a:r>
-            <a:endParaRPr lang="en-US" dirty="0" smtClean="0">
-              <a:latin typeface="+mj-lt"/>
-            </a:endParaRPr>
+              <a:t>On the receive side, the address is 0x8200_0000 + 0x0067_89A0 = 0x8267_89A0 </a:t>
+            </a:r>
           </a:p>
         </p:txBody>
       </p:sp>
@@ -44368,43 +44101,7 @@
               <a:rPr lang="en-US" dirty="0" smtClean="0">
                 <a:latin typeface="+mj-lt"/>
               </a:rPr>
-              <a:t>Addresses start at </a:t>
-            </a:r>
-            <a:r>
-              <a:rPr lang="en-US" dirty="0" smtClean="0">
-                <a:latin typeface="+mj-lt"/>
-              </a:rPr>
-              <a:t>0x8000_0000</a:t>
-            </a:r>
-            <a:r>
-              <a:rPr lang="en-US" dirty="0" smtClean="0">
-                <a:latin typeface="+mj-lt"/>
-              </a:rPr>
-              <a:t>, </a:t>
-            </a:r>
-            <a:r>
-              <a:rPr lang="en-US" dirty="0" smtClean="0">
-                <a:latin typeface="+mj-lt"/>
-              </a:rPr>
-              <a:t>0x8080_0000</a:t>
-            </a:r>
-            <a:r>
-              <a:rPr lang="en-US" dirty="0" smtClean="0">
-                <a:latin typeface="+mj-lt"/>
-              </a:rPr>
-              <a:t>, </a:t>
-            </a:r>
-            <a:r>
-              <a:rPr lang="en-US" dirty="0" smtClean="0">
-                <a:latin typeface="+mj-lt"/>
-              </a:rPr>
-              <a:t>0x8100_0000</a:t>
-            </a:r>
-            <a:r>
-              <a:rPr lang="en-US" dirty="0" smtClean="0">
-                <a:latin typeface="+mj-lt"/>
-              </a:rPr>
-              <a:t>, etc.</a:t>
+              <a:t>Addresses start at 0x8000_0000, 0x8080_0000, 0x8100_0000, etc.</a:t>
             </a:r>
           </a:p>
           <a:p>
@@ -44452,17 +44149,8 @@
               <a:rPr lang="en-US" dirty="0" smtClean="0">
                 <a:latin typeface="+mj-lt"/>
               </a:rPr>
-              <a:t> = 5 mask </a:t>
-            </a:r>
-            <a:r>
-              <a:rPr lang="en-US" dirty="0" smtClean="0">
-                <a:latin typeface="+mj-lt"/>
-              </a:rPr>
-              <a:t>0x003F_FFFF</a:t>
-            </a:r>
-            <a:endParaRPr lang="en-US" dirty="0" smtClean="0">
-              <a:latin typeface="+mj-lt"/>
-            </a:endParaRPr>
+              <a:t> = 5 mask 0x003F_FFFF</a:t>
+            </a:r>
           </a:p>
           <a:p>
             <a:pPr marL="342900" indent="-342900">
@@ -44481,13 +44169,7 @@
               <a:rPr lang="en-US" dirty="0" smtClean="0">
                 <a:latin typeface="+mj-lt"/>
               </a:rPr>
-              <a:t> = 6 mask </a:t>
-            </a:r>
-            <a:r>
-              <a:rPr lang="en-US" dirty="0" smtClean="0">
-                <a:latin typeface="+mj-lt"/>
-              </a:rPr>
-              <a:t>0x003F_FFFF</a:t>
+              <a:t> = 6 mask 0x003F_FFFF</a:t>
             </a:r>
             <a:endParaRPr lang="en-US" dirty="0">
               <a:latin typeface="+mj-lt"/>
@@ -44518,9 +44200,6 @@
               </a:rPr>
               <a:t>0x0027_89A0 </a:t>
             </a:r>
-            <a:endParaRPr lang="en-US" dirty="0" smtClean="0">
-              <a:latin typeface="+mj-lt"/>
-            </a:endParaRPr>
           </a:p>
           <a:p>
             <a:pPr marL="342900" indent="-342900">
@@ -44554,19 +44233,7 @@
               <a:rPr lang="en-US" dirty="0" smtClean="0">
                 <a:latin typeface="+mj-lt"/>
               </a:rPr>
-              <a:t>Row 21	</a:t>
-            </a:r>
-            <a:r>
-              <a:rPr lang="en-US" dirty="0" smtClean="0">
-                <a:latin typeface="+mj-lt"/>
-              </a:rPr>
-              <a:t>0x8A80_0000</a:t>
-            </a:r>
-            <a:r>
-              <a:rPr lang="en-US" dirty="0" smtClean="0">
-                <a:latin typeface="+mj-lt"/>
-              </a:rPr>
-              <a:t>	Size 21</a:t>
+              <a:t>Row 21	0x8A80_0000	Size 21</a:t>
             </a:r>
           </a:p>
           <a:p>
@@ -44580,13 +44247,7 @@
               <a:rPr lang="en-US" dirty="0" smtClean="0">
                 <a:latin typeface="+mj-lt"/>
               </a:rPr>
-              <a:t>On the receive side, the address is </a:t>
-            </a:r>
-            <a:r>
-              <a:rPr lang="en-US" dirty="0" smtClean="0">
-                <a:latin typeface="+mj-lt"/>
-              </a:rPr>
-              <a:t>0x8a80_0000 </a:t>
+              <a:t>On the receive side, the address is 0x8a80_0000 </a:t>
             </a:r>
             <a:r>
               <a:rPr lang="en-US" dirty="0">
@@ -44926,37 +44587,7 @@
               <a:rPr lang="en-US" sz="1900" i="1" dirty="0" smtClean="0">
                 <a:latin typeface="+mj-lt"/>
               </a:rPr>
-              <a:t>Enabling </a:t>
-            </a:r>
-            <a:r>
-              <a:rPr lang="en-US" sz="1900" i="1" dirty="0" smtClean="0">
-                <a:latin typeface="+mj-lt"/>
-              </a:rPr>
-              <a:t>power to peripherals </a:t>
-            </a:r>
-            <a:r>
-              <a:rPr lang="en-US" sz="1900" i="1" dirty="0" smtClean="0">
-                <a:latin typeface="+mj-lt"/>
-              </a:rPr>
-              <a:t>involves </a:t>
-            </a:r>
-            <a:r>
-              <a:rPr lang="en-US" sz="1900" i="1" dirty="0" smtClean="0">
-                <a:latin typeface="+mj-lt"/>
-              </a:rPr>
-              <a:t>the following </a:t>
-            </a:r>
-            <a:r>
-              <a:rPr lang="en-US" sz="1900" i="1" dirty="0" smtClean="0">
-                <a:latin typeface="+mj-lt"/>
-              </a:rPr>
-              <a:t>four functions</a:t>
-            </a:r>
-            <a:r>
-              <a:rPr lang="en-US" sz="1900" i="1" dirty="0" smtClean="0">
-                <a:latin typeface="+mj-lt"/>
-              </a:rPr>
-              <a:t>:</a:t>
+              <a:t>Enabling power to peripherals involves the following four functions:</a:t>
             </a:r>
           </a:p>
           <a:p>
@@ -45523,7 +45154,7 @@
             </a:r>
             <a:r>
               <a:rPr lang="en-US" sz="1400" dirty="0" smtClean="0">
-                <a:hlinkClick r:id="rId5" action="ppaction://hlinkfile"/>
+                <a:hlinkClick r:id="rId3" action="ppaction://hlinkfile"/>
               </a:rPr>
               <a:t>Hyplnk_close</a:t>
             </a:r>
@@ -45576,7 +45207,7 @@
             </a:r>
             <a:r>
               <a:rPr lang="en-US" sz="1400" dirty="0" smtClean="0">
-                <a:hlinkClick r:id="rId6" action="ppaction://hlinkfile"/>
+                <a:hlinkClick r:id="rId3" action="ppaction://hlinkfile"/>
               </a:rPr>
               <a:t>Hyplnk_readRegs</a:t>
             </a:r>
@@ -45596,7 +45227,7 @@
             </a:r>
             <a:r>
               <a:rPr lang="en-US" sz="1400" dirty="0" smtClean="0">
-                <a:hlinkClick r:id="rId7" action="ppaction://hlinkfile"/>
+                <a:hlinkClick r:id="rId5" action="ppaction://hlinkfile"/>
               </a:rPr>
               <a:t>hyplnkLocation_e</a:t>
             </a:r>
@@ -45606,7 +45237,7 @@
             </a:r>
             <a:r>
               <a:rPr lang="en-US" sz="1400" dirty="0" smtClean="0">
-                <a:hlinkClick r:id="rId8" action="ppaction://hlinkfile"/>
+                <a:hlinkClick r:id="rId6" action="ppaction://hlinkfile"/>
               </a:rPr>
               <a:t>hyplnkRegisters_t</a:t>
             </a:r>
@@ -45651,7 +45282,7 @@
             </a:r>
             <a:r>
               <a:rPr lang="en-US" sz="1400" dirty="0" smtClean="0">
-                <a:hlinkClick r:id="rId9" action="ppaction://hlinkfile"/>
+                <a:hlinkClick r:id="rId3" action="ppaction://hlinkfile"/>
               </a:rPr>
               <a:t>Hyplnk_writeRegs</a:t>
             </a:r>
@@ -45671,7 +45302,7 @@
             </a:r>
             <a:r>
               <a:rPr lang="en-US" sz="1400" dirty="0" smtClean="0">
-                <a:hlinkClick r:id="rId7" action="ppaction://hlinkfile"/>
+                <a:hlinkClick r:id="rId5" action="ppaction://hlinkfile"/>
               </a:rPr>
               <a:t>hyplnkLocation_e</a:t>
             </a:r>
@@ -45681,7 +45312,7 @@
             </a:r>
             <a:r>
               <a:rPr lang="en-US" sz="1400" dirty="0" smtClean="0">
-                <a:hlinkClick r:id="rId8" action="ppaction://hlinkfile"/>
+                <a:hlinkClick r:id="rId6" action="ppaction://hlinkfile"/>
               </a:rPr>
               <a:t>hyplnkRegisters_t</a:t>
             </a:r>
@@ -45726,7 +45357,7 @@
             </a:r>
             <a:r>
               <a:rPr lang="en-US" sz="1400" dirty="0" smtClean="0">
-                <a:hlinkClick r:id="rId10" action="ppaction://hlinkfile"/>
+                <a:hlinkClick r:id="rId3" action="ppaction://hlinkfile"/>
               </a:rPr>
               <a:t>Hyplnk_getWindow</a:t>
             </a:r>
@@ -45773,7 +45404,7 @@
             </a:r>
             <a:r>
               <a:rPr lang="en-US" sz="1400" dirty="0" smtClean="0">
-                <a:hlinkClick r:id="rId11" action="ppaction://hlinkfile"/>
+                <a:hlinkClick r:id="rId3" action="ppaction://hlinkfile"/>
               </a:rPr>
               <a:t>Hyplnk_getVersion</a:t>
             </a:r>
@@ -45810,7 +45441,7 @@
             </a:r>
             <a:r>
               <a:rPr lang="en-US" sz="1400" dirty="0" smtClean="0">
-                <a:hlinkClick r:id="rId12" action="ppaction://hlinkfile"/>
+                <a:hlinkClick r:id="rId3" action="ppaction://hlinkfile"/>
               </a:rPr>
               <a:t>Hyplnk_getVersionStr</a:t>
             </a:r>
@@ -45929,49 +45560,7 @@
               <a:rPr lang="en-US" sz="2600" dirty="0" smtClean="0">
                 <a:latin typeface="+mj-lt"/>
               </a:rPr>
-              <a:t>Configuration functions are part of the HyperLink example in the PDK release and can be </a:t>
-            </a:r>
-            <a:r>
-              <a:rPr lang="en-US" sz="2600" dirty="0" smtClean="0">
-                <a:latin typeface="+mj-lt"/>
-              </a:rPr>
-              <a:t>used</a:t>
-            </a:r>
-            <a:r>
-              <a:rPr lang="en-US" sz="2600" dirty="0" smtClean="0">
-                <a:latin typeface="+mj-lt"/>
-              </a:rPr>
-              <a:t> </a:t>
-            </a:r>
-            <a:r>
-              <a:rPr lang="en-US" sz="2600" dirty="0" smtClean="0">
-                <a:latin typeface="+mj-lt"/>
-              </a:rPr>
-              <a:t>“</a:t>
-            </a:r>
-            <a:r>
-              <a:rPr lang="en-US" sz="2600" dirty="0" smtClean="0">
-                <a:latin typeface="+mj-lt"/>
-              </a:rPr>
-              <a:t>as is” </a:t>
-            </a:r>
-            <a:r>
-              <a:rPr lang="en-US" sz="2600" dirty="0" smtClean="0">
-                <a:latin typeface="+mj-lt"/>
-              </a:rPr>
-              <a:t>or </a:t>
-            </a:r>
-            <a:r>
-              <a:rPr lang="en-US" sz="2600" dirty="0" smtClean="0">
-                <a:latin typeface="+mj-lt"/>
-              </a:rPr>
-              <a:t>be modified </a:t>
-            </a:r>
-            <a:r>
-              <a:rPr lang="en-US" sz="2600" dirty="0" smtClean="0">
-                <a:latin typeface="+mj-lt"/>
-              </a:rPr>
-              <a:t>by users.</a:t>
+              <a:t>Configuration functions are part of the HyperLink example in the PDK release and can be used “as is” or be modified by users.</a:t>
             </a:r>
           </a:p>
           <a:p>
@@ -46871,41 +46460,8 @@
               <a:rPr lang="en-US" sz="2000" dirty="0" smtClean="0">
                 <a:latin typeface="+mj-lt"/>
               </a:rPr>
-              <a:t>Included in </a:t>
-            </a:r>
-            <a:r>
-              <a:rPr lang="en-US" sz="2000" dirty="0" smtClean="0">
-                <a:latin typeface="+mj-lt"/>
-              </a:rPr>
-              <a:t>the PDK (Platform Development Kit) release </a:t>
-            </a:r>
-            <a:r>
-              <a:rPr lang="en-US" sz="2000" dirty="0" smtClean="0">
-                <a:latin typeface="+mj-lt"/>
-              </a:rPr>
-              <a:t>are</a:t>
-            </a:r>
-            <a:r>
-              <a:rPr lang="en-US" sz="2000" dirty="0" smtClean="0">
-                <a:latin typeface="+mj-lt"/>
-              </a:rPr>
-              <a:t> </a:t>
-            </a:r>
-            <a:r>
-              <a:rPr lang="en-US" sz="2000" dirty="0" smtClean="0">
-                <a:latin typeface="+mj-lt"/>
-              </a:rPr>
-              <a:t>a set of examples for each of the </a:t>
-            </a:r>
-            <a:r>
-              <a:rPr lang="en-US" sz="2000" dirty="0" smtClean="0">
-                <a:latin typeface="+mj-lt"/>
-              </a:rPr>
-              <a:t>peripherals.</a:t>
-            </a:r>
-            <a:endParaRPr lang="en-US" sz="2000" dirty="0" smtClean="0">
-              <a:latin typeface="+mj-lt"/>
-            </a:endParaRPr>
+              <a:t>Included in the PDK (Platform Development Kit) release are a set of examples for each of the peripherals.</a:t>
+            </a:r>
           </a:p>
           <a:p>
             <a:pPr marL="514350" indent="-514350" eaLnBrk="1" fontAlgn="auto" hangingPunct="1">
@@ -46924,47 +46480,26 @@
               <a:rPr lang="en-US" sz="2000" smtClean="0">
                 <a:latin typeface="+mj-lt"/>
               </a:rPr>
-              <a:t>as </a:t>
+              <a:t>as a single-EVM </a:t>
+            </a:r>
+            <a:r>
+              <a:rPr lang="en-US" sz="2000" dirty="0" smtClean="0">
+                <a:latin typeface="+mj-lt"/>
+              </a:rPr>
+              <a:t>loopback or between </a:t>
             </a:r>
             <a:r>
               <a:rPr lang="en-US" sz="2000" smtClean="0">
                 <a:latin typeface="+mj-lt"/>
               </a:rPr>
-              <a:t>a single-EVM </a:t>
+              <a:t>two C66x EVM </a:t>
             </a:r>
             <a:r>
               <a:rPr lang="en-US" sz="2000" dirty="0" smtClean="0">
                 <a:latin typeface="+mj-lt"/>
               </a:rPr>
-              <a:t>loopback </a:t>
-            </a:r>
-            <a:r>
-              <a:rPr lang="en-US" sz="2000" dirty="0" smtClean="0">
-                <a:latin typeface="+mj-lt"/>
-              </a:rPr>
-              <a:t>or between </a:t>
-            </a:r>
-            <a:r>
-              <a:rPr lang="en-US" sz="2000" smtClean="0">
-                <a:latin typeface="+mj-lt"/>
-              </a:rPr>
-              <a:t>two </a:t>
-            </a:r>
-            <a:r>
-              <a:rPr lang="en-US" sz="2000" smtClean="0">
-                <a:latin typeface="+mj-lt"/>
-              </a:rPr>
-              <a:t>C66x EVM </a:t>
-            </a:r>
-            <a:r>
-              <a:rPr lang="en-US" sz="2000" dirty="0" smtClean="0">
-                <a:latin typeface="+mj-lt"/>
-              </a:rPr>
               <a:t>boards.</a:t>
             </a:r>
-            <a:endParaRPr lang="en-US" sz="2000" dirty="0" smtClean="0">
-              <a:latin typeface="+mj-lt"/>
-            </a:endParaRPr>
           </a:p>
           <a:p>
             <a:pPr marL="514350" indent="-514350" eaLnBrk="1" fontAlgn="auto" hangingPunct="1">

</xml_diff>

<commit_message>
Updates for London Training
</commit_message>
<xml_diff>
--- a/slides/Intro to Hyperlink.pptx
+++ b/slides/Intro to Hyperlink.pptx
@@ -41,7 +41,7 @@
     <p:sldId id="364" r:id="rId32"/>
     <p:sldId id="332" r:id="rId33"/>
     <p:sldId id="365" r:id="rId34"/>
-    <p:sldId id="346" r:id="rId35"/>
+    <p:sldId id="369" r:id="rId35"/>
     <p:sldId id="366" r:id="rId36"/>
     <p:sldId id="329" r:id="rId37"/>
     <p:sldId id="367" r:id="rId38"/>
@@ -298,7 +298,7 @@
               <a:pPr>
                 <a:defRPr/>
               </a:pPr>
-              <a:t>3/6/2012</a:t>
+              <a:t>3/21/2012</a:t>
             </a:fld>
             <a:endParaRPr lang="en-US" dirty="0"/>
           </a:p>
@@ -744,7 +744,2833 @@
 </p:notes>
 </file>
 
+<file path=ppt/notesSlides/notesSlide10.xml><?xml version="1.0" encoding="utf-8"?>
+<p:notes xmlns:a="http://schemas.openxmlformats.org/drawingml/2006/main" xmlns:r="http://schemas.openxmlformats.org/officeDocument/2006/relationships" xmlns:p="http://schemas.openxmlformats.org/presentationml/2006/main">
+  <p:cSld>
+    <p:spTree>
+      <p:nvGrpSpPr>
+        <p:cNvPr id="1" name=""/>
+        <p:cNvGrpSpPr/>
+        <p:nvPr/>
+      </p:nvGrpSpPr>
+      <p:grpSpPr>
+        <a:xfrm>
+          <a:off x="0" y="0"/>
+          <a:ext cx="0" cy="0"/>
+          <a:chOff x="0" y="0"/>
+          <a:chExt cx="0" cy="0"/>
+        </a:xfrm>
+      </p:grpSpPr>
+      <p:sp>
+        <p:nvSpPr>
+          <p:cNvPr id="2" name="Slide Image Placeholder 1"/>
+          <p:cNvSpPr>
+            <a:spLocks noGrp="1" noRot="1" noChangeAspect="1"/>
+          </p:cNvSpPr>
+          <p:nvPr>
+            <p:ph type="sldImg"/>
+          </p:nvPr>
+        </p:nvSpPr>
+        <p:spPr/>
+      </p:sp>
+      <p:sp>
+        <p:nvSpPr>
+          <p:cNvPr id="3" name="Notes Placeholder 2"/>
+          <p:cNvSpPr>
+            <a:spLocks noGrp="1"/>
+          </p:cNvSpPr>
+          <p:nvPr>
+            <p:ph type="body" idx="1"/>
+          </p:nvPr>
+        </p:nvSpPr>
+        <p:spPr/>
+        <p:txBody>
+          <a:bodyPr>
+            <a:normAutofit/>
+          </a:bodyPr>
+          <a:lstStyle/>
+          <a:p>
+            <a:endParaRPr lang="en-US"/>
+          </a:p>
+        </p:txBody>
+      </p:sp>
+      <p:sp>
+        <p:nvSpPr>
+          <p:cNvPr id="4" name="Slide Number Placeholder 3"/>
+          <p:cNvSpPr>
+            <a:spLocks noGrp="1"/>
+          </p:cNvSpPr>
+          <p:nvPr>
+            <p:ph type="sldNum" sz="quarter" idx="10"/>
+          </p:nvPr>
+        </p:nvSpPr>
+        <p:spPr/>
+        <p:txBody>
+          <a:bodyPr/>
+          <a:lstStyle/>
+          <a:p>
+            <a:pPr>
+              <a:defRPr/>
+            </a:pPr>
+            <a:fld id="{8B2AE985-CEB1-47DB-AC87-FA613AA66B3B}" type="slidenum">
+              <a:rPr lang="en-US" smtClean="0"/>
+              <a:pPr>
+                <a:defRPr/>
+              </a:pPr>
+              <a:t>10</a:t>
+            </a:fld>
+            <a:endParaRPr lang="en-US" dirty="0"/>
+          </a:p>
+        </p:txBody>
+      </p:sp>
+    </p:spTree>
+  </p:cSld>
+  <p:clrMapOvr>
+    <a:masterClrMapping/>
+  </p:clrMapOvr>
+</p:notes>
+</file>
+
+<file path=ppt/notesSlides/notesSlide11.xml><?xml version="1.0" encoding="utf-8"?>
+<p:notes xmlns:a="http://schemas.openxmlformats.org/drawingml/2006/main" xmlns:r="http://schemas.openxmlformats.org/officeDocument/2006/relationships" xmlns:p="http://schemas.openxmlformats.org/presentationml/2006/main">
+  <p:cSld>
+    <p:spTree>
+      <p:nvGrpSpPr>
+        <p:cNvPr id="1" name=""/>
+        <p:cNvGrpSpPr/>
+        <p:nvPr/>
+      </p:nvGrpSpPr>
+      <p:grpSpPr>
+        <a:xfrm>
+          <a:off x="0" y="0"/>
+          <a:ext cx="0" cy="0"/>
+          <a:chOff x="0" y="0"/>
+          <a:chExt cx="0" cy="0"/>
+        </a:xfrm>
+      </p:grpSpPr>
+      <p:sp>
+        <p:nvSpPr>
+          <p:cNvPr id="55298" name="Rectangle 7"/>
+          <p:cNvSpPr>
+            <a:spLocks noGrp="1" noChangeArrowheads="1"/>
+          </p:cNvSpPr>
+          <p:nvPr>
+            <p:ph type="sldNum" sz="quarter" idx="5"/>
+          </p:nvPr>
+        </p:nvSpPr>
+        <p:spPr bwMode="auto">
+          <a:noFill/>
+          <a:ln>
+            <a:miter lim="800000"/>
+            <a:headEnd/>
+            <a:tailEnd/>
+          </a:ln>
+        </p:spPr>
+        <p:txBody>
+          <a:bodyPr wrap="square" numCol="1" anchorCtr="0" compatLnSpc="1">
+            <a:prstTxWarp prst="textNoShape">
+              <a:avLst/>
+            </a:prstTxWarp>
+          </a:bodyPr>
+          <a:lstStyle/>
+          <a:p>
+            <a:pPr fontAlgn="base">
+              <a:spcBef>
+                <a:spcPct val="0"/>
+              </a:spcBef>
+              <a:spcAft>
+                <a:spcPct val="0"/>
+              </a:spcAft>
+            </a:pPr>
+            <a:fld id="{7185C480-A9AC-4091-9762-70B9D1AADA10}" type="slidenum">
+              <a:rPr lang="en-US" smtClean="0">
+                <a:latin typeface="Arial" charset="0"/>
+              </a:rPr>
+              <a:pPr fontAlgn="base">
+                <a:spcBef>
+                  <a:spcPct val="0"/>
+                </a:spcBef>
+                <a:spcAft>
+                  <a:spcPct val="0"/>
+                </a:spcAft>
+              </a:pPr>
+              <a:t>11</a:t>
+            </a:fld>
+            <a:endParaRPr lang="en-US" dirty="0" smtClean="0">
+              <a:latin typeface="Arial" charset="0"/>
+            </a:endParaRPr>
+          </a:p>
+        </p:txBody>
+      </p:sp>
+      <p:sp>
+        <p:nvSpPr>
+          <p:cNvPr id="55299" name="Rectangle 2"/>
+          <p:cNvSpPr>
+            <a:spLocks noGrp="1" noRot="1" noChangeAspect="1" noChangeArrowheads="1" noTextEdit="1"/>
+          </p:cNvSpPr>
+          <p:nvPr>
+            <p:ph type="sldImg"/>
+          </p:nvPr>
+        </p:nvSpPr>
+        <p:spPr bwMode="auto">
+          <a:noFill/>
+          <a:ln>
+            <a:solidFill>
+              <a:srgbClr val="000000"/>
+            </a:solidFill>
+            <a:miter lim="800000"/>
+            <a:headEnd/>
+            <a:tailEnd/>
+          </a:ln>
+        </p:spPr>
+      </p:sp>
+      <p:sp>
+        <p:nvSpPr>
+          <p:cNvPr id="55300" name="Rectangle 3"/>
+          <p:cNvSpPr>
+            <a:spLocks noGrp="1" noChangeArrowheads="1"/>
+          </p:cNvSpPr>
+          <p:nvPr>
+            <p:ph type="body" idx="1"/>
+          </p:nvPr>
+        </p:nvSpPr>
+        <p:spPr bwMode="auto">
+          <a:noFill/>
+        </p:spPr>
+        <p:txBody>
+          <a:bodyPr wrap="square" numCol="1" anchor="t" anchorCtr="0" compatLnSpc="1">
+            <a:prstTxWarp prst="textNoShape">
+              <a:avLst/>
+            </a:prstTxWarp>
+          </a:bodyPr>
+          <a:lstStyle/>
+          <a:p>
+            <a:pPr eaLnBrk="1" hangingPunct="1"/>
+            <a:endParaRPr lang="en-US" dirty="0" smtClean="0">
+              <a:latin typeface="Arial" charset="0"/>
+            </a:endParaRPr>
+          </a:p>
+        </p:txBody>
+      </p:sp>
+    </p:spTree>
+  </p:cSld>
+  <p:clrMapOvr>
+    <a:masterClrMapping/>
+  </p:clrMapOvr>
+</p:notes>
+</file>
+
+<file path=ppt/notesSlides/notesSlide12.xml><?xml version="1.0" encoding="utf-8"?>
+<p:notes xmlns:a="http://schemas.openxmlformats.org/drawingml/2006/main" xmlns:r="http://schemas.openxmlformats.org/officeDocument/2006/relationships" xmlns:p="http://schemas.openxmlformats.org/presentationml/2006/main">
+  <p:cSld>
+    <p:spTree>
+      <p:nvGrpSpPr>
+        <p:cNvPr id="1" name=""/>
+        <p:cNvGrpSpPr/>
+        <p:nvPr/>
+      </p:nvGrpSpPr>
+      <p:grpSpPr>
+        <a:xfrm>
+          <a:off x="0" y="0"/>
+          <a:ext cx="0" cy="0"/>
+          <a:chOff x="0" y="0"/>
+          <a:chExt cx="0" cy="0"/>
+        </a:xfrm>
+      </p:grpSpPr>
+      <p:sp>
+        <p:nvSpPr>
+          <p:cNvPr id="2" name="Slide Image Placeholder 1"/>
+          <p:cNvSpPr>
+            <a:spLocks noGrp="1" noRot="1" noChangeAspect="1"/>
+          </p:cNvSpPr>
+          <p:nvPr>
+            <p:ph type="sldImg"/>
+          </p:nvPr>
+        </p:nvSpPr>
+        <p:spPr/>
+      </p:sp>
+      <p:sp>
+        <p:nvSpPr>
+          <p:cNvPr id="3" name="Notes Placeholder 2"/>
+          <p:cNvSpPr>
+            <a:spLocks noGrp="1"/>
+          </p:cNvSpPr>
+          <p:nvPr>
+            <p:ph type="body" idx="1"/>
+          </p:nvPr>
+        </p:nvSpPr>
+        <p:spPr/>
+        <p:txBody>
+          <a:bodyPr>
+            <a:normAutofit/>
+          </a:bodyPr>
+          <a:lstStyle/>
+          <a:p>
+            <a:endParaRPr lang="en-US"/>
+          </a:p>
+        </p:txBody>
+      </p:sp>
+      <p:sp>
+        <p:nvSpPr>
+          <p:cNvPr id="4" name="Slide Number Placeholder 3"/>
+          <p:cNvSpPr>
+            <a:spLocks noGrp="1"/>
+          </p:cNvSpPr>
+          <p:nvPr>
+            <p:ph type="sldNum" sz="quarter" idx="10"/>
+          </p:nvPr>
+        </p:nvSpPr>
+        <p:spPr/>
+        <p:txBody>
+          <a:bodyPr/>
+          <a:lstStyle/>
+          <a:p>
+            <a:pPr>
+              <a:defRPr/>
+            </a:pPr>
+            <a:fld id="{8B2AE985-CEB1-47DB-AC87-FA613AA66B3B}" type="slidenum">
+              <a:rPr lang="en-US" smtClean="0"/>
+              <a:pPr>
+                <a:defRPr/>
+              </a:pPr>
+              <a:t>12</a:t>
+            </a:fld>
+            <a:endParaRPr lang="en-US" dirty="0"/>
+          </a:p>
+        </p:txBody>
+      </p:sp>
+    </p:spTree>
+  </p:cSld>
+  <p:clrMapOvr>
+    <a:masterClrMapping/>
+  </p:clrMapOvr>
+</p:notes>
+</file>
+
+<file path=ppt/notesSlides/notesSlide13.xml><?xml version="1.0" encoding="utf-8"?>
+<p:notes xmlns:a="http://schemas.openxmlformats.org/drawingml/2006/main" xmlns:r="http://schemas.openxmlformats.org/officeDocument/2006/relationships" xmlns:p="http://schemas.openxmlformats.org/presentationml/2006/main">
+  <p:cSld>
+    <p:spTree>
+      <p:nvGrpSpPr>
+        <p:cNvPr id="1" name=""/>
+        <p:cNvGrpSpPr/>
+        <p:nvPr/>
+      </p:nvGrpSpPr>
+      <p:grpSpPr>
+        <a:xfrm>
+          <a:off x="0" y="0"/>
+          <a:ext cx="0" cy="0"/>
+          <a:chOff x="0" y="0"/>
+          <a:chExt cx="0" cy="0"/>
+        </a:xfrm>
+      </p:grpSpPr>
+      <p:sp>
+        <p:nvSpPr>
+          <p:cNvPr id="2" name="Slide Image Placeholder 1"/>
+          <p:cNvSpPr>
+            <a:spLocks noGrp="1" noRot="1" noChangeAspect="1"/>
+          </p:cNvSpPr>
+          <p:nvPr>
+            <p:ph type="sldImg"/>
+          </p:nvPr>
+        </p:nvSpPr>
+        <p:spPr/>
+      </p:sp>
+      <p:sp>
+        <p:nvSpPr>
+          <p:cNvPr id="3" name="Notes Placeholder 2"/>
+          <p:cNvSpPr>
+            <a:spLocks noGrp="1"/>
+          </p:cNvSpPr>
+          <p:nvPr>
+            <p:ph type="body" idx="1"/>
+          </p:nvPr>
+        </p:nvSpPr>
+        <p:spPr/>
+        <p:txBody>
+          <a:bodyPr>
+            <a:normAutofit/>
+          </a:bodyPr>
+          <a:lstStyle/>
+          <a:p>
+            <a:endParaRPr lang="en-US"/>
+          </a:p>
+        </p:txBody>
+      </p:sp>
+      <p:sp>
+        <p:nvSpPr>
+          <p:cNvPr id="4" name="Slide Number Placeholder 3"/>
+          <p:cNvSpPr>
+            <a:spLocks noGrp="1"/>
+          </p:cNvSpPr>
+          <p:nvPr>
+            <p:ph type="sldNum" sz="quarter" idx="10"/>
+          </p:nvPr>
+        </p:nvSpPr>
+        <p:spPr/>
+        <p:txBody>
+          <a:bodyPr/>
+          <a:lstStyle/>
+          <a:p>
+            <a:pPr>
+              <a:defRPr/>
+            </a:pPr>
+            <a:fld id="{8B2AE985-CEB1-47DB-AC87-FA613AA66B3B}" type="slidenum">
+              <a:rPr lang="en-US" smtClean="0"/>
+              <a:pPr>
+                <a:defRPr/>
+              </a:pPr>
+              <a:t>13</a:t>
+            </a:fld>
+            <a:endParaRPr lang="en-US" dirty="0"/>
+          </a:p>
+        </p:txBody>
+      </p:sp>
+    </p:spTree>
+  </p:cSld>
+  <p:clrMapOvr>
+    <a:masterClrMapping/>
+  </p:clrMapOvr>
+</p:notes>
+</file>
+
+<file path=ppt/notesSlides/notesSlide14.xml><?xml version="1.0" encoding="utf-8"?>
+<p:notes xmlns:a="http://schemas.openxmlformats.org/drawingml/2006/main" xmlns:r="http://schemas.openxmlformats.org/officeDocument/2006/relationships" xmlns:p="http://schemas.openxmlformats.org/presentationml/2006/main">
+  <p:cSld>
+    <p:spTree>
+      <p:nvGrpSpPr>
+        <p:cNvPr id="1" name=""/>
+        <p:cNvGrpSpPr/>
+        <p:nvPr/>
+      </p:nvGrpSpPr>
+      <p:grpSpPr>
+        <a:xfrm>
+          <a:off x="0" y="0"/>
+          <a:ext cx="0" cy="0"/>
+          <a:chOff x="0" y="0"/>
+          <a:chExt cx="0" cy="0"/>
+        </a:xfrm>
+      </p:grpSpPr>
+      <p:sp>
+        <p:nvSpPr>
+          <p:cNvPr id="2" name="Slide Image Placeholder 1"/>
+          <p:cNvSpPr>
+            <a:spLocks noGrp="1" noRot="1" noChangeAspect="1"/>
+          </p:cNvSpPr>
+          <p:nvPr>
+            <p:ph type="sldImg"/>
+          </p:nvPr>
+        </p:nvSpPr>
+        <p:spPr/>
+      </p:sp>
+      <p:sp>
+        <p:nvSpPr>
+          <p:cNvPr id="3" name="Notes Placeholder 2"/>
+          <p:cNvSpPr>
+            <a:spLocks noGrp="1"/>
+          </p:cNvSpPr>
+          <p:nvPr>
+            <p:ph type="body" idx="1"/>
+          </p:nvPr>
+        </p:nvSpPr>
+        <p:spPr/>
+        <p:txBody>
+          <a:bodyPr>
+            <a:normAutofit/>
+          </a:bodyPr>
+          <a:lstStyle/>
+          <a:p>
+            <a:endParaRPr lang="en-US"/>
+          </a:p>
+        </p:txBody>
+      </p:sp>
+      <p:sp>
+        <p:nvSpPr>
+          <p:cNvPr id="4" name="Slide Number Placeholder 3"/>
+          <p:cNvSpPr>
+            <a:spLocks noGrp="1"/>
+          </p:cNvSpPr>
+          <p:nvPr>
+            <p:ph type="sldNum" sz="quarter" idx="10"/>
+          </p:nvPr>
+        </p:nvSpPr>
+        <p:spPr/>
+        <p:txBody>
+          <a:bodyPr/>
+          <a:lstStyle/>
+          <a:p>
+            <a:pPr>
+              <a:defRPr/>
+            </a:pPr>
+            <a:fld id="{8B2AE985-CEB1-47DB-AC87-FA613AA66B3B}" type="slidenum">
+              <a:rPr lang="en-US" smtClean="0"/>
+              <a:pPr>
+                <a:defRPr/>
+              </a:pPr>
+              <a:t>14</a:t>
+            </a:fld>
+            <a:endParaRPr lang="en-US" dirty="0"/>
+          </a:p>
+        </p:txBody>
+      </p:sp>
+    </p:spTree>
+  </p:cSld>
+  <p:clrMapOvr>
+    <a:masterClrMapping/>
+  </p:clrMapOvr>
+</p:notes>
+</file>
+
+<file path=ppt/notesSlides/notesSlide15.xml><?xml version="1.0" encoding="utf-8"?>
+<p:notes xmlns:a="http://schemas.openxmlformats.org/drawingml/2006/main" xmlns:r="http://schemas.openxmlformats.org/officeDocument/2006/relationships" xmlns:p="http://schemas.openxmlformats.org/presentationml/2006/main">
+  <p:cSld>
+    <p:spTree>
+      <p:nvGrpSpPr>
+        <p:cNvPr id="1" name=""/>
+        <p:cNvGrpSpPr/>
+        <p:nvPr/>
+      </p:nvGrpSpPr>
+      <p:grpSpPr>
+        <a:xfrm>
+          <a:off x="0" y="0"/>
+          <a:ext cx="0" cy="0"/>
+          <a:chOff x="0" y="0"/>
+          <a:chExt cx="0" cy="0"/>
+        </a:xfrm>
+      </p:grpSpPr>
+      <p:sp>
+        <p:nvSpPr>
+          <p:cNvPr id="2" name="Slide Image Placeholder 1"/>
+          <p:cNvSpPr>
+            <a:spLocks noGrp="1" noRot="1" noChangeAspect="1"/>
+          </p:cNvSpPr>
+          <p:nvPr>
+            <p:ph type="sldImg"/>
+          </p:nvPr>
+        </p:nvSpPr>
+        <p:spPr/>
+      </p:sp>
+      <p:sp>
+        <p:nvSpPr>
+          <p:cNvPr id="3" name="Notes Placeholder 2"/>
+          <p:cNvSpPr>
+            <a:spLocks noGrp="1"/>
+          </p:cNvSpPr>
+          <p:nvPr>
+            <p:ph type="body" idx="1"/>
+          </p:nvPr>
+        </p:nvSpPr>
+        <p:spPr/>
+        <p:txBody>
+          <a:bodyPr>
+            <a:normAutofit/>
+          </a:bodyPr>
+          <a:lstStyle/>
+          <a:p>
+            <a:endParaRPr lang="en-US"/>
+          </a:p>
+        </p:txBody>
+      </p:sp>
+      <p:sp>
+        <p:nvSpPr>
+          <p:cNvPr id="4" name="Slide Number Placeholder 3"/>
+          <p:cNvSpPr>
+            <a:spLocks noGrp="1"/>
+          </p:cNvSpPr>
+          <p:nvPr>
+            <p:ph type="sldNum" sz="quarter" idx="10"/>
+          </p:nvPr>
+        </p:nvSpPr>
+        <p:spPr/>
+        <p:txBody>
+          <a:bodyPr/>
+          <a:lstStyle/>
+          <a:p>
+            <a:pPr>
+              <a:defRPr/>
+            </a:pPr>
+            <a:fld id="{8B2AE985-CEB1-47DB-AC87-FA613AA66B3B}" type="slidenum">
+              <a:rPr lang="en-US" smtClean="0"/>
+              <a:pPr>
+                <a:defRPr/>
+              </a:pPr>
+              <a:t>15</a:t>
+            </a:fld>
+            <a:endParaRPr lang="en-US" dirty="0"/>
+          </a:p>
+        </p:txBody>
+      </p:sp>
+    </p:spTree>
+  </p:cSld>
+  <p:clrMapOvr>
+    <a:masterClrMapping/>
+  </p:clrMapOvr>
+</p:notes>
+</file>
+
+<file path=ppt/notesSlides/notesSlide16.xml><?xml version="1.0" encoding="utf-8"?>
+<p:notes xmlns:a="http://schemas.openxmlformats.org/drawingml/2006/main" xmlns:r="http://schemas.openxmlformats.org/officeDocument/2006/relationships" xmlns:p="http://schemas.openxmlformats.org/presentationml/2006/main">
+  <p:cSld>
+    <p:spTree>
+      <p:nvGrpSpPr>
+        <p:cNvPr id="1" name=""/>
+        <p:cNvGrpSpPr/>
+        <p:nvPr/>
+      </p:nvGrpSpPr>
+      <p:grpSpPr>
+        <a:xfrm>
+          <a:off x="0" y="0"/>
+          <a:ext cx="0" cy="0"/>
+          <a:chOff x="0" y="0"/>
+          <a:chExt cx="0" cy="0"/>
+        </a:xfrm>
+      </p:grpSpPr>
+      <p:sp>
+        <p:nvSpPr>
+          <p:cNvPr id="2" name="Slide Image Placeholder 1"/>
+          <p:cNvSpPr>
+            <a:spLocks noGrp="1" noRot="1" noChangeAspect="1"/>
+          </p:cNvSpPr>
+          <p:nvPr>
+            <p:ph type="sldImg"/>
+          </p:nvPr>
+        </p:nvSpPr>
+        <p:spPr/>
+      </p:sp>
+      <p:sp>
+        <p:nvSpPr>
+          <p:cNvPr id="3" name="Notes Placeholder 2"/>
+          <p:cNvSpPr>
+            <a:spLocks noGrp="1"/>
+          </p:cNvSpPr>
+          <p:nvPr>
+            <p:ph type="body" idx="1"/>
+          </p:nvPr>
+        </p:nvSpPr>
+        <p:spPr/>
+        <p:txBody>
+          <a:bodyPr>
+            <a:normAutofit/>
+          </a:bodyPr>
+          <a:lstStyle/>
+          <a:p>
+            <a:endParaRPr lang="en-US"/>
+          </a:p>
+        </p:txBody>
+      </p:sp>
+      <p:sp>
+        <p:nvSpPr>
+          <p:cNvPr id="4" name="Slide Number Placeholder 3"/>
+          <p:cNvSpPr>
+            <a:spLocks noGrp="1"/>
+          </p:cNvSpPr>
+          <p:nvPr>
+            <p:ph type="sldNum" sz="quarter" idx="10"/>
+          </p:nvPr>
+        </p:nvSpPr>
+        <p:spPr/>
+        <p:txBody>
+          <a:bodyPr/>
+          <a:lstStyle/>
+          <a:p>
+            <a:pPr>
+              <a:defRPr/>
+            </a:pPr>
+            <a:fld id="{8B2AE985-CEB1-47DB-AC87-FA613AA66B3B}" type="slidenum">
+              <a:rPr lang="en-US" smtClean="0"/>
+              <a:pPr>
+                <a:defRPr/>
+              </a:pPr>
+              <a:t>16</a:t>
+            </a:fld>
+            <a:endParaRPr lang="en-US" dirty="0"/>
+          </a:p>
+        </p:txBody>
+      </p:sp>
+    </p:spTree>
+  </p:cSld>
+  <p:clrMapOvr>
+    <a:masterClrMapping/>
+  </p:clrMapOvr>
+</p:notes>
+</file>
+
+<file path=ppt/notesSlides/notesSlide17.xml><?xml version="1.0" encoding="utf-8"?>
+<p:notes xmlns:a="http://schemas.openxmlformats.org/drawingml/2006/main" xmlns:r="http://schemas.openxmlformats.org/officeDocument/2006/relationships" xmlns:p="http://schemas.openxmlformats.org/presentationml/2006/main">
+  <p:cSld>
+    <p:spTree>
+      <p:nvGrpSpPr>
+        <p:cNvPr id="1" name=""/>
+        <p:cNvGrpSpPr/>
+        <p:nvPr/>
+      </p:nvGrpSpPr>
+      <p:grpSpPr>
+        <a:xfrm>
+          <a:off x="0" y="0"/>
+          <a:ext cx="0" cy="0"/>
+          <a:chOff x="0" y="0"/>
+          <a:chExt cx="0" cy="0"/>
+        </a:xfrm>
+      </p:grpSpPr>
+      <p:sp>
+        <p:nvSpPr>
+          <p:cNvPr id="2" name="Slide Image Placeholder 1"/>
+          <p:cNvSpPr>
+            <a:spLocks noGrp="1" noRot="1" noChangeAspect="1"/>
+          </p:cNvSpPr>
+          <p:nvPr>
+            <p:ph type="sldImg"/>
+          </p:nvPr>
+        </p:nvSpPr>
+        <p:spPr/>
+      </p:sp>
+      <p:sp>
+        <p:nvSpPr>
+          <p:cNvPr id="3" name="Notes Placeholder 2"/>
+          <p:cNvSpPr>
+            <a:spLocks noGrp="1"/>
+          </p:cNvSpPr>
+          <p:nvPr>
+            <p:ph type="body" idx="1"/>
+          </p:nvPr>
+        </p:nvSpPr>
+        <p:spPr/>
+        <p:txBody>
+          <a:bodyPr>
+            <a:normAutofit/>
+          </a:bodyPr>
+          <a:lstStyle/>
+          <a:p>
+            <a:endParaRPr lang="en-US"/>
+          </a:p>
+        </p:txBody>
+      </p:sp>
+      <p:sp>
+        <p:nvSpPr>
+          <p:cNvPr id="4" name="Slide Number Placeholder 3"/>
+          <p:cNvSpPr>
+            <a:spLocks noGrp="1"/>
+          </p:cNvSpPr>
+          <p:nvPr>
+            <p:ph type="sldNum" sz="quarter" idx="10"/>
+          </p:nvPr>
+        </p:nvSpPr>
+        <p:spPr/>
+        <p:txBody>
+          <a:bodyPr/>
+          <a:lstStyle/>
+          <a:p>
+            <a:pPr>
+              <a:defRPr/>
+            </a:pPr>
+            <a:fld id="{8B2AE985-CEB1-47DB-AC87-FA613AA66B3B}" type="slidenum">
+              <a:rPr lang="en-US" smtClean="0"/>
+              <a:pPr>
+                <a:defRPr/>
+              </a:pPr>
+              <a:t>17</a:t>
+            </a:fld>
+            <a:endParaRPr lang="en-US" dirty="0"/>
+          </a:p>
+        </p:txBody>
+      </p:sp>
+    </p:spTree>
+  </p:cSld>
+  <p:clrMapOvr>
+    <a:masterClrMapping/>
+  </p:clrMapOvr>
+</p:notes>
+</file>
+
+<file path=ppt/notesSlides/notesSlide18.xml><?xml version="1.0" encoding="utf-8"?>
+<p:notes xmlns:a="http://schemas.openxmlformats.org/drawingml/2006/main" xmlns:r="http://schemas.openxmlformats.org/officeDocument/2006/relationships" xmlns:p="http://schemas.openxmlformats.org/presentationml/2006/main">
+  <p:cSld>
+    <p:spTree>
+      <p:nvGrpSpPr>
+        <p:cNvPr id="1" name=""/>
+        <p:cNvGrpSpPr/>
+        <p:nvPr/>
+      </p:nvGrpSpPr>
+      <p:grpSpPr>
+        <a:xfrm>
+          <a:off x="0" y="0"/>
+          <a:ext cx="0" cy="0"/>
+          <a:chOff x="0" y="0"/>
+          <a:chExt cx="0" cy="0"/>
+        </a:xfrm>
+      </p:grpSpPr>
+      <p:sp>
+        <p:nvSpPr>
+          <p:cNvPr id="2" name="Slide Image Placeholder 1"/>
+          <p:cNvSpPr>
+            <a:spLocks noGrp="1" noRot="1" noChangeAspect="1"/>
+          </p:cNvSpPr>
+          <p:nvPr>
+            <p:ph type="sldImg"/>
+          </p:nvPr>
+        </p:nvSpPr>
+        <p:spPr/>
+      </p:sp>
+      <p:sp>
+        <p:nvSpPr>
+          <p:cNvPr id="3" name="Notes Placeholder 2"/>
+          <p:cNvSpPr>
+            <a:spLocks noGrp="1"/>
+          </p:cNvSpPr>
+          <p:nvPr>
+            <p:ph type="body" idx="1"/>
+          </p:nvPr>
+        </p:nvSpPr>
+        <p:spPr/>
+        <p:txBody>
+          <a:bodyPr>
+            <a:normAutofit/>
+          </a:bodyPr>
+          <a:lstStyle/>
+          <a:p>
+            <a:endParaRPr lang="en-US"/>
+          </a:p>
+        </p:txBody>
+      </p:sp>
+      <p:sp>
+        <p:nvSpPr>
+          <p:cNvPr id="4" name="Slide Number Placeholder 3"/>
+          <p:cNvSpPr>
+            <a:spLocks noGrp="1"/>
+          </p:cNvSpPr>
+          <p:nvPr>
+            <p:ph type="sldNum" sz="quarter" idx="10"/>
+          </p:nvPr>
+        </p:nvSpPr>
+        <p:spPr/>
+        <p:txBody>
+          <a:bodyPr/>
+          <a:lstStyle/>
+          <a:p>
+            <a:pPr>
+              <a:defRPr/>
+            </a:pPr>
+            <a:fld id="{8B2AE985-CEB1-47DB-AC87-FA613AA66B3B}" type="slidenum">
+              <a:rPr lang="en-US" smtClean="0"/>
+              <a:pPr>
+                <a:defRPr/>
+              </a:pPr>
+              <a:t>18</a:t>
+            </a:fld>
+            <a:endParaRPr lang="en-US" dirty="0"/>
+          </a:p>
+        </p:txBody>
+      </p:sp>
+    </p:spTree>
+  </p:cSld>
+  <p:clrMapOvr>
+    <a:masterClrMapping/>
+  </p:clrMapOvr>
+</p:notes>
+</file>
+
+<file path=ppt/notesSlides/notesSlide19.xml><?xml version="1.0" encoding="utf-8"?>
+<p:notes xmlns:a="http://schemas.openxmlformats.org/drawingml/2006/main" xmlns:r="http://schemas.openxmlformats.org/officeDocument/2006/relationships" xmlns:p="http://schemas.openxmlformats.org/presentationml/2006/main">
+  <p:cSld>
+    <p:spTree>
+      <p:nvGrpSpPr>
+        <p:cNvPr id="1" name=""/>
+        <p:cNvGrpSpPr/>
+        <p:nvPr/>
+      </p:nvGrpSpPr>
+      <p:grpSpPr>
+        <a:xfrm>
+          <a:off x="0" y="0"/>
+          <a:ext cx="0" cy="0"/>
+          <a:chOff x="0" y="0"/>
+          <a:chExt cx="0" cy="0"/>
+        </a:xfrm>
+      </p:grpSpPr>
+      <p:sp>
+        <p:nvSpPr>
+          <p:cNvPr id="2" name="Slide Image Placeholder 1"/>
+          <p:cNvSpPr>
+            <a:spLocks noGrp="1" noRot="1" noChangeAspect="1"/>
+          </p:cNvSpPr>
+          <p:nvPr>
+            <p:ph type="sldImg"/>
+          </p:nvPr>
+        </p:nvSpPr>
+        <p:spPr/>
+      </p:sp>
+      <p:sp>
+        <p:nvSpPr>
+          <p:cNvPr id="3" name="Notes Placeholder 2"/>
+          <p:cNvSpPr>
+            <a:spLocks noGrp="1"/>
+          </p:cNvSpPr>
+          <p:nvPr>
+            <p:ph type="body" idx="1"/>
+          </p:nvPr>
+        </p:nvSpPr>
+        <p:spPr/>
+        <p:txBody>
+          <a:bodyPr>
+            <a:normAutofit/>
+          </a:bodyPr>
+          <a:lstStyle/>
+          <a:p>
+            <a:endParaRPr lang="en-US"/>
+          </a:p>
+        </p:txBody>
+      </p:sp>
+      <p:sp>
+        <p:nvSpPr>
+          <p:cNvPr id="4" name="Slide Number Placeholder 3"/>
+          <p:cNvSpPr>
+            <a:spLocks noGrp="1"/>
+          </p:cNvSpPr>
+          <p:nvPr>
+            <p:ph type="sldNum" sz="quarter" idx="10"/>
+          </p:nvPr>
+        </p:nvSpPr>
+        <p:spPr/>
+        <p:txBody>
+          <a:bodyPr/>
+          <a:lstStyle/>
+          <a:p>
+            <a:pPr>
+              <a:defRPr/>
+            </a:pPr>
+            <a:fld id="{8B2AE985-CEB1-47DB-AC87-FA613AA66B3B}" type="slidenum">
+              <a:rPr lang="en-US" smtClean="0"/>
+              <a:pPr>
+                <a:defRPr/>
+              </a:pPr>
+              <a:t>19</a:t>
+            </a:fld>
+            <a:endParaRPr lang="en-US" dirty="0"/>
+          </a:p>
+        </p:txBody>
+      </p:sp>
+    </p:spTree>
+  </p:cSld>
+  <p:clrMapOvr>
+    <a:masterClrMapping/>
+  </p:clrMapOvr>
+</p:notes>
+</file>
+
 <file path=ppt/notesSlides/notesSlide2.xml><?xml version="1.0" encoding="utf-8"?>
+<p:notes xmlns:a="http://schemas.openxmlformats.org/drawingml/2006/main" xmlns:r="http://schemas.openxmlformats.org/officeDocument/2006/relationships" xmlns:p="http://schemas.openxmlformats.org/presentationml/2006/main">
+  <p:cSld>
+    <p:spTree>
+      <p:nvGrpSpPr>
+        <p:cNvPr id="1" name=""/>
+        <p:cNvGrpSpPr/>
+        <p:nvPr/>
+      </p:nvGrpSpPr>
+      <p:grpSpPr>
+        <a:xfrm>
+          <a:off x="0" y="0"/>
+          <a:ext cx="0" cy="0"/>
+          <a:chOff x="0" y="0"/>
+          <a:chExt cx="0" cy="0"/>
+        </a:xfrm>
+      </p:grpSpPr>
+      <p:sp>
+        <p:nvSpPr>
+          <p:cNvPr id="2" name="Slide Image Placeholder 1"/>
+          <p:cNvSpPr>
+            <a:spLocks noGrp="1" noRot="1" noChangeAspect="1"/>
+          </p:cNvSpPr>
+          <p:nvPr>
+            <p:ph type="sldImg"/>
+          </p:nvPr>
+        </p:nvSpPr>
+        <p:spPr/>
+      </p:sp>
+      <p:sp>
+        <p:nvSpPr>
+          <p:cNvPr id="3" name="Notes Placeholder 2"/>
+          <p:cNvSpPr>
+            <a:spLocks noGrp="1"/>
+          </p:cNvSpPr>
+          <p:nvPr>
+            <p:ph type="body" idx="1"/>
+          </p:nvPr>
+        </p:nvSpPr>
+        <p:spPr/>
+        <p:txBody>
+          <a:bodyPr>
+            <a:normAutofit/>
+          </a:bodyPr>
+          <a:lstStyle/>
+          <a:p>
+            <a:endParaRPr lang="en-US"/>
+          </a:p>
+        </p:txBody>
+      </p:sp>
+      <p:sp>
+        <p:nvSpPr>
+          <p:cNvPr id="4" name="Slide Number Placeholder 3"/>
+          <p:cNvSpPr>
+            <a:spLocks noGrp="1"/>
+          </p:cNvSpPr>
+          <p:nvPr>
+            <p:ph type="sldNum" sz="quarter" idx="10"/>
+          </p:nvPr>
+        </p:nvSpPr>
+        <p:spPr/>
+        <p:txBody>
+          <a:bodyPr/>
+          <a:lstStyle/>
+          <a:p>
+            <a:pPr>
+              <a:defRPr/>
+            </a:pPr>
+            <a:fld id="{8B2AE985-CEB1-47DB-AC87-FA613AA66B3B}" type="slidenum">
+              <a:rPr lang="en-US" smtClean="0"/>
+              <a:pPr>
+                <a:defRPr/>
+              </a:pPr>
+              <a:t>2</a:t>
+            </a:fld>
+            <a:endParaRPr lang="en-US" dirty="0"/>
+          </a:p>
+        </p:txBody>
+      </p:sp>
+    </p:spTree>
+  </p:cSld>
+  <p:clrMapOvr>
+    <a:masterClrMapping/>
+  </p:clrMapOvr>
+</p:notes>
+</file>
+
+<file path=ppt/notesSlides/notesSlide20.xml><?xml version="1.0" encoding="utf-8"?>
+<p:notes xmlns:a="http://schemas.openxmlformats.org/drawingml/2006/main" xmlns:r="http://schemas.openxmlformats.org/officeDocument/2006/relationships" xmlns:p="http://schemas.openxmlformats.org/presentationml/2006/main">
+  <p:cSld>
+    <p:spTree>
+      <p:nvGrpSpPr>
+        <p:cNvPr id="1" name=""/>
+        <p:cNvGrpSpPr/>
+        <p:nvPr/>
+      </p:nvGrpSpPr>
+      <p:grpSpPr>
+        <a:xfrm>
+          <a:off x="0" y="0"/>
+          <a:ext cx="0" cy="0"/>
+          <a:chOff x="0" y="0"/>
+          <a:chExt cx="0" cy="0"/>
+        </a:xfrm>
+      </p:grpSpPr>
+      <p:sp>
+        <p:nvSpPr>
+          <p:cNvPr id="2" name="Slide Image Placeholder 1"/>
+          <p:cNvSpPr>
+            <a:spLocks noGrp="1" noRot="1" noChangeAspect="1"/>
+          </p:cNvSpPr>
+          <p:nvPr>
+            <p:ph type="sldImg"/>
+          </p:nvPr>
+        </p:nvSpPr>
+        <p:spPr/>
+      </p:sp>
+      <p:sp>
+        <p:nvSpPr>
+          <p:cNvPr id="3" name="Notes Placeholder 2"/>
+          <p:cNvSpPr>
+            <a:spLocks noGrp="1"/>
+          </p:cNvSpPr>
+          <p:nvPr>
+            <p:ph type="body" idx="1"/>
+          </p:nvPr>
+        </p:nvSpPr>
+        <p:spPr/>
+        <p:txBody>
+          <a:bodyPr>
+            <a:normAutofit/>
+          </a:bodyPr>
+          <a:lstStyle/>
+          <a:p>
+            <a:endParaRPr lang="en-US"/>
+          </a:p>
+        </p:txBody>
+      </p:sp>
+      <p:sp>
+        <p:nvSpPr>
+          <p:cNvPr id="4" name="Slide Number Placeholder 3"/>
+          <p:cNvSpPr>
+            <a:spLocks noGrp="1"/>
+          </p:cNvSpPr>
+          <p:nvPr>
+            <p:ph type="sldNum" sz="quarter" idx="10"/>
+          </p:nvPr>
+        </p:nvSpPr>
+        <p:spPr/>
+        <p:txBody>
+          <a:bodyPr/>
+          <a:lstStyle/>
+          <a:p>
+            <a:pPr>
+              <a:defRPr/>
+            </a:pPr>
+            <a:fld id="{8B2AE985-CEB1-47DB-AC87-FA613AA66B3B}" type="slidenum">
+              <a:rPr lang="en-US" smtClean="0"/>
+              <a:pPr>
+                <a:defRPr/>
+              </a:pPr>
+              <a:t>20</a:t>
+            </a:fld>
+            <a:endParaRPr lang="en-US" dirty="0"/>
+          </a:p>
+        </p:txBody>
+      </p:sp>
+    </p:spTree>
+  </p:cSld>
+  <p:clrMapOvr>
+    <a:masterClrMapping/>
+  </p:clrMapOvr>
+</p:notes>
+</file>
+
+<file path=ppt/notesSlides/notesSlide21.xml><?xml version="1.0" encoding="utf-8"?>
+<p:notes xmlns:a="http://schemas.openxmlformats.org/drawingml/2006/main" xmlns:r="http://schemas.openxmlformats.org/officeDocument/2006/relationships" xmlns:p="http://schemas.openxmlformats.org/presentationml/2006/main">
+  <p:cSld>
+    <p:spTree>
+      <p:nvGrpSpPr>
+        <p:cNvPr id="1" name=""/>
+        <p:cNvGrpSpPr/>
+        <p:nvPr/>
+      </p:nvGrpSpPr>
+      <p:grpSpPr>
+        <a:xfrm>
+          <a:off x="0" y="0"/>
+          <a:ext cx="0" cy="0"/>
+          <a:chOff x="0" y="0"/>
+          <a:chExt cx="0" cy="0"/>
+        </a:xfrm>
+      </p:grpSpPr>
+      <p:sp>
+        <p:nvSpPr>
+          <p:cNvPr id="2" name="Slide Image Placeholder 1"/>
+          <p:cNvSpPr>
+            <a:spLocks noGrp="1" noRot="1" noChangeAspect="1"/>
+          </p:cNvSpPr>
+          <p:nvPr>
+            <p:ph type="sldImg"/>
+          </p:nvPr>
+        </p:nvSpPr>
+        <p:spPr/>
+      </p:sp>
+      <p:sp>
+        <p:nvSpPr>
+          <p:cNvPr id="3" name="Notes Placeholder 2"/>
+          <p:cNvSpPr>
+            <a:spLocks noGrp="1"/>
+          </p:cNvSpPr>
+          <p:nvPr>
+            <p:ph type="body" idx="1"/>
+          </p:nvPr>
+        </p:nvSpPr>
+        <p:spPr/>
+        <p:txBody>
+          <a:bodyPr>
+            <a:normAutofit/>
+          </a:bodyPr>
+          <a:lstStyle/>
+          <a:p>
+            <a:endParaRPr lang="en-US"/>
+          </a:p>
+        </p:txBody>
+      </p:sp>
+      <p:sp>
+        <p:nvSpPr>
+          <p:cNvPr id="4" name="Slide Number Placeholder 3"/>
+          <p:cNvSpPr>
+            <a:spLocks noGrp="1"/>
+          </p:cNvSpPr>
+          <p:nvPr>
+            <p:ph type="sldNum" sz="quarter" idx="10"/>
+          </p:nvPr>
+        </p:nvSpPr>
+        <p:spPr/>
+        <p:txBody>
+          <a:bodyPr/>
+          <a:lstStyle/>
+          <a:p>
+            <a:pPr>
+              <a:defRPr/>
+            </a:pPr>
+            <a:fld id="{8B2AE985-CEB1-47DB-AC87-FA613AA66B3B}" type="slidenum">
+              <a:rPr lang="en-US" smtClean="0"/>
+              <a:pPr>
+                <a:defRPr/>
+              </a:pPr>
+              <a:t>21</a:t>
+            </a:fld>
+            <a:endParaRPr lang="en-US" dirty="0"/>
+          </a:p>
+        </p:txBody>
+      </p:sp>
+    </p:spTree>
+  </p:cSld>
+  <p:clrMapOvr>
+    <a:masterClrMapping/>
+  </p:clrMapOvr>
+</p:notes>
+</file>
+
+<file path=ppt/notesSlides/notesSlide22.xml><?xml version="1.0" encoding="utf-8"?>
+<p:notes xmlns:a="http://schemas.openxmlformats.org/drawingml/2006/main" xmlns:r="http://schemas.openxmlformats.org/officeDocument/2006/relationships" xmlns:p="http://schemas.openxmlformats.org/presentationml/2006/main">
+  <p:cSld>
+    <p:spTree>
+      <p:nvGrpSpPr>
+        <p:cNvPr id="1" name=""/>
+        <p:cNvGrpSpPr/>
+        <p:nvPr/>
+      </p:nvGrpSpPr>
+      <p:grpSpPr>
+        <a:xfrm>
+          <a:off x="0" y="0"/>
+          <a:ext cx="0" cy="0"/>
+          <a:chOff x="0" y="0"/>
+          <a:chExt cx="0" cy="0"/>
+        </a:xfrm>
+      </p:grpSpPr>
+      <p:sp>
+        <p:nvSpPr>
+          <p:cNvPr id="2" name="Slide Image Placeholder 1"/>
+          <p:cNvSpPr>
+            <a:spLocks noGrp="1" noRot="1" noChangeAspect="1"/>
+          </p:cNvSpPr>
+          <p:nvPr>
+            <p:ph type="sldImg"/>
+          </p:nvPr>
+        </p:nvSpPr>
+        <p:spPr/>
+      </p:sp>
+      <p:sp>
+        <p:nvSpPr>
+          <p:cNvPr id="3" name="Notes Placeholder 2"/>
+          <p:cNvSpPr>
+            <a:spLocks noGrp="1"/>
+          </p:cNvSpPr>
+          <p:nvPr>
+            <p:ph type="body" idx="1"/>
+          </p:nvPr>
+        </p:nvSpPr>
+        <p:spPr/>
+        <p:txBody>
+          <a:bodyPr>
+            <a:normAutofit/>
+          </a:bodyPr>
+          <a:lstStyle/>
+          <a:p>
+            <a:endParaRPr lang="en-US"/>
+          </a:p>
+        </p:txBody>
+      </p:sp>
+      <p:sp>
+        <p:nvSpPr>
+          <p:cNvPr id="4" name="Slide Number Placeholder 3"/>
+          <p:cNvSpPr>
+            <a:spLocks noGrp="1"/>
+          </p:cNvSpPr>
+          <p:nvPr>
+            <p:ph type="sldNum" sz="quarter" idx="10"/>
+          </p:nvPr>
+        </p:nvSpPr>
+        <p:spPr/>
+        <p:txBody>
+          <a:bodyPr/>
+          <a:lstStyle/>
+          <a:p>
+            <a:pPr>
+              <a:defRPr/>
+            </a:pPr>
+            <a:fld id="{8B2AE985-CEB1-47DB-AC87-FA613AA66B3B}" type="slidenum">
+              <a:rPr lang="en-US" smtClean="0"/>
+              <a:pPr>
+                <a:defRPr/>
+              </a:pPr>
+              <a:t>22</a:t>
+            </a:fld>
+            <a:endParaRPr lang="en-US" dirty="0"/>
+          </a:p>
+        </p:txBody>
+      </p:sp>
+    </p:spTree>
+  </p:cSld>
+  <p:clrMapOvr>
+    <a:masterClrMapping/>
+  </p:clrMapOvr>
+</p:notes>
+</file>
+
+<file path=ppt/notesSlides/notesSlide23.xml><?xml version="1.0" encoding="utf-8"?>
+<p:notes xmlns:a="http://schemas.openxmlformats.org/drawingml/2006/main" xmlns:r="http://schemas.openxmlformats.org/officeDocument/2006/relationships" xmlns:p="http://schemas.openxmlformats.org/presentationml/2006/main">
+  <p:cSld>
+    <p:spTree>
+      <p:nvGrpSpPr>
+        <p:cNvPr id="1" name=""/>
+        <p:cNvGrpSpPr/>
+        <p:nvPr/>
+      </p:nvGrpSpPr>
+      <p:grpSpPr>
+        <a:xfrm>
+          <a:off x="0" y="0"/>
+          <a:ext cx="0" cy="0"/>
+          <a:chOff x="0" y="0"/>
+          <a:chExt cx="0" cy="0"/>
+        </a:xfrm>
+      </p:grpSpPr>
+      <p:sp>
+        <p:nvSpPr>
+          <p:cNvPr id="2" name="Slide Image Placeholder 1"/>
+          <p:cNvSpPr>
+            <a:spLocks noGrp="1" noRot="1" noChangeAspect="1"/>
+          </p:cNvSpPr>
+          <p:nvPr>
+            <p:ph type="sldImg"/>
+          </p:nvPr>
+        </p:nvSpPr>
+        <p:spPr/>
+      </p:sp>
+      <p:sp>
+        <p:nvSpPr>
+          <p:cNvPr id="3" name="Notes Placeholder 2"/>
+          <p:cNvSpPr>
+            <a:spLocks noGrp="1"/>
+          </p:cNvSpPr>
+          <p:nvPr>
+            <p:ph type="body" idx="1"/>
+          </p:nvPr>
+        </p:nvSpPr>
+        <p:spPr/>
+        <p:txBody>
+          <a:bodyPr>
+            <a:normAutofit/>
+          </a:bodyPr>
+          <a:lstStyle/>
+          <a:p>
+            <a:endParaRPr lang="en-US"/>
+          </a:p>
+        </p:txBody>
+      </p:sp>
+      <p:sp>
+        <p:nvSpPr>
+          <p:cNvPr id="4" name="Slide Number Placeholder 3"/>
+          <p:cNvSpPr>
+            <a:spLocks noGrp="1"/>
+          </p:cNvSpPr>
+          <p:nvPr>
+            <p:ph type="sldNum" sz="quarter" idx="10"/>
+          </p:nvPr>
+        </p:nvSpPr>
+        <p:spPr/>
+        <p:txBody>
+          <a:bodyPr/>
+          <a:lstStyle/>
+          <a:p>
+            <a:pPr>
+              <a:defRPr/>
+            </a:pPr>
+            <a:fld id="{8B2AE985-CEB1-47DB-AC87-FA613AA66B3B}" type="slidenum">
+              <a:rPr lang="en-US" smtClean="0"/>
+              <a:pPr>
+                <a:defRPr/>
+              </a:pPr>
+              <a:t>23</a:t>
+            </a:fld>
+            <a:endParaRPr lang="en-US" dirty="0"/>
+          </a:p>
+        </p:txBody>
+      </p:sp>
+    </p:spTree>
+  </p:cSld>
+  <p:clrMapOvr>
+    <a:masterClrMapping/>
+  </p:clrMapOvr>
+</p:notes>
+</file>
+
+<file path=ppt/notesSlides/notesSlide24.xml><?xml version="1.0" encoding="utf-8"?>
+<p:notes xmlns:a="http://schemas.openxmlformats.org/drawingml/2006/main" xmlns:r="http://schemas.openxmlformats.org/officeDocument/2006/relationships" xmlns:p="http://schemas.openxmlformats.org/presentationml/2006/main">
+  <p:cSld>
+    <p:spTree>
+      <p:nvGrpSpPr>
+        <p:cNvPr id="1" name=""/>
+        <p:cNvGrpSpPr/>
+        <p:nvPr/>
+      </p:nvGrpSpPr>
+      <p:grpSpPr>
+        <a:xfrm>
+          <a:off x="0" y="0"/>
+          <a:ext cx="0" cy="0"/>
+          <a:chOff x="0" y="0"/>
+          <a:chExt cx="0" cy="0"/>
+        </a:xfrm>
+      </p:grpSpPr>
+      <p:sp>
+        <p:nvSpPr>
+          <p:cNvPr id="2" name="Slide Image Placeholder 1"/>
+          <p:cNvSpPr>
+            <a:spLocks noGrp="1" noRot="1" noChangeAspect="1"/>
+          </p:cNvSpPr>
+          <p:nvPr>
+            <p:ph type="sldImg"/>
+          </p:nvPr>
+        </p:nvSpPr>
+        <p:spPr/>
+      </p:sp>
+      <p:sp>
+        <p:nvSpPr>
+          <p:cNvPr id="3" name="Notes Placeholder 2"/>
+          <p:cNvSpPr>
+            <a:spLocks noGrp="1"/>
+          </p:cNvSpPr>
+          <p:nvPr>
+            <p:ph type="body" idx="1"/>
+          </p:nvPr>
+        </p:nvSpPr>
+        <p:spPr/>
+        <p:txBody>
+          <a:bodyPr>
+            <a:normAutofit/>
+          </a:bodyPr>
+          <a:lstStyle/>
+          <a:p>
+            <a:endParaRPr lang="en-US"/>
+          </a:p>
+        </p:txBody>
+      </p:sp>
+      <p:sp>
+        <p:nvSpPr>
+          <p:cNvPr id="4" name="Slide Number Placeholder 3"/>
+          <p:cNvSpPr>
+            <a:spLocks noGrp="1"/>
+          </p:cNvSpPr>
+          <p:nvPr>
+            <p:ph type="sldNum" sz="quarter" idx="10"/>
+          </p:nvPr>
+        </p:nvSpPr>
+        <p:spPr/>
+        <p:txBody>
+          <a:bodyPr/>
+          <a:lstStyle/>
+          <a:p>
+            <a:pPr>
+              <a:defRPr/>
+            </a:pPr>
+            <a:fld id="{8B2AE985-CEB1-47DB-AC87-FA613AA66B3B}" type="slidenum">
+              <a:rPr lang="en-US" smtClean="0"/>
+              <a:pPr>
+                <a:defRPr/>
+              </a:pPr>
+              <a:t>24</a:t>
+            </a:fld>
+            <a:endParaRPr lang="en-US" dirty="0"/>
+          </a:p>
+        </p:txBody>
+      </p:sp>
+    </p:spTree>
+  </p:cSld>
+  <p:clrMapOvr>
+    <a:masterClrMapping/>
+  </p:clrMapOvr>
+</p:notes>
+</file>
+
+<file path=ppt/notesSlides/notesSlide25.xml><?xml version="1.0" encoding="utf-8"?>
+<p:notes xmlns:a="http://schemas.openxmlformats.org/drawingml/2006/main" xmlns:r="http://schemas.openxmlformats.org/officeDocument/2006/relationships" xmlns:p="http://schemas.openxmlformats.org/presentationml/2006/main">
+  <p:cSld>
+    <p:spTree>
+      <p:nvGrpSpPr>
+        <p:cNvPr id="1" name=""/>
+        <p:cNvGrpSpPr/>
+        <p:nvPr/>
+      </p:nvGrpSpPr>
+      <p:grpSpPr>
+        <a:xfrm>
+          <a:off x="0" y="0"/>
+          <a:ext cx="0" cy="0"/>
+          <a:chOff x="0" y="0"/>
+          <a:chExt cx="0" cy="0"/>
+        </a:xfrm>
+      </p:grpSpPr>
+      <p:sp>
+        <p:nvSpPr>
+          <p:cNvPr id="2" name="Slide Image Placeholder 1"/>
+          <p:cNvSpPr>
+            <a:spLocks noGrp="1" noRot="1" noChangeAspect="1"/>
+          </p:cNvSpPr>
+          <p:nvPr>
+            <p:ph type="sldImg"/>
+          </p:nvPr>
+        </p:nvSpPr>
+        <p:spPr/>
+      </p:sp>
+      <p:sp>
+        <p:nvSpPr>
+          <p:cNvPr id="3" name="Notes Placeholder 2"/>
+          <p:cNvSpPr>
+            <a:spLocks noGrp="1"/>
+          </p:cNvSpPr>
+          <p:nvPr>
+            <p:ph type="body" idx="1"/>
+          </p:nvPr>
+        </p:nvSpPr>
+        <p:spPr/>
+        <p:txBody>
+          <a:bodyPr>
+            <a:normAutofit/>
+          </a:bodyPr>
+          <a:lstStyle/>
+          <a:p>
+            <a:endParaRPr lang="en-US"/>
+          </a:p>
+        </p:txBody>
+      </p:sp>
+      <p:sp>
+        <p:nvSpPr>
+          <p:cNvPr id="4" name="Slide Number Placeholder 3"/>
+          <p:cNvSpPr>
+            <a:spLocks noGrp="1"/>
+          </p:cNvSpPr>
+          <p:nvPr>
+            <p:ph type="sldNum" sz="quarter" idx="10"/>
+          </p:nvPr>
+        </p:nvSpPr>
+        <p:spPr/>
+        <p:txBody>
+          <a:bodyPr/>
+          <a:lstStyle/>
+          <a:p>
+            <a:pPr>
+              <a:defRPr/>
+            </a:pPr>
+            <a:fld id="{8B2AE985-CEB1-47DB-AC87-FA613AA66B3B}" type="slidenum">
+              <a:rPr lang="en-US" smtClean="0"/>
+              <a:pPr>
+                <a:defRPr/>
+              </a:pPr>
+              <a:t>25</a:t>
+            </a:fld>
+            <a:endParaRPr lang="en-US" dirty="0"/>
+          </a:p>
+        </p:txBody>
+      </p:sp>
+    </p:spTree>
+  </p:cSld>
+  <p:clrMapOvr>
+    <a:masterClrMapping/>
+  </p:clrMapOvr>
+</p:notes>
+</file>
+
+<file path=ppt/notesSlides/notesSlide26.xml><?xml version="1.0" encoding="utf-8"?>
+<p:notes xmlns:a="http://schemas.openxmlformats.org/drawingml/2006/main" xmlns:r="http://schemas.openxmlformats.org/officeDocument/2006/relationships" xmlns:p="http://schemas.openxmlformats.org/presentationml/2006/main">
+  <p:cSld>
+    <p:spTree>
+      <p:nvGrpSpPr>
+        <p:cNvPr id="1" name=""/>
+        <p:cNvGrpSpPr/>
+        <p:nvPr/>
+      </p:nvGrpSpPr>
+      <p:grpSpPr>
+        <a:xfrm>
+          <a:off x="0" y="0"/>
+          <a:ext cx="0" cy="0"/>
+          <a:chOff x="0" y="0"/>
+          <a:chExt cx="0" cy="0"/>
+        </a:xfrm>
+      </p:grpSpPr>
+      <p:sp>
+        <p:nvSpPr>
+          <p:cNvPr id="2" name="Slide Image Placeholder 1"/>
+          <p:cNvSpPr>
+            <a:spLocks noGrp="1" noRot="1" noChangeAspect="1"/>
+          </p:cNvSpPr>
+          <p:nvPr>
+            <p:ph type="sldImg"/>
+          </p:nvPr>
+        </p:nvSpPr>
+        <p:spPr/>
+      </p:sp>
+      <p:sp>
+        <p:nvSpPr>
+          <p:cNvPr id="3" name="Notes Placeholder 2"/>
+          <p:cNvSpPr>
+            <a:spLocks noGrp="1"/>
+          </p:cNvSpPr>
+          <p:nvPr>
+            <p:ph type="body" idx="1"/>
+          </p:nvPr>
+        </p:nvSpPr>
+        <p:spPr/>
+        <p:txBody>
+          <a:bodyPr>
+            <a:normAutofit/>
+          </a:bodyPr>
+          <a:lstStyle/>
+          <a:p>
+            <a:endParaRPr lang="en-US"/>
+          </a:p>
+        </p:txBody>
+      </p:sp>
+      <p:sp>
+        <p:nvSpPr>
+          <p:cNvPr id="4" name="Slide Number Placeholder 3"/>
+          <p:cNvSpPr>
+            <a:spLocks noGrp="1"/>
+          </p:cNvSpPr>
+          <p:nvPr>
+            <p:ph type="sldNum" sz="quarter" idx="10"/>
+          </p:nvPr>
+        </p:nvSpPr>
+        <p:spPr/>
+        <p:txBody>
+          <a:bodyPr/>
+          <a:lstStyle/>
+          <a:p>
+            <a:pPr>
+              <a:defRPr/>
+            </a:pPr>
+            <a:fld id="{8B2AE985-CEB1-47DB-AC87-FA613AA66B3B}" type="slidenum">
+              <a:rPr lang="en-US" smtClean="0"/>
+              <a:pPr>
+                <a:defRPr/>
+              </a:pPr>
+              <a:t>26</a:t>
+            </a:fld>
+            <a:endParaRPr lang="en-US" dirty="0"/>
+          </a:p>
+        </p:txBody>
+      </p:sp>
+    </p:spTree>
+  </p:cSld>
+  <p:clrMapOvr>
+    <a:masterClrMapping/>
+  </p:clrMapOvr>
+</p:notes>
+</file>
+
+<file path=ppt/notesSlides/notesSlide27.xml><?xml version="1.0" encoding="utf-8"?>
+<p:notes xmlns:a="http://schemas.openxmlformats.org/drawingml/2006/main" xmlns:r="http://schemas.openxmlformats.org/officeDocument/2006/relationships" xmlns:p="http://schemas.openxmlformats.org/presentationml/2006/main">
+  <p:cSld>
+    <p:spTree>
+      <p:nvGrpSpPr>
+        <p:cNvPr id="1" name=""/>
+        <p:cNvGrpSpPr/>
+        <p:nvPr/>
+      </p:nvGrpSpPr>
+      <p:grpSpPr>
+        <a:xfrm>
+          <a:off x="0" y="0"/>
+          <a:ext cx="0" cy="0"/>
+          <a:chOff x="0" y="0"/>
+          <a:chExt cx="0" cy="0"/>
+        </a:xfrm>
+      </p:grpSpPr>
+      <p:sp>
+        <p:nvSpPr>
+          <p:cNvPr id="2" name="Slide Image Placeholder 1"/>
+          <p:cNvSpPr>
+            <a:spLocks noGrp="1" noRot="1" noChangeAspect="1"/>
+          </p:cNvSpPr>
+          <p:nvPr>
+            <p:ph type="sldImg"/>
+          </p:nvPr>
+        </p:nvSpPr>
+        <p:spPr/>
+      </p:sp>
+      <p:sp>
+        <p:nvSpPr>
+          <p:cNvPr id="3" name="Notes Placeholder 2"/>
+          <p:cNvSpPr>
+            <a:spLocks noGrp="1"/>
+          </p:cNvSpPr>
+          <p:nvPr>
+            <p:ph type="body" idx="1"/>
+          </p:nvPr>
+        </p:nvSpPr>
+        <p:spPr/>
+        <p:txBody>
+          <a:bodyPr>
+            <a:normAutofit/>
+          </a:bodyPr>
+          <a:lstStyle/>
+          <a:p>
+            <a:endParaRPr lang="en-US"/>
+          </a:p>
+        </p:txBody>
+      </p:sp>
+      <p:sp>
+        <p:nvSpPr>
+          <p:cNvPr id="4" name="Slide Number Placeholder 3"/>
+          <p:cNvSpPr>
+            <a:spLocks noGrp="1"/>
+          </p:cNvSpPr>
+          <p:nvPr>
+            <p:ph type="sldNum" sz="quarter" idx="10"/>
+          </p:nvPr>
+        </p:nvSpPr>
+        <p:spPr/>
+        <p:txBody>
+          <a:bodyPr/>
+          <a:lstStyle/>
+          <a:p>
+            <a:pPr>
+              <a:defRPr/>
+            </a:pPr>
+            <a:fld id="{8B2AE985-CEB1-47DB-AC87-FA613AA66B3B}" type="slidenum">
+              <a:rPr lang="en-US" smtClean="0"/>
+              <a:pPr>
+                <a:defRPr/>
+              </a:pPr>
+              <a:t>27</a:t>
+            </a:fld>
+            <a:endParaRPr lang="en-US" dirty="0"/>
+          </a:p>
+        </p:txBody>
+      </p:sp>
+    </p:spTree>
+  </p:cSld>
+  <p:clrMapOvr>
+    <a:masterClrMapping/>
+  </p:clrMapOvr>
+</p:notes>
+</file>
+
+<file path=ppt/notesSlides/notesSlide28.xml><?xml version="1.0" encoding="utf-8"?>
+<p:notes xmlns:a="http://schemas.openxmlformats.org/drawingml/2006/main" xmlns:r="http://schemas.openxmlformats.org/officeDocument/2006/relationships" xmlns:p="http://schemas.openxmlformats.org/presentationml/2006/main">
+  <p:cSld>
+    <p:spTree>
+      <p:nvGrpSpPr>
+        <p:cNvPr id="1" name=""/>
+        <p:cNvGrpSpPr/>
+        <p:nvPr/>
+      </p:nvGrpSpPr>
+      <p:grpSpPr>
+        <a:xfrm>
+          <a:off x="0" y="0"/>
+          <a:ext cx="0" cy="0"/>
+          <a:chOff x="0" y="0"/>
+          <a:chExt cx="0" cy="0"/>
+        </a:xfrm>
+      </p:grpSpPr>
+      <p:sp>
+        <p:nvSpPr>
+          <p:cNvPr id="2" name="Slide Image Placeholder 1"/>
+          <p:cNvSpPr>
+            <a:spLocks noGrp="1" noRot="1" noChangeAspect="1"/>
+          </p:cNvSpPr>
+          <p:nvPr>
+            <p:ph type="sldImg"/>
+          </p:nvPr>
+        </p:nvSpPr>
+        <p:spPr/>
+      </p:sp>
+      <p:sp>
+        <p:nvSpPr>
+          <p:cNvPr id="3" name="Notes Placeholder 2"/>
+          <p:cNvSpPr>
+            <a:spLocks noGrp="1"/>
+          </p:cNvSpPr>
+          <p:nvPr>
+            <p:ph type="body" idx="1"/>
+          </p:nvPr>
+        </p:nvSpPr>
+        <p:spPr/>
+        <p:txBody>
+          <a:bodyPr>
+            <a:normAutofit/>
+          </a:bodyPr>
+          <a:lstStyle/>
+          <a:p>
+            <a:endParaRPr lang="en-US"/>
+          </a:p>
+        </p:txBody>
+      </p:sp>
+      <p:sp>
+        <p:nvSpPr>
+          <p:cNvPr id="4" name="Slide Number Placeholder 3"/>
+          <p:cNvSpPr>
+            <a:spLocks noGrp="1"/>
+          </p:cNvSpPr>
+          <p:nvPr>
+            <p:ph type="sldNum" sz="quarter" idx="10"/>
+          </p:nvPr>
+        </p:nvSpPr>
+        <p:spPr/>
+        <p:txBody>
+          <a:bodyPr/>
+          <a:lstStyle/>
+          <a:p>
+            <a:pPr>
+              <a:defRPr/>
+            </a:pPr>
+            <a:fld id="{8B2AE985-CEB1-47DB-AC87-FA613AA66B3B}" type="slidenum">
+              <a:rPr lang="en-US" smtClean="0"/>
+              <a:pPr>
+                <a:defRPr/>
+              </a:pPr>
+              <a:t>28</a:t>
+            </a:fld>
+            <a:endParaRPr lang="en-US" dirty="0"/>
+          </a:p>
+        </p:txBody>
+      </p:sp>
+    </p:spTree>
+  </p:cSld>
+  <p:clrMapOvr>
+    <a:masterClrMapping/>
+  </p:clrMapOvr>
+</p:notes>
+</file>
+
+<file path=ppt/notesSlides/notesSlide29.xml><?xml version="1.0" encoding="utf-8"?>
+<p:notes xmlns:a="http://schemas.openxmlformats.org/drawingml/2006/main" xmlns:r="http://schemas.openxmlformats.org/officeDocument/2006/relationships" xmlns:p="http://schemas.openxmlformats.org/presentationml/2006/main">
+  <p:cSld>
+    <p:spTree>
+      <p:nvGrpSpPr>
+        <p:cNvPr id="1" name=""/>
+        <p:cNvGrpSpPr/>
+        <p:nvPr/>
+      </p:nvGrpSpPr>
+      <p:grpSpPr>
+        <a:xfrm>
+          <a:off x="0" y="0"/>
+          <a:ext cx="0" cy="0"/>
+          <a:chOff x="0" y="0"/>
+          <a:chExt cx="0" cy="0"/>
+        </a:xfrm>
+      </p:grpSpPr>
+      <p:sp>
+        <p:nvSpPr>
+          <p:cNvPr id="2" name="Slide Image Placeholder 1"/>
+          <p:cNvSpPr>
+            <a:spLocks noGrp="1" noRot="1" noChangeAspect="1"/>
+          </p:cNvSpPr>
+          <p:nvPr>
+            <p:ph type="sldImg"/>
+          </p:nvPr>
+        </p:nvSpPr>
+        <p:spPr/>
+      </p:sp>
+      <p:sp>
+        <p:nvSpPr>
+          <p:cNvPr id="3" name="Notes Placeholder 2"/>
+          <p:cNvSpPr>
+            <a:spLocks noGrp="1"/>
+          </p:cNvSpPr>
+          <p:nvPr>
+            <p:ph type="body" idx="1"/>
+          </p:nvPr>
+        </p:nvSpPr>
+        <p:spPr/>
+        <p:txBody>
+          <a:bodyPr>
+            <a:normAutofit/>
+          </a:bodyPr>
+          <a:lstStyle/>
+          <a:p>
+            <a:endParaRPr lang="en-US"/>
+          </a:p>
+        </p:txBody>
+      </p:sp>
+      <p:sp>
+        <p:nvSpPr>
+          <p:cNvPr id="4" name="Slide Number Placeholder 3"/>
+          <p:cNvSpPr>
+            <a:spLocks noGrp="1"/>
+          </p:cNvSpPr>
+          <p:nvPr>
+            <p:ph type="sldNum" sz="quarter" idx="10"/>
+          </p:nvPr>
+        </p:nvSpPr>
+        <p:spPr/>
+        <p:txBody>
+          <a:bodyPr/>
+          <a:lstStyle/>
+          <a:p>
+            <a:pPr>
+              <a:defRPr/>
+            </a:pPr>
+            <a:fld id="{8B2AE985-CEB1-47DB-AC87-FA613AA66B3B}" type="slidenum">
+              <a:rPr lang="en-US" smtClean="0"/>
+              <a:pPr>
+                <a:defRPr/>
+              </a:pPr>
+              <a:t>29</a:t>
+            </a:fld>
+            <a:endParaRPr lang="en-US" dirty="0"/>
+          </a:p>
+        </p:txBody>
+      </p:sp>
+    </p:spTree>
+  </p:cSld>
+  <p:clrMapOvr>
+    <a:masterClrMapping/>
+  </p:clrMapOvr>
+</p:notes>
+</file>
+
+<file path=ppt/notesSlides/notesSlide3.xml><?xml version="1.0" encoding="utf-8"?>
+<p:notes xmlns:a="http://schemas.openxmlformats.org/drawingml/2006/main" xmlns:r="http://schemas.openxmlformats.org/officeDocument/2006/relationships" xmlns:p="http://schemas.openxmlformats.org/presentationml/2006/main">
+  <p:cSld>
+    <p:spTree>
+      <p:nvGrpSpPr>
+        <p:cNvPr id="1" name=""/>
+        <p:cNvGrpSpPr/>
+        <p:nvPr/>
+      </p:nvGrpSpPr>
+      <p:grpSpPr>
+        <a:xfrm>
+          <a:off x="0" y="0"/>
+          <a:ext cx="0" cy="0"/>
+          <a:chOff x="0" y="0"/>
+          <a:chExt cx="0" cy="0"/>
+        </a:xfrm>
+      </p:grpSpPr>
+      <p:sp>
+        <p:nvSpPr>
+          <p:cNvPr id="2" name="Slide Image Placeholder 1"/>
+          <p:cNvSpPr>
+            <a:spLocks noGrp="1" noRot="1" noChangeAspect="1"/>
+          </p:cNvSpPr>
+          <p:nvPr>
+            <p:ph type="sldImg"/>
+          </p:nvPr>
+        </p:nvSpPr>
+        <p:spPr/>
+      </p:sp>
+      <p:sp>
+        <p:nvSpPr>
+          <p:cNvPr id="3" name="Notes Placeholder 2"/>
+          <p:cNvSpPr>
+            <a:spLocks noGrp="1"/>
+          </p:cNvSpPr>
+          <p:nvPr>
+            <p:ph type="body" idx="1"/>
+          </p:nvPr>
+        </p:nvSpPr>
+        <p:spPr/>
+        <p:txBody>
+          <a:bodyPr>
+            <a:normAutofit/>
+          </a:bodyPr>
+          <a:lstStyle/>
+          <a:p>
+            <a:endParaRPr lang="en-US"/>
+          </a:p>
+        </p:txBody>
+      </p:sp>
+      <p:sp>
+        <p:nvSpPr>
+          <p:cNvPr id="4" name="Slide Number Placeholder 3"/>
+          <p:cNvSpPr>
+            <a:spLocks noGrp="1"/>
+          </p:cNvSpPr>
+          <p:nvPr>
+            <p:ph type="sldNum" sz="quarter" idx="10"/>
+          </p:nvPr>
+        </p:nvSpPr>
+        <p:spPr/>
+        <p:txBody>
+          <a:bodyPr/>
+          <a:lstStyle/>
+          <a:p>
+            <a:pPr>
+              <a:defRPr/>
+            </a:pPr>
+            <a:fld id="{8B2AE985-CEB1-47DB-AC87-FA613AA66B3B}" type="slidenum">
+              <a:rPr lang="en-US" smtClean="0"/>
+              <a:pPr>
+                <a:defRPr/>
+              </a:pPr>
+              <a:t>3</a:t>
+            </a:fld>
+            <a:endParaRPr lang="en-US" dirty="0"/>
+          </a:p>
+        </p:txBody>
+      </p:sp>
+    </p:spTree>
+  </p:cSld>
+  <p:clrMapOvr>
+    <a:masterClrMapping/>
+  </p:clrMapOvr>
+</p:notes>
+</file>
+
+<file path=ppt/notesSlides/notesSlide30.xml><?xml version="1.0" encoding="utf-8"?>
+<p:notes xmlns:a="http://schemas.openxmlformats.org/drawingml/2006/main" xmlns:r="http://schemas.openxmlformats.org/officeDocument/2006/relationships" xmlns:p="http://schemas.openxmlformats.org/presentationml/2006/main">
+  <p:cSld>
+    <p:spTree>
+      <p:nvGrpSpPr>
+        <p:cNvPr id="1" name=""/>
+        <p:cNvGrpSpPr/>
+        <p:nvPr/>
+      </p:nvGrpSpPr>
+      <p:grpSpPr>
+        <a:xfrm>
+          <a:off x="0" y="0"/>
+          <a:ext cx="0" cy="0"/>
+          <a:chOff x="0" y="0"/>
+          <a:chExt cx="0" cy="0"/>
+        </a:xfrm>
+      </p:grpSpPr>
+      <p:sp>
+        <p:nvSpPr>
+          <p:cNvPr id="2" name="Slide Image Placeholder 1"/>
+          <p:cNvSpPr>
+            <a:spLocks noGrp="1" noRot="1" noChangeAspect="1"/>
+          </p:cNvSpPr>
+          <p:nvPr>
+            <p:ph type="sldImg"/>
+          </p:nvPr>
+        </p:nvSpPr>
+        <p:spPr/>
+      </p:sp>
+      <p:sp>
+        <p:nvSpPr>
+          <p:cNvPr id="3" name="Notes Placeholder 2"/>
+          <p:cNvSpPr>
+            <a:spLocks noGrp="1"/>
+          </p:cNvSpPr>
+          <p:nvPr>
+            <p:ph type="body" idx="1"/>
+          </p:nvPr>
+        </p:nvSpPr>
+        <p:spPr/>
+        <p:txBody>
+          <a:bodyPr>
+            <a:normAutofit/>
+          </a:bodyPr>
+          <a:lstStyle/>
+          <a:p>
+            <a:endParaRPr lang="en-US"/>
+          </a:p>
+        </p:txBody>
+      </p:sp>
+      <p:sp>
+        <p:nvSpPr>
+          <p:cNvPr id="4" name="Slide Number Placeholder 3"/>
+          <p:cNvSpPr>
+            <a:spLocks noGrp="1"/>
+          </p:cNvSpPr>
+          <p:nvPr>
+            <p:ph type="sldNum" sz="quarter" idx="10"/>
+          </p:nvPr>
+        </p:nvSpPr>
+        <p:spPr/>
+        <p:txBody>
+          <a:bodyPr/>
+          <a:lstStyle/>
+          <a:p>
+            <a:pPr>
+              <a:defRPr/>
+            </a:pPr>
+            <a:fld id="{8B2AE985-CEB1-47DB-AC87-FA613AA66B3B}" type="slidenum">
+              <a:rPr lang="en-US" smtClean="0"/>
+              <a:pPr>
+                <a:defRPr/>
+              </a:pPr>
+              <a:t>30</a:t>
+            </a:fld>
+            <a:endParaRPr lang="en-US" dirty="0"/>
+          </a:p>
+        </p:txBody>
+      </p:sp>
+    </p:spTree>
+  </p:cSld>
+  <p:clrMapOvr>
+    <a:masterClrMapping/>
+  </p:clrMapOvr>
+</p:notes>
+</file>
+
+<file path=ppt/notesSlides/notesSlide31.xml><?xml version="1.0" encoding="utf-8"?>
+<p:notes xmlns:a="http://schemas.openxmlformats.org/drawingml/2006/main" xmlns:r="http://schemas.openxmlformats.org/officeDocument/2006/relationships" xmlns:p="http://schemas.openxmlformats.org/presentationml/2006/main">
+  <p:cSld>
+    <p:spTree>
+      <p:nvGrpSpPr>
+        <p:cNvPr id="1" name=""/>
+        <p:cNvGrpSpPr/>
+        <p:nvPr/>
+      </p:nvGrpSpPr>
+      <p:grpSpPr>
+        <a:xfrm>
+          <a:off x="0" y="0"/>
+          <a:ext cx="0" cy="0"/>
+          <a:chOff x="0" y="0"/>
+          <a:chExt cx="0" cy="0"/>
+        </a:xfrm>
+      </p:grpSpPr>
+      <p:sp>
+        <p:nvSpPr>
+          <p:cNvPr id="2" name="Slide Image Placeholder 1"/>
+          <p:cNvSpPr>
+            <a:spLocks noGrp="1" noRot="1" noChangeAspect="1"/>
+          </p:cNvSpPr>
+          <p:nvPr>
+            <p:ph type="sldImg"/>
+          </p:nvPr>
+        </p:nvSpPr>
+        <p:spPr/>
+      </p:sp>
+      <p:sp>
+        <p:nvSpPr>
+          <p:cNvPr id="3" name="Notes Placeholder 2"/>
+          <p:cNvSpPr>
+            <a:spLocks noGrp="1"/>
+          </p:cNvSpPr>
+          <p:nvPr>
+            <p:ph type="body" idx="1"/>
+          </p:nvPr>
+        </p:nvSpPr>
+        <p:spPr/>
+        <p:txBody>
+          <a:bodyPr>
+            <a:normAutofit/>
+          </a:bodyPr>
+          <a:lstStyle/>
+          <a:p>
+            <a:endParaRPr lang="en-US"/>
+          </a:p>
+        </p:txBody>
+      </p:sp>
+      <p:sp>
+        <p:nvSpPr>
+          <p:cNvPr id="4" name="Slide Number Placeholder 3"/>
+          <p:cNvSpPr>
+            <a:spLocks noGrp="1"/>
+          </p:cNvSpPr>
+          <p:nvPr>
+            <p:ph type="sldNum" sz="quarter" idx="10"/>
+          </p:nvPr>
+        </p:nvSpPr>
+        <p:spPr/>
+        <p:txBody>
+          <a:bodyPr/>
+          <a:lstStyle/>
+          <a:p>
+            <a:pPr>
+              <a:defRPr/>
+            </a:pPr>
+            <a:fld id="{8B2AE985-CEB1-47DB-AC87-FA613AA66B3B}" type="slidenum">
+              <a:rPr lang="en-US" smtClean="0"/>
+              <a:pPr>
+                <a:defRPr/>
+              </a:pPr>
+              <a:t>31</a:t>
+            </a:fld>
+            <a:endParaRPr lang="en-US" dirty="0"/>
+          </a:p>
+        </p:txBody>
+      </p:sp>
+    </p:spTree>
+  </p:cSld>
+  <p:clrMapOvr>
+    <a:masterClrMapping/>
+  </p:clrMapOvr>
+</p:notes>
+</file>
+
+<file path=ppt/notesSlides/notesSlide32.xml><?xml version="1.0" encoding="utf-8"?>
+<p:notes xmlns:a="http://schemas.openxmlformats.org/drawingml/2006/main" xmlns:r="http://schemas.openxmlformats.org/officeDocument/2006/relationships" xmlns:p="http://schemas.openxmlformats.org/presentationml/2006/main">
+  <p:cSld>
+    <p:spTree>
+      <p:nvGrpSpPr>
+        <p:cNvPr id="1" name=""/>
+        <p:cNvGrpSpPr/>
+        <p:nvPr/>
+      </p:nvGrpSpPr>
+      <p:grpSpPr>
+        <a:xfrm>
+          <a:off x="0" y="0"/>
+          <a:ext cx="0" cy="0"/>
+          <a:chOff x="0" y="0"/>
+          <a:chExt cx="0" cy="0"/>
+        </a:xfrm>
+      </p:grpSpPr>
+      <p:sp>
+        <p:nvSpPr>
+          <p:cNvPr id="2" name="Slide Image Placeholder 1"/>
+          <p:cNvSpPr>
+            <a:spLocks noGrp="1" noRot="1" noChangeAspect="1"/>
+          </p:cNvSpPr>
+          <p:nvPr>
+            <p:ph type="sldImg"/>
+          </p:nvPr>
+        </p:nvSpPr>
+        <p:spPr/>
+      </p:sp>
+      <p:sp>
+        <p:nvSpPr>
+          <p:cNvPr id="3" name="Notes Placeholder 2"/>
+          <p:cNvSpPr>
+            <a:spLocks noGrp="1"/>
+          </p:cNvSpPr>
+          <p:nvPr>
+            <p:ph type="body" idx="1"/>
+          </p:nvPr>
+        </p:nvSpPr>
+        <p:spPr/>
+        <p:txBody>
+          <a:bodyPr>
+            <a:normAutofit/>
+          </a:bodyPr>
+          <a:lstStyle/>
+          <a:p>
+            <a:endParaRPr lang="en-US"/>
+          </a:p>
+        </p:txBody>
+      </p:sp>
+      <p:sp>
+        <p:nvSpPr>
+          <p:cNvPr id="4" name="Slide Number Placeholder 3"/>
+          <p:cNvSpPr>
+            <a:spLocks noGrp="1"/>
+          </p:cNvSpPr>
+          <p:nvPr>
+            <p:ph type="sldNum" sz="quarter" idx="10"/>
+          </p:nvPr>
+        </p:nvSpPr>
+        <p:spPr/>
+        <p:txBody>
+          <a:bodyPr/>
+          <a:lstStyle/>
+          <a:p>
+            <a:pPr>
+              <a:defRPr/>
+            </a:pPr>
+            <a:fld id="{8B2AE985-CEB1-47DB-AC87-FA613AA66B3B}" type="slidenum">
+              <a:rPr lang="en-US" smtClean="0"/>
+              <a:pPr>
+                <a:defRPr/>
+              </a:pPr>
+              <a:t>32</a:t>
+            </a:fld>
+            <a:endParaRPr lang="en-US" dirty="0"/>
+          </a:p>
+        </p:txBody>
+      </p:sp>
+    </p:spTree>
+  </p:cSld>
+  <p:clrMapOvr>
+    <a:masterClrMapping/>
+  </p:clrMapOvr>
+</p:notes>
+</file>
+
+<file path=ppt/notesSlides/notesSlide33.xml><?xml version="1.0" encoding="utf-8"?>
+<p:notes xmlns:a="http://schemas.openxmlformats.org/drawingml/2006/main" xmlns:r="http://schemas.openxmlformats.org/officeDocument/2006/relationships" xmlns:p="http://schemas.openxmlformats.org/presentationml/2006/main">
+  <p:cSld>
+    <p:spTree>
+      <p:nvGrpSpPr>
+        <p:cNvPr id="1" name=""/>
+        <p:cNvGrpSpPr/>
+        <p:nvPr/>
+      </p:nvGrpSpPr>
+      <p:grpSpPr>
+        <a:xfrm>
+          <a:off x="0" y="0"/>
+          <a:ext cx="0" cy="0"/>
+          <a:chOff x="0" y="0"/>
+          <a:chExt cx="0" cy="0"/>
+        </a:xfrm>
+      </p:grpSpPr>
+      <p:sp>
+        <p:nvSpPr>
+          <p:cNvPr id="2" name="Slide Image Placeholder 1"/>
+          <p:cNvSpPr>
+            <a:spLocks noGrp="1" noRot="1" noChangeAspect="1"/>
+          </p:cNvSpPr>
+          <p:nvPr>
+            <p:ph type="sldImg"/>
+          </p:nvPr>
+        </p:nvSpPr>
+        <p:spPr/>
+      </p:sp>
+      <p:sp>
+        <p:nvSpPr>
+          <p:cNvPr id="3" name="Notes Placeholder 2"/>
+          <p:cNvSpPr>
+            <a:spLocks noGrp="1"/>
+          </p:cNvSpPr>
+          <p:nvPr>
+            <p:ph type="body" idx="1"/>
+          </p:nvPr>
+        </p:nvSpPr>
+        <p:spPr/>
+        <p:txBody>
+          <a:bodyPr>
+            <a:normAutofit/>
+          </a:bodyPr>
+          <a:lstStyle/>
+          <a:p>
+            <a:endParaRPr lang="en-US"/>
+          </a:p>
+        </p:txBody>
+      </p:sp>
+      <p:sp>
+        <p:nvSpPr>
+          <p:cNvPr id="4" name="Slide Number Placeholder 3"/>
+          <p:cNvSpPr>
+            <a:spLocks noGrp="1"/>
+          </p:cNvSpPr>
+          <p:nvPr>
+            <p:ph type="sldNum" sz="quarter" idx="10"/>
+          </p:nvPr>
+        </p:nvSpPr>
+        <p:spPr/>
+        <p:txBody>
+          <a:bodyPr/>
+          <a:lstStyle/>
+          <a:p>
+            <a:pPr>
+              <a:defRPr/>
+            </a:pPr>
+            <a:fld id="{8B2AE985-CEB1-47DB-AC87-FA613AA66B3B}" type="slidenum">
+              <a:rPr lang="en-US" smtClean="0"/>
+              <a:pPr>
+                <a:defRPr/>
+              </a:pPr>
+              <a:t>33</a:t>
+            </a:fld>
+            <a:endParaRPr lang="en-US" dirty="0"/>
+          </a:p>
+        </p:txBody>
+      </p:sp>
+    </p:spTree>
+  </p:cSld>
+  <p:clrMapOvr>
+    <a:masterClrMapping/>
+  </p:clrMapOvr>
+</p:notes>
+</file>
+
+<file path=ppt/notesSlides/notesSlide34.xml><?xml version="1.0" encoding="utf-8"?>
+<p:notes xmlns:a="http://schemas.openxmlformats.org/drawingml/2006/main" xmlns:r="http://schemas.openxmlformats.org/officeDocument/2006/relationships" xmlns:p="http://schemas.openxmlformats.org/presentationml/2006/main">
+  <p:cSld>
+    <p:spTree>
+      <p:nvGrpSpPr>
+        <p:cNvPr id="1" name=""/>
+        <p:cNvGrpSpPr/>
+        <p:nvPr/>
+      </p:nvGrpSpPr>
+      <p:grpSpPr>
+        <a:xfrm>
+          <a:off x="0" y="0"/>
+          <a:ext cx="0" cy="0"/>
+          <a:chOff x="0" y="0"/>
+          <a:chExt cx="0" cy="0"/>
+        </a:xfrm>
+      </p:grpSpPr>
+      <p:sp>
+        <p:nvSpPr>
+          <p:cNvPr id="2" name="Slide Image Placeholder 1"/>
+          <p:cNvSpPr>
+            <a:spLocks noGrp="1" noRot="1" noChangeAspect="1"/>
+          </p:cNvSpPr>
+          <p:nvPr>
+            <p:ph type="sldImg"/>
+          </p:nvPr>
+        </p:nvSpPr>
+        <p:spPr/>
+      </p:sp>
+      <p:sp>
+        <p:nvSpPr>
+          <p:cNvPr id="3" name="Notes Placeholder 2"/>
+          <p:cNvSpPr>
+            <a:spLocks noGrp="1"/>
+          </p:cNvSpPr>
+          <p:nvPr>
+            <p:ph type="body" idx="1"/>
+          </p:nvPr>
+        </p:nvSpPr>
+        <p:spPr/>
+        <p:txBody>
+          <a:bodyPr>
+            <a:normAutofit/>
+          </a:bodyPr>
+          <a:lstStyle/>
+          <a:p>
+            <a:endParaRPr lang="en-US"/>
+          </a:p>
+        </p:txBody>
+      </p:sp>
+      <p:sp>
+        <p:nvSpPr>
+          <p:cNvPr id="4" name="Slide Number Placeholder 3"/>
+          <p:cNvSpPr>
+            <a:spLocks noGrp="1"/>
+          </p:cNvSpPr>
+          <p:nvPr>
+            <p:ph type="sldNum" sz="quarter" idx="10"/>
+          </p:nvPr>
+        </p:nvSpPr>
+        <p:spPr/>
+        <p:txBody>
+          <a:bodyPr/>
+          <a:lstStyle/>
+          <a:p>
+            <a:pPr>
+              <a:defRPr/>
+            </a:pPr>
+            <a:fld id="{8B2AE985-CEB1-47DB-AC87-FA613AA66B3B}" type="slidenum">
+              <a:rPr lang="en-US" smtClean="0"/>
+              <a:pPr>
+                <a:defRPr/>
+              </a:pPr>
+              <a:t>34</a:t>
+            </a:fld>
+            <a:endParaRPr lang="en-US" dirty="0"/>
+          </a:p>
+        </p:txBody>
+      </p:sp>
+    </p:spTree>
+  </p:cSld>
+  <p:clrMapOvr>
+    <a:masterClrMapping/>
+  </p:clrMapOvr>
+</p:notes>
+</file>
+
+<file path=ppt/notesSlides/notesSlide35.xml><?xml version="1.0" encoding="utf-8"?>
+<p:notes xmlns:a="http://schemas.openxmlformats.org/drawingml/2006/main" xmlns:r="http://schemas.openxmlformats.org/officeDocument/2006/relationships" xmlns:p="http://schemas.openxmlformats.org/presentationml/2006/main">
+  <p:cSld>
+    <p:spTree>
+      <p:nvGrpSpPr>
+        <p:cNvPr id="1" name=""/>
+        <p:cNvGrpSpPr/>
+        <p:nvPr/>
+      </p:nvGrpSpPr>
+      <p:grpSpPr>
+        <a:xfrm>
+          <a:off x="0" y="0"/>
+          <a:ext cx="0" cy="0"/>
+          <a:chOff x="0" y="0"/>
+          <a:chExt cx="0" cy="0"/>
+        </a:xfrm>
+      </p:grpSpPr>
+      <p:sp>
+        <p:nvSpPr>
+          <p:cNvPr id="2" name="Slide Image Placeholder 1"/>
+          <p:cNvSpPr>
+            <a:spLocks noGrp="1" noRot="1" noChangeAspect="1"/>
+          </p:cNvSpPr>
+          <p:nvPr>
+            <p:ph type="sldImg"/>
+          </p:nvPr>
+        </p:nvSpPr>
+        <p:spPr/>
+      </p:sp>
+      <p:sp>
+        <p:nvSpPr>
+          <p:cNvPr id="3" name="Notes Placeholder 2"/>
+          <p:cNvSpPr>
+            <a:spLocks noGrp="1"/>
+          </p:cNvSpPr>
+          <p:nvPr>
+            <p:ph type="body" idx="1"/>
+          </p:nvPr>
+        </p:nvSpPr>
+        <p:spPr/>
+        <p:txBody>
+          <a:bodyPr>
+            <a:normAutofit/>
+          </a:bodyPr>
+          <a:lstStyle/>
+          <a:p>
+            <a:endParaRPr lang="en-US"/>
+          </a:p>
+        </p:txBody>
+      </p:sp>
+      <p:sp>
+        <p:nvSpPr>
+          <p:cNvPr id="4" name="Slide Number Placeholder 3"/>
+          <p:cNvSpPr>
+            <a:spLocks noGrp="1"/>
+          </p:cNvSpPr>
+          <p:nvPr>
+            <p:ph type="sldNum" sz="quarter" idx="10"/>
+          </p:nvPr>
+        </p:nvSpPr>
+        <p:spPr/>
+        <p:txBody>
+          <a:bodyPr/>
+          <a:lstStyle/>
+          <a:p>
+            <a:pPr>
+              <a:defRPr/>
+            </a:pPr>
+            <a:fld id="{8B2AE985-CEB1-47DB-AC87-FA613AA66B3B}" type="slidenum">
+              <a:rPr lang="en-US" smtClean="0"/>
+              <a:pPr>
+                <a:defRPr/>
+              </a:pPr>
+              <a:t>35</a:t>
+            </a:fld>
+            <a:endParaRPr lang="en-US" dirty="0"/>
+          </a:p>
+        </p:txBody>
+      </p:sp>
+    </p:spTree>
+  </p:cSld>
+  <p:clrMapOvr>
+    <a:masterClrMapping/>
+  </p:clrMapOvr>
+</p:notes>
+</file>
+
+<file path=ppt/notesSlides/notesSlide36.xml><?xml version="1.0" encoding="utf-8"?>
+<p:notes xmlns:a="http://schemas.openxmlformats.org/drawingml/2006/main" xmlns:r="http://schemas.openxmlformats.org/officeDocument/2006/relationships" xmlns:p="http://schemas.openxmlformats.org/presentationml/2006/main">
+  <p:cSld>
+    <p:spTree>
+      <p:nvGrpSpPr>
+        <p:cNvPr id="1" name=""/>
+        <p:cNvGrpSpPr/>
+        <p:nvPr/>
+      </p:nvGrpSpPr>
+      <p:grpSpPr>
+        <a:xfrm>
+          <a:off x="0" y="0"/>
+          <a:ext cx="0" cy="0"/>
+          <a:chOff x="0" y="0"/>
+          <a:chExt cx="0" cy="0"/>
+        </a:xfrm>
+      </p:grpSpPr>
+      <p:sp>
+        <p:nvSpPr>
+          <p:cNvPr id="2" name="Slide Image Placeholder 1"/>
+          <p:cNvSpPr>
+            <a:spLocks noGrp="1" noRot="1" noChangeAspect="1"/>
+          </p:cNvSpPr>
+          <p:nvPr>
+            <p:ph type="sldImg"/>
+          </p:nvPr>
+        </p:nvSpPr>
+        <p:spPr/>
+      </p:sp>
+      <p:sp>
+        <p:nvSpPr>
+          <p:cNvPr id="3" name="Notes Placeholder 2"/>
+          <p:cNvSpPr>
+            <a:spLocks noGrp="1"/>
+          </p:cNvSpPr>
+          <p:nvPr>
+            <p:ph type="body" idx="1"/>
+          </p:nvPr>
+        </p:nvSpPr>
+        <p:spPr/>
+        <p:txBody>
+          <a:bodyPr>
+            <a:normAutofit/>
+          </a:bodyPr>
+          <a:lstStyle/>
+          <a:p>
+            <a:endParaRPr lang="en-US"/>
+          </a:p>
+        </p:txBody>
+      </p:sp>
+      <p:sp>
+        <p:nvSpPr>
+          <p:cNvPr id="4" name="Slide Number Placeholder 3"/>
+          <p:cNvSpPr>
+            <a:spLocks noGrp="1"/>
+          </p:cNvSpPr>
+          <p:nvPr>
+            <p:ph type="sldNum" sz="quarter" idx="10"/>
+          </p:nvPr>
+        </p:nvSpPr>
+        <p:spPr/>
+        <p:txBody>
+          <a:bodyPr/>
+          <a:lstStyle/>
+          <a:p>
+            <a:pPr>
+              <a:defRPr/>
+            </a:pPr>
+            <a:fld id="{8B2AE985-CEB1-47DB-AC87-FA613AA66B3B}" type="slidenum">
+              <a:rPr lang="en-US" smtClean="0"/>
+              <a:pPr>
+                <a:defRPr/>
+              </a:pPr>
+              <a:t>36</a:t>
+            </a:fld>
+            <a:endParaRPr lang="en-US" dirty="0"/>
+          </a:p>
+        </p:txBody>
+      </p:sp>
+    </p:spTree>
+  </p:cSld>
+  <p:clrMapOvr>
+    <a:masterClrMapping/>
+  </p:clrMapOvr>
+</p:notes>
+</file>
+
+<file path=ppt/notesSlides/notesSlide37.xml><?xml version="1.0" encoding="utf-8"?>
+<p:notes xmlns:a="http://schemas.openxmlformats.org/drawingml/2006/main" xmlns:r="http://schemas.openxmlformats.org/officeDocument/2006/relationships" xmlns:p="http://schemas.openxmlformats.org/presentationml/2006/main">
+  <p:cSld>
+    <p:spTree>
+      <p:nvGrpSpPr>
+        <p:cNvPr id="1" name=""/>
+        <p:cNvGrpSpPr/>
+        <p:nvPr/>
+      </p:nvGrpSpPr>
+      <p:grpSpPr>
+        <a:xfrm>
+          <a:off x="0" y="0"/>
+          <a:ext cx="0" cy="0"/>
+          <a:chOff x="0" y="0"/>
+          <a:chExt cx="0" cy="0"/>
+        </a:xfrm>
+      </p:grpSpPr>
+      <p:sp>
+        <p:nvSpPr>
+          <p:cNvPr id="2" name="Slide Image Placeholder 1"/>
+          <p:cNvSpPr>
+            <a:spLocks noGrp="1" noRot="1" noChangeAspect="1"/>
+          </p:cNvSpPr>
+          <p:nvPr>
+            <p:ph type="sldImg"/>
+          </p:nvPr>
+        </p:nvSpPr>
+        <p:spPr/>
+      </p:sp>
+      <p:sp>
+        <p:nvSpPr>
+          <p:cNvPr id="3" name="Notes Placeholder 2"/>
+          <p:cNvSpPr>
+            <a:spLocks noGrp="1"/>
+          </p:cNvSpPr>
+          <p:nvPr>
+            <p:ph type="body" idx="1"/>
+          </p:nvPr>
+        </p:nvSpPr>
+        <p:spPr/>
+        <p:txBody>
+          <a:bodyPr>
+            <a:normAutofit/>
+          </a:bodyPr>
+          <a:lstStyle/>
+          <a:p>
+            <a:endParaRPr lang="en-US"/>
+          </a:p>
+        </p:txBody>
+      </p:sp>
+      <p:sp>
+        <p:nvSpPr>
+          <p:cNvPr id="4" name="Slide Number Placeholder 3"/>
+          <p:cNvSpPr>
+            <a:spLocks noGrp="1"/>
+          </p:cNvSpPr>
+          <p:nvPr>
+            <p:ph type="sldNum" sz="quarter" idx="10"/>
+          </p:nvPr>
+        </p:nvSpPr>
+        <p:spPr/>
+        <p:txBody>
+          <a:bodyPr/>
+          <a:lstStyle/>
+          <a:p>
+            <a:pPr>
+              <a:defRPr/>
+            </a:pPr>
+            <a:fld id="{8B2AE985-CEB1-47DB-AC87-FA613AA66B3B}" type="slidenum">
+              <a:rPr lang="en-US" smtClean="0"/>
+              <a:pPr>
+                <a:defRPr/>
+              </a:pPr>
+              <a:t>37</a:t>
+            </a:fld>
+            <a:endParaRPr lang="en-US" dirty="0"/>
+          </a:p>
+        </p:txBody>
+      </p:sp>
+    </p:spTree>
+  </p:cSld>
+  <p:clrMapOvr>
+    <a:masterClrMapping/>
+  </p:clrMapOvr>
+</p:notes>
+</file>
+
+<file path=ppt/notesSlides/notesSlide38.xml><?xml version="1.0" encoding="utf-8"?>
+<p:notes xmlns:a="http://schemas.openxmlformats.org/drawingml/2006/main" xmlns:r="http://schemas.openxmlformats.org/officeDocument/2006/relationships" xmlns:p="http://schemas.openxmlformats.org/presentationml/2006/main">
+  <p:cSld>
+    <p:spTree>
+      <p:nvGrpSpPr>
+        <p:cNvPr id="1" name=""/>
+        <p:cNvGrpSpPr/>
+        <p:nvPr/>
+      </p:nvGrpSpPr>
+      <p:grpSpPr>
+        <a:xfrm>
+          <a:off x="0" y="0"/>
+          <a:ext cx="0" cy="0"/>
+          <a:chOff x="0" y="0"/>
+          <a:chExt cx="0" cy="0"/>
+        </a:xfrm>
+      </p:grpSpPr>
+      <p:sp>
+        <p:nvSpPr>
+          <p:cNvPr id="2" name="Slide Image Placeholder 1"/>
+          <p:cNvSpPr>
+            <a:spLocks noGrp="1" noRot="1" noChangeAspect="1"/>
+          </p:cNvSpPr>
+          <p:nvPr>
+            <p:ph type="sldImg"/>
+          </p:nvPr>
+        </p:nvSpPr>
+        <p:spPr/>
+      </p:sp>
+      <p:sp>
+        <p:nvSpPr>
+          <p:cNvPr id="3" name="Notes Placeholder 2"/>
+          <p:cNvSpPr>
+            <a:spLocks noGrp="1"/>
+          </p:cNvSpPr>
+          <p:nvPr>
+            <p:ph type="body" idx="1"/>
+          </p:nvPr>
+        </p:nvSpPr>
+        <p:spPr/>
+        <p:txBody>
+          <a:bodyPr>
+            <a:normAutofit/>
+          </a:bodyPr>
+          <a:lstStyle/>
+          <a:p>
+            <a:endParaRPr lang="en-US"/>
+          </a:p>
+        </p:txBody>
+      </p:sp>
+      <p:sp>
+        <p:nvSpPr>
+          <p:cNvPr id="4" name="Slide Number Placeholder 3"/>
+          <p:cNvSpPr>
+            <a:spLocks noGrp="1"/>
+          </p:cNvSpPr>
+          <p:nvPr>
+            <p:ph type="sldNum" sz="quarter" idx="10"/>
+          </p:nvPr>
+        </p:nvSpPr>
+        <p:spPr/>
+        <p:txBody>
+          <a:bodyPr/>
+          <a:lstStyle/>
+          <a:p>
+            <a:pPr>
+              <a:defRPr/>
+            </a:pPr>
+            <a:fld id="{8B2AE985-CEB1-47DB-AC87-FA613AA66B3B}" type="slidenum">
+              <a:rPr lang="en-US" smtClean="0"/>
+              <a:pPr>
+                <a:defRPr/>
+              </a:pPr>
+              <a:t>38</a:t>
+            </a:fld>
+            <a:endParaRPr lang="en-US" dirty="0"/>
+          </a:p>
+        </p:txBody>
+      </p:sp>
+    </p:spTree>
+  </p:cSld>
+  <p:clrMapOvr>
+    <a:masterClrMapping/>
+  </p:clrMapOvr>
+</p:notes>
+</file>
+
+<file path=ppt/notesSlides/notesSlide39.xml><?xml version="1.0" encoding="utf-8"?>
+<p:notes xmlns:a="http://schemas.openxmlformats.org/drawingml/2006/main" xmlns:r="http://schemas.openxmlformats.org/officeDocument/2006/relationships" xmlns:p="http://schemas.openxmlformats.org/presentationml/2006/main">
+  <p:cSld>
+    <p:spTree>
+      <p:nvGrpSpPr>
+        <p:cNvPr id="1" name=""/>
+        <p:cNvGrpSpPr/>
+        <p:nvPr/>
+      </p:nvGrpSpPr>
+      <p:grpSpPr>
+        <a:xfrm>
+          <a:off x="0" y="0"/>
+          <a:ext cx="0" cy="0"/>
+          <a:chOff x="0" y="0"/>
+          <a:chExt cx="0" cy="0"/>
+        </a:xfrm>
+      </p:grpSpPr>
+      <p:sp>
+        <p:nvSpPr>
+          <p:cNvPr id="2" name="Slide Image Placeholder 1"/>
+          <p:cNvSpPr>
+            <a:spLocks noGrp="1" noRot="1" noChangeAspect="1"/>
+          </p:cNvSpPr>
+          <p:nvPr>
+            <p:ph type="sldImg"/>
+          </p:nvPr>
+        </p:nvSpPr>
+        <p:spPr/>
+      </p:sp>
+      <p:sp>
+        <p:nvSpPr>
+          <p:cNvPr id="3" name="Notes Placeholder 2"/>
+          <p:cNvSpPr>
+            <a:spLocks noGrp="1"/>
+          </p:cNvSpPr>
+          <p:nvPr>
+            <p:ph type="body" idx="1"/>
+          </p:nvPr>
+        </p:nvSpPr>
+        <p:spPr/>
+        <p:txBody>
+          <a:bodyPr>
+            <a:normAutofit/>
+          </a:bodyPr>
+          <a:lstStyle/>
+          <a:p>
+            <a:endParaRPr lang="en-US"/>
+          </a:p>
+        </p:txBody>
+      </p:sp>
+      <p:sp>
+        <p:nvSpPr>
+          <p:cNvPr id="4" name="Slide Number Placeholder 3"/>
+          <p:cNvSpPr>
+            <a:spLocks noGrp="1"/>
+          </p:cNvSpPr>
+          <p:nvPr>
+            <p:ph type="sldNum" sz="quarter" idx="10"/>
+          </p:nvPr>
+        </p:nvSpPr>
+        <p:spPr/>
+        <p:txBody>
+          <a:bodyPr/>
+          <a:lstStyle/>
+          <a:p>
+            <a:pPr>
+              <a:defRPr/>
+            </a:pPr>
+            <a:fld id="{8B2AE985-CEB1-47DB-AC87-FA613AA66B3B}" type="slidenum">
+              <a:rPr lang="en-US" smtClean="0"/>
+              <a:pPr>
+                <a:defRPr/>
+              </a:pPr>
+              <a:t>39</a:t>
+            </a:fld>
+            <a:endParaRPr lang="en-US" dirty="0"/>
+          </a:p>
+        </p:txBody>
+      </p:sp>
+    </p:spTree>
+  </p:cSld>
+  <p:clrMapOvr>
+    <a:masterClrMapping/>
+  </p:clrMapOvr>
+</p:notes>
+</file>
+
+<file path=ppt/notesSlides/notesSlide4.xml><?xml version="1.0" encoding="utf-8"?>
 <p:notes xmlns:a="http://schemas.openxmlformats.org/drawingml/2006/main" xmlns:r="http://schemas.openxmlformats.org/officeDocument/2006/relationships" xmlns:p="http://schemas.openxmlformats.org/presentationml/2006/main">
   <p:cSld>
     <p:spTree>
@@ -874,7 +3700,877 @@
 </p:notes>
 </file>
 
-<file path=ppt/notesSlides/notesSlide3.xml><?xml version="1.0" encoding="utf-8"?>
+<file path=ppt/notesSlides/notesSlide40.xml><?xml version="1.0" encoding="utf-8"?>
+<p:notes xmlns:a="http://schemas.openxmlformats.org/drawingml/2006/main" xmlns:r="http://schemas.openxmlformats.org/officeDocument/2006/relationships" xmlns:p="http://schemas.openxmlformats.org/presentationml/2006/main">
+  <p:cSld>
+    <p:spTree>
+      <p:nvGrpSpPr>
+        <p:cNvPr id="1" name=""/>
+        <p:cNvGrpSpPr/>
+        <p:nvPr/>
+      </p:nvGrpSpPr>
+      <p:grpSpPr>
+        <a:xfrm>
+          <a:off x="0" y="0"/>
+          <a:ext cx="0" cy="0"/>
+          <a:chOff x="0" y="0"/>
+          <a:chExt cx="0" cy="0"/>
+        </a:xfrm>
+      </p:grpSpPr>
+      <p:sp>
+        <p:nvSpPr>
+          <p:cNvPr id="2" name="Slide Image Placeholder 1"/>
+          <p:cNvSpPr>
+            <a:spLocks noGrp="1" noRot="1" noChangeAspect="1"/>
+          </p:cNvSpPr>
+          <p:nvPr>
+            <p:ph type="sldImg"/>
+          </p:nvPr>
+        </p:nvSpPr>
+        <p:spPr/>
+      </p:sp>
+      <p:sp>
+        <p:nvSpPr>
+          <p:cNvPr id="3" name="Notes Placeholder 2"/>
+          <p:cNvSpPr>
+            <a:spLocks noGrp="1"/>
+          </p:cNvSpPr>
+          <p:nvPr>
+            <p:ph type="body" idx="1"/>
+          </p:nvPr>
+        </p:nvSpPr>
+        <p:spPr/>
+        <p:txBody>
+          <a:bodyPr>
+            <a:normAutofit/>
+          </a:bodyPr>
+          <a:lstStyle/>
+          <a:p>
+            <a:endParaRPr lang="en-US"/>
+          </a:p>
+        </p:txBody>
+      </p:sp>
+      <p:sp>
+        <p:nvSpPr>
+          <p:cNvPr id="4" name="Slide Number Placeholder 3"/>
+          <p:cNvSpPr>
+            <a:spLocks noGrp="1"/>
+          </p:cNvSpPr>
+          <p:nvPr>
+            <p:ph type="sldNum" sz="quarter" idx="10"/>
+          </p:nvPr>
+        </p:nvSpPr>
+        <p:spPr/>
+        <p:txBody>
+          <a:bodyPr/>
+          <a:lstStyle/>
+          <a:p>
+            <a:pPr>
+              <a:defRPr/>
+            </a:pPr>
+            <a:fld id="{8B2AE985-CEB1-47DB-AC87-FA613AA66B3B}" type="slidenum">
+              <a:rPr lang="en-US" smtClean="0"/>
+              <a:pPr>
+                <a:defRPr/>
+              </a:pPr>
+              <a:t>40</a:t>
+            </a:fld>
+            <a:endParaRPr lang="en-US" dirty="0"/>
+          </a:p>
+        </p:txBody>
+      </p:sp>
+    </p:spTree>
+  </p:cSld>
+  <p:clrMapOvr>
+    <a:masterClrMapping/>
+  </p:clrMapOvr>
+</p:notes>
+</file>
+
+<file path=ppt/notesSlides/notesSlide41.xml><?xml version="1.0" encoding="utf-8"?>
+<p:notes xmlns:a="http://schemas.openxmlformats.org/drawingml/2006/main" xmlns:r="http://schemas.openxmlformats.org/officeDocument/2006/relationships" xmlns:p="http://schemas.openxmlformats.org/presentationml/2006/main">
+  <p:cSld>
+    <p:spTree>
+      <p:nvGrpSpPr>
+        <p:cNvPr id="1" name=""/>
+        <p:cNvGrpSpPr/>
+        <p:nvPr/>
+      </p:nvGrpSpPr>
+      <p:grpSpPr>
+        <a:xfrm>
+          <a:off x="0" y="0"/>
+          <a:ext cx="0" cy="0"/>
+          <a:chOff x="0" y="0"/>
+          <a:chExt cx="0" cy="0"/>
+        </a:xfrm>
+      </p:grpSpPr>
+      <p:sp>
+        <p:nvSpPr>
+          <p:cNvPr id="2" name="Slide Image Placeholder 1"/>
+          <p:cNvSpPr>
+            <a:spLocks noGrp="1" noRot="1" noChangeAspect="1"/>
+          </p:cNvSpPr>
+          <p:nvPr>
+            <p:ph type="sldImg"/>
+          </p:nvPr>
+        </p:nvSpPr>
+        <p:spPr/>
+      </p:sp>
+      <p:sp>
+        <p:nvSpPr>
+          <p:cNvPr id="3" name="Notes Placeholder 2"/>
+          <p:cNvSpPr>
+            <a:spLocks noGrp="1"/>
+          </p:cNvSpPr>
+          <p:nvPr>
+            <p:ph type="body" idx="1"/>
+          </p:nvPr>
+        </p:nvSpPr>
+        <p:spPr/>
+        <p:txBody>
+          <a:bodyPr>
+            <a:normAutofit/>
+          </a:bodyPr>
+          <a:lstStyle/>
+          <a:p>
+            <a:endParaRPr lang="en-US"/>
+          </a:p>
+        </p:txBody>
+      </p:sp>
+      <p:sp>
+        <p:nvSpPr>
+          <p:cNvPr id="4" name="Slide Number Placeholder 3"/>
+          <p:cNvSpPr>
+            <a:spLocks noGrp="1"/>
+          </p:cNvSpPr>
+          <p:nvPr>
+            <p:ph type="sldNum" sz="quarter" idx="10"/>
+          </p:nvPr>
+        </p:nvSpPr>
+        <p:spPr/>
+        <p:txBody>
+          <a:bodyPr/>
+          <a:lstStyle/>
+          <a:p>
+            <a:pPr>
+              <a:defRPr/>
+            </a:pPr>
+            <a:fld id="{8B2AE985-CEB1-47DB-AC87-FA613AA66B3B}" type="slidenum">
+              <a:rPr lang="en-US" smtClean="0"/>
+              <a:pPr>
+                <a:defRPr/>
+              </a:pPr>
+              <a:t>41</a:t>
+            </a:fld>
+            <a:endParaRPr lang="en-US" dirty="0"/>
+          </a:p>
+        </p:txBody>
+      </p:sp>
+    </p:spTree>
+  </p:cSld>
+  <p:clrMapOvr>
+    <a:masterClrMapping/>
+  </p:clrMapOvr>
+</p:notes>
+</file>
+
+<file path=ppt/notesSlides/notesSlide42.xml><?xml version="1.0" encoding="utf-8"?>
+<p:notes xmlns:a="http://schemas.openxmlformats.org/drawingml/2006/main" xmlns:r="http://schemas.openxmlformats.org/officeDocument/2006/relationships" xmlns:p="http://schemas.openxmlformats.org/presentationml/2006/main">
+  <p:cSld>
+    <p:spTree>
+      <p:nvGrpSpPr>
+        <p:cNvPr id="1" name=""/>
+        <p:cNvGrpSpPr/>
+        <p:nvPr/>
+      </p:nvGrpSpPr>
+      <p:grpSpPr>
+        <a:xfrm>
+          <a:off x="0" y="0"/>
+          <a:ext cx="0" cy="0"/>
+          <a:chOff x="0" y="0"/>
+          <a:chExt cx="0" cy="0"/>
+        </a:xfrm>
+      </p:grpSpPr>
+      <p:sp>
+        <p:nvSpPr>
+          <p:cNvPr id="2" name="Slide Image Placeholder 1"/>
+          <p:cNvSpPr>
+            <a:spLocks noGrp="1" noRot="1" noChangeAspect="1"/>
+          </p:cNvSpPr>
+          <p:nvPr>
+            <p:ph type="sldImg"/>
+          </p:nvPr>
+        </p:nvSpPr>
+        <p:spPr/>
+      </p:sp>
+      <p:sp>
+        <p:nvSpPr>
+          <p:cNvPr id="3" name="Notes Placeholder 2"/>
+          <p:cNvSpPr>
+            <a:spLocks noGrp="1"/>
+          </p:cNvSpPr>
+          <p:nvPr>
+            <p:ph type="body" idx="1"/>
+          </p:nvPr>
+        </p:nvSpPr>
+        <p:spPr/>
+        <p:txBody>
+          <a:bodyPr>
+            <a:normAutofit/>
+          </a:bodyPr>
+          <a:lstStyle/>
+          <a:p>
+            <a:endParaRPr lang="en-US"/>
+          </a:p>
+        </p:txBody>
+      </p:sp>
+      <p:sp>
+        <p:nvSpPr>
+          <p:cNvPr id="4" name="Slide Number Placeholder 3"/>
+          <p:cNvSpPr>
+            <a:spLocks noGrp="1"/>
+          </p:cNvSpPr>
+          <p:nvPr>
+            <p:ph type="sldNum" sz="quarter" idx="10"/>
+          </p:nvPr>
+        </p:nvSpPr>
+        <p:spPr/>
+        <p:txBody>
+          <a:bodyPr/>
+          <a:lstStyle/>
+          <a:p>
+            <a:pPr>
+              <a:defRPr/>
+            </a:pPr>
+            <a:fld id="{8B2AE985-CEB1-47DB-AC87-FA613AA66B3B}" type="slidenum">
+              <a:rPr lang="en-US" smtClean="0"/>
+              <a:pPr>
+                <a:defRPr/>
+              </a:pPr>
+              <a:t>42</a:t>
+            </a:fld>
+            <a:endParaRPr lang="en-US" dirty="0"/>
+          </a:p>
+        </p:txBody>
+      </p:sp>
+    </p:spTree>
+  </p:cSld>
+  <p:clrMapOvr>
+    <a:masterClrMapping/>
+  </p:clrMapOvr>
+</p:notes>
+</file>
+
+<file path=ppt/notesSlides/notesSlide43.xml><?xml version="1.0" encoding="utf-8"?>
+<p:notes xmlns:a="http://schemas.openxmlformats.org/drawingml/2006/main" xmlns:r="http://schemas.openxmlformats.org/officeDocument/2006/relationships" xmlns:p="http://schemas.openxmlformats.org/presentationml/2006/main">
+  <p:cSld>
+    <p:spTree>
+      <p:nvGrpSpPr>
+        <p:cNvPr id="1" name=""/>
+        <p:cNvGrpSpPr/>
+        <p:nvPr/>
+      </p:nvGrpSpPr>
+      <p:grpSpPr>
+        <a:xfrm>
+          <a:off x="0" y="0"/>
+          <a:ext cx="0" cy="0"/>
+          <a:chOff x="0" y="0"/>
+          <a:chExt cx="0" cy="0"/>
+        </a:xfrm>
+      </p:grpSpPr>
+      <p:sp>
+        <p:nvSpPr>
+          <p:cNvPr id="2" name="Slide Image Placeholder 1"/>
+          <p:cNvSpPr>
+            <a:spLocks noGrp="1" noRot="1" noChangeAspect="1"/>
+          </p:cNvSpPr>
+          <p:nvPr>
+            <p:ph type="sldImg"/>
+          </p:nvPr>
+        </p:nvSpPr>
+        <p:spPr/>
+      </p:sp>
+      <p:sp>
+        <p:nvSpPr>
+          <p:cNvPr id="3" name="Notes Placeholder 2"/>
+          <p:cNvSpPr>
+            <a:spLocks noGrp="1"/>
+          </p:cNvSpPr>
+          <p:nvPr>
+            <p:ph type="body" idx="1"/>
+          </p:nvPr>
+        </p:nvSpPr>
+        <p:spPr/>
+        <p:txBody>
+          <a:bodyPr>
+            <a:normAutofit/>
+          </a:bodyPr>
+          <a:lstStyle/>
+          <a:p>
+            <a:endParaRPr lang="en-US"/>
+          </a:p>
+        </p:txBody>
+      </p:sp>
+      <p:sp>
+        <p:nvSpPr>
+          <p:cNvPr id="4" name="Slide Number Placeholder 3"/>
+          <p:cNvSpPr>
+            <a:spLocks noGrp="1"/>
+          </p:cNvSpPr>
+          <p:nvPr>
+            <p:ph type="sldNum" sz="quarter" idx="10"/>
+          </p:nvPr>
+        </p:nvSpPr>
+        <p:spPr/>
+        <p:txBody>
+          <a:bodyPr/>
+          <a:lstStyle/>
+          <a:p>
+            <a:pPr>
+              <a:defRPr/>
+            </a:pPr>
+            <a:fld id="{8B2AE985-CEB1-47DB-AC87-FA613AA66B3B}" type="slidenum">
+              <a:rPr lang="en-US" smtClean="0"/>
+              <a:pPr>
+                <a:defRPr/>
+              </a:pPr>
+              <a:t>43</a:t>
+            </a:fld>
+            <a:endParaRPr lang="en-US" dirty="0"/>
+          </a:p>
+        </p:txBody>
+      </p:sp>
+    </p:spTree>
+  </p:cSld>
+  <p:clrMapOvr>
+    <a:masterClrMapping/>
+  </p:clrMapOvr>
+</p:notes>
+</file>
+
+<file path=ppt/notesSlides/notesSlide44.xml><?xml version="1.0" encoding="utf-8"?>
+<p:notes xmlns:a="http://schemas.openxmlformats.org/drawingml/2006/main" xmlns:r="http://schemas.openxmlformats.org/officeDocument/2006/relationships" xmlns:p="http://schemas.openxmlformats.org/presentationml/2006/main">
+  <p:cSld>
+    <p:spTree>
+      <p:nvGrpSpPr>
+        <p:cNvPr id="1" name=""/>
+        <p:cNvGrpSpPr/>
+        <p:nvPr/>
+      </p:nvGrpSpPr>
+      <p:grpSpPr>
+        <a:xfrm>
+          <a:off x="0" y="0"/>
+          <a:ext cx="0" cy="0"/>
+          <a:chOff x="0" y="0"/>
+          <a:chExt cx="0" cy="0"/>
+        </a:xfrm>
+      </p:grpSpPr>
+      <p:sp>
+        <p:nvSpPr>
+          <p:cNvPr id="2" name="Slide Image Placeholder 1"/>
+          <p:cNvSpPr>
+            <a:spLocks noGrp="1" noRot="1" noChangeAspect="1"/>
+          </p:cNvSpPr>
+          <p:nvPr>
+            <p:ph type="sldImg"/>
+          </p:nvPr>
+        </p:nvSpPr>
+        <p:spPr/>
+      </p:sp>
+      <p:sp>
+        <p:nvSpPr>
+          <p:cNvPr id="3" name="Notes Placeholder 2"/>
+          <p:cNvSpPr>
+            <a:spLocks noGrp="1"/>
+          </p:cNvSpPr>
+          <p:nvPr>
+            <p:ph type="body" idx="1"/>
+          </p:nvPr>
+        </p:nvSpPr>
+        <p:spPr/>
+        <p:txBody>
+          <a:bodyPr>
+            <a:normAutofit/>
+          </a:bodyPr>
+          <a:lstStyle/>
+          <a:p>
+            <a:endParaRPr lang="en-US"/>
+          </a:p>
+        </p:txBody>
+      </p:sp>
+      <p:sp>
+        <p:nvSpPr>
+          <p:cNvPr id="4" name="Slide Number Placeholder 3"/>
+          <p:cNvSpPr>
+            <a:spLocks noGrp="1"/>
+          </p:cNvSpPr>
+          <p:nvPr>
+            <p:ph type="sldNum" sz="quarter" idx="10"/>
+          </p:nvPr>
+        </p:nvSpPr>
+        <p:spPr/>
+        <p:txBody>
+          <a:bodyPr/>
+          <a:lstStyle/>
+          <a:p>
+            <a:pPr>
+              <a:defRPr/>
+            </a:pPr>
+            <a:fld id="{8B2AE985-CEB1-47DB-AC87-FA613AA66B3B}" type="slidenum">
+              <a:rPr lang="en-US" smtClean="0"/>
+              <a:pPr>
+                <a:defRPr/>
+              </a:pPr>
+              <a:t>44</a:t>
+            </a:fld>
+            <a:endParaRPr lang="en-US" dirty="0"/>
+          </a:p>
+        </p:txBody>
+      </p:sp>
+    </p:spTree>
+  </p:cSld>
+  <p:clrMapOvr>
+    <a:masterClrMapping/>
+  </p:clrMapOvr>
+</p:notes>
+</file>
+
+<file path=ppt/notesSlides/notesSlide45.xml><?xml version="1.0" encoding="utf-8"?>
+<p:notes xmlns:a="http://schemas.openxmlformats.org/drawingml/2006/main" xmlns:r="http://schemas.openxmlformats.org/officeDocument/2006/relationships" xmlns:p="http://schemas.openxmlformats.org/presentationml/2006/main">
+  <p:cSld>
+    <p:spTree>
+      <p:nvGrpSpPr>
+        <p:cNvPr id="1" name=""/>
+        <p:cNvGrpSpPr/>
+        <p:nvPr/>
+      </p:nvGrpSpPr>
+      <p:grpSpPr>
+        <a:xfrm>
+          <a:off x="0" y="0"/>
+          <a:ext cx="0" cy="0"/>
+          <a:chOff x="0" y="0"/>
+          <a:chExt cx="0" cy="0"/>
+        </a:xfrm>
+      </p:grpSpPr>
+      <p:sp>
+        <p:nvSpPr>
+          <p:cNvPr id="2" name="Slide Image Placeholder 1"/>
+          <p:cNvSpPr>
+            <a:spLocks noGrp="1" noRot="1" noChangeAspect="1"/>
+          </p:cNvSpPr>
+          <p:nvPr>
+            <p:ph type="sldImg"/>
+          </p:nvPr>
+        </p:nvSpPr>
+        <p:spPr/>
+      </p:sp>
+      <p:sp>
+        <p:nvSpPr>
+          <p:cNvPr id="3" name="Notes Placeholder 2"/>
+          <p:cNvSpPr>
+            <a:spLocks noGrp="1"/>
+          </p:cNvSpPr>
+          <p:nvPr>
+            <p:ph type="body" idx="1"/>
+          </p:nvPr>
+        </p:nvSpPr>
+        <p:spPr/>
+        <p:txBody>
+          <a:bodyPr>
+            <a:normAutofit/>
+          </a:bodyPr>
+          <a:lstStyle/>
+          <a:p>
+            <a:endParaRPr lang="en-US"/>
+          </a:p>
+        </p:txBody>
+      </p:sp>
+      <p:sp>
+        <p:nvSpPr>
+          <p:cNvPr id="4" name="Slide Number Placeholder 3"/>
+          <p:cNvSpPr>
+            <a:spLocks noGrp="1"/>
+          </p:cNvSpPr>
+          <p:nvPr>
+            <p:ph type="sldNum" sz="quarter" idx="10"/>
+          </p:nvPr>
+        </p:nvSpPr>
+        <p:spPr/>
+        <p:txBody>
+          <a:bodyPr/>
+          <a:lstStyle/>
+          <a:p>
+            <a:pPr>
+              <a:defRPr/>
+            </a:pPr>
+            <a:fld id="{8B2AE985-CEB1-47DB-AC87-FA613AA66B3B}" type="slidenum">
+              <a:rPr lang="en-US" smtClean="0"/>
+              <a:pPr>
+                <a:defRPr/>
+              </a:pPr>
+              <a:t>45</a:t>
+            </a:fld>
+            <a:endParaRPr lang="en-US" dirty="0"/>
+          </a:p>
+        </p:txBody>
+      </p:sp>
+    </p:spTree>
+  </p:cSld>
+  <p:clrMapOvr>
+    <a:masterClrMapping/>
+  </p:clrMapOvr>
+</p:notes>
+</file>
+
+<file path=ppt/notesSlides/notesSlide46.xml><?xml version="1.0" encoding="utf-8"?>
+<p:notes xmlns:a="http://schemas.openxmlformats.org/drawingml/2006/main" xmlns:r="http://schemas.openxmlformats.org/officeDocument/2006/relationships" xmlns:p="http://schemas.openxmlformats.org/presentationml/2006/main">
+  <p:cSld>
+    <p:spTree>
+      <p:nvGrpSpPr>
+        <p:cNvPr id="1" name=""/>
+        <p:cNvGrpSpPr/>
+        <p:nvPr/>
+      </p:nvGrpSpPr>
+      <p:grpSpPr>
+        <a:xfrm>
+          <a:off x="0" y="0"/>
+          <a:ext cx="0" cy="0"/>
+          <a:chOff x="0" y="0"/>
+          <a:chExt cx="0" cy="0"/>
+        </a:xfrm>
+      </p:grpSpPr>
+      <p:sp>
+        <p:nvSpPr>
+          <p:cNvPr id="2" name="Slide Image Placeholder 1"/>
+          <p:cNvSpPr>
+            <a:spLocks noGrp="1" noRot="1" noChangeAspect="1"/>
+          </p:cNvSpPr>
+          <p:nvPr>
+            <p:ph type="sldImg"/>
+          </p:nvPr>
+        </p:nvSpPr>
+        <p:spPr/>
+      </p:sp>
+      <p:sp>
+        <p:nvSpPr>
+          <p:cNvPr id="3" name="Notes Placeholder 2"/>
+          <p:cNvSpPr>
+            <a:spLocks noGrp="1"/>
+          </p:cNvSpPr>
+          <p:nvPr>
+            <p:ph type="body" idx="1"/>
+          </p:nvPr>
+        </p:nvSpPr>
+        <p:spPr/>
+        <p:txBody>
+          <a:bodyPr>
+            <a:normAutofit/>
+          </a:bodyPr>
+          <a:lstStyle/>
+          <a:p>
+            <a:endParaRPr lang="en-US"/>
+          </a:p>
+        </p:txBody>
+      </p:sp>
+      <p:sp>
+        <p:nvSpPr>
+          <p:cNvPr id="4" name="Slide Number Placeholder 3"/>
+          <p:cNvSpPr>
+            <a:spLocks noGrp="1"/>
+          </p:cNvSpPr>
+          <p:nvPr>
+            <p:ph type="sldNum" sz="quarter" idx="10"/>
+          </p:nvPr>
+        </p:nvSpPr>
+        <p:spPr/>
+        <p:txBody>
+          <a:bodyPr/>
+          <a:lstStyle/>
+          <a:p>
+            <a:pPr>
+              <a:defRPr/>
+            </a:pPr>
+            <a:fld id="{8B2AE985-CEB1-47DB-AC87-FA613AA66B3B}" type="slidenum">
+              <a:rPr lang="en-US" smtClean="0"/>
+              <a:pPr>
+                <a:defRPr/>
+              </a:pPr>
+              <a:t>46</a:t>
+            </a:fld>
+            <a:endParaRPr lang="en-US" dirty="0"/>
+          </a:p>
+        </p:txBody>
+      </p:sp>
+    </p:spTree>
+  </p:cSld>
+  <p:clrMapOvr>
+    <a:masterClrMapping/>
+  </p:clrMapOvr>
+</p:notes>
+</file>
+
+<file path=ppt/notesSlides/notesSlide47.xml><?xml version="1.0" encoding="utf-8"?>
+<p:notes xmlns:a="http://schemas.openxmlformats.org/drawingml/2006/main" xmlns:r="http://schemas.openxmlformats.org/officeDocument/2006/relationships" xmlns:p="http://schemas.openxmlformats.org/presentationml/2006/main">
+  <p:cSld>
+    <p:spTree>
+      <p:nvGrpSpPr>
+        <p:cNvPr id="1" name=""/>
+        <p:cNvGrpSpPr/>
+        <p:nvPr/>
+      </p:nvGrpSpPr>
+      <p:grpSpPr>
+        <a:xfrm>
+          <a:off x="0" y="0"/>
+          <a:ext cx="0" cy="0"/>
+          <a:chOff x="0" y="0"/>
+          <a:chExt cx="0" cy="0"/>
+        </a:xfrm>
+      </p:grpSpPr>
+      <p:sp>
+        <p:nvSpPr>
+          <p:cNvPr id="2" name="Slide Image Placeholder 1"/>
+          <p:cNvSpPr>
+            <a:spLocks noGrp="1" noRot="1" noChangeAspect="1"/>
+          </p:cNvSpPr>
+          <p:nvPr>
+            <p:ph type="sldImg"/>
+          </p:nvPr>
+        </p:nvSpPr>
+        <p:spPr/>
+      </p:sp>
+      <p:sp>
+        <p:nvSpPr>
+          <p:cNvPr id="3" name="Notes Placeholder 2"/>
+          <p:cNvSpPr>
+            <a:spLocks noGrp="1"/>
+          </p:cNvSpPr>
+          <p:nvPr>
+            <p:ph type="body" idx="1"/>
+          </p:nvPr>
+        </p:nvSpPr>
+        <p:spPr/>
+        <p:txBody>
+          <a:bodyPr>
+            <a:normAutofit/>
+          </a:bodyPr>
+          <a:lstStyle/>
+          <a:p>
+            <a:endParaRPr lang="en-US"/>
+          </a:p>
+        </p:txBody>
+      </p:sp>
+      <p:sp>
+        <p:nvSpPr>
+          <p:cNvPr id="4" name="Slide Number Placeholder 3"/>
+          <p:cNvSpPr>
+            <a:spLocks noGrp="1"/>
+          </p:cNvSpPr>
+          <p:nvPr>
+            <p:ph type="sldNum" sz="quarter" idx="10"/>
+          </p:nvPr>
+        </p:nvSpPr>
+        <p:spPr/>
+        <p:txBody>
+          <a:bodyPr/>
+          <a:lstStyle/>
+          <a:p>
+            <a:pPr>
+              <a:defRPr/>
+            </a:pPr>
+            <a:fld id="{8B2AE985-CEB1-47DB-AC87-FA613AA66B3B}" type="slidenum">
+              <a:rPr lang="en-US" smtClean="0"/>
+              <a:pPr>
+                <a:defRPr/>
+              </a:pPr>
+              <a:t>47</a:t>
+            </a:fld>
+            <a:endParaRPr lang="en-US" dirty="0"/>
+          </a:p>
+        </p:txBody>
+      </p:sp>
+    </p:spTree>
+  </p:cSld>
+  <p:clrMapOvr>
+    <a:masterClrMapping/>
+  </p:clrMapOvr>
+</p:notes>
+</file>
+
+<file path=ppt/notesSlides/notesSlide48.xml><?xml version="1.0" encoding="utf-8"?>
+<p:notes xmlns:a="http://schemas.openxmlformats.org/drawingml/2006/main" xmlns:r="http://schemas.openxmlformats.org/officeDocument/2006/relationships" xmlns:p="http://schemas.openxmlformats.org/presentationml/2006/main">
+  <p:cSld>
+    <p:spTree>
+      <p:nvGrpSpPr>
+        <p:cNvPr id="1" name=""/>
+        <p:cNvGrpSpPr/>
+        <p:nvPr/>
+      </p:nvGrpSpPr>
+      <p:grpSpPr>
+        <a:xfrm>
+          <a:off x="0" y="0"/>
+          <a:ext cx="0" cy="0"/>
+          <a:chOff x="0" y="0"/>
+          <a:chExt cx="0" cy="0"/>
+        </a:xfrm>
+      </p:grpSpPr>
+      <p:sp>
+        <p:nvSpPr>
+          <p:cNvPr id="2" name="Slide Image Placeholder 1"/>
+          <p:cNvSpPr>
+            <a:spLocks noGrp="1" noRot="1" noChangeAspect="1"/>
+          </p:cNvSpPr>
+          <p:nvPr>
+            <p:ph type="sldImg"/>
+          </p:nvPr>
+        </p:nvSpPr>
+        <p:spPr/>
+      </p:sp>
+      <p:sp>
+        <p:nvSpPr>
+          <p:cNvPr id="3" name="Notes Placeholder 2"/>
+          <p:cNvSpPr>
+            <a:spLocks noGrp="1"/>
+          </p:cNvSpPr>
+          <p:nvPr>
+            <p:ph type="body" idx="1"/>
+          </p:nvPr>
+        </p:nvSpPr>
+        <p:spPr/>
+        <p:txBody>
+          <a:bodyPr>
+            <a:normAutofit/>
+          </a:bodyPr>
+          <a:lstStyle/>
+          <a:p>
+            <a:endParaRPr lang="en-US"/>
+          </a:p>
+        </p:txBody>
+      </p:sp>
+      <p:sp>
+        <p:nvSpPr>
+          <p:cNvPr id="4" name="Slide Number Placeholder 3"/>
+          <p:cNvSpPr>
+            <a:spLocks noGrp="1"/>
+          </p:cNvSpPr>
+          <p:nvPr>
+            <p:ph type="sldNum" sz="quarter" idx="10"/>
+          </p:nvPr>
+        </p:nvSpPr>
+        <p:spPr/>
+        <p:txBody>
+          <a:bodyPr/>
+          <a:lstStyle/>
+          <a:p>
+            <a:pPr>
+              <a:defRPr/>
+            </a:pPr>
+            <a:fld id="{8B2AE985-CEB1-47DB-AC87-FA613AA66B3B}" type="slidenum">
+              <a:rPr lang="en-US" smtClean="0"/>
+              <a:pPr>
+                <a:defRPr/>
+              </a:pPr>
+              <a:t>48</a:t>
+            </a:fld>
+            <a:endParaRPr lang="en-US" dirty="0"/>
+          </a:p>
+        </p:txBody>
+      </p:sp>
+    </p:spTree>
+  </p:cSld>
+  <p:clrMapOvr>
+    <a:masterClrMapping/>
+  </p:clrMapOvr>
+</p:notes>
+</file>
+
+<file path=ppt/notesSlides/notesSlide49.xml><?xml version="1.0" encoding="utf-8"?>
+<p:notes xmlns:a="http://schemas.openxmlformats.org/drawingml/2006/main" xmlns:r="http://schemas.openxmlformats.org/officeDocument/2006/relationships" xmlns:p="http://schemas.openxmlformats.org/presentationml/2006/main">
+  <p:cSld>
+    <p:spTree>
+      <p:nvGrpSpPr>
+        <p:cNvPr id="1" name=""/>
+        <p:cNvGrpSpPr/>
+        <p:nvPr/>
+      </p:nvGrpSpPr>
+      <p:grpSpPr>
+        <a:xfrm>
+          <a:off x="0" y="0"/>
+          <a:ext cx="0" cy="0"/>
+          <a:chOff x="0" y="0"/>
+          <a:chExt cx="0" cy="0"/>
+        </a:xfrm>
+      </p:grpSpPr>
+      <p:sp>
+        <p:nvSpPr>
+          <p:cNvPr id="2" name="Slide Image Placeholder 1"/>
+          <p:cNvSpPr>
+            <a:spLocks noGrp="1" noRot="1" noChangeAspect="1"/>
+          </p:cNvSpPr>
+          <p:nvPr>
+            <p:ph type="sldImg"/>
+          </p:nvPr>
+        </p:nvSpPr>
+        <p:spPr/>
+      </p:sp>
+      <p:sp>
+        <p:nvSpPr>
+          <p:cNvPr id="3" name="Notes Placeholder 2"/>
+          <p:cNvSpPr>
+            <a:spLocks noGrp="1"/>
+          </p:cNvSpPr>
+          <p:nvPr>
+            <p:ph type="body" idx="1"/>
+          </p:nvPr>
+        </p:nvSpPr>
+        <p:spPr/>
+        <p:txBody>
+          <a:bodyPr>
+            <a:normAutofit/>
+          </a:bodyPr>
+          <a:lstStyle/>
+          <a:p>
+            <a:endParaRPr lang="en-US"/>
+          </a:p>
+        </p:txBody>
+      </p:sp>
+      <p:sp>
+        <p:nvSpPr>
+          <p:cNvPr id="4" name="Slide Number Placeholder 3"/>
+          <p:cNvSpPr>
+            <a:spLocks noGrp="1"/>
+          </p:cNvSpPr>
+          <p:nvPr>
+            <p:ph type="sldNum" sz="quarter" idx="10"/>
+          </p:nvPr>
+        </p:nvSpPr>
+        <p:spPr/>
+        <p:txBody>
+          <a:bodyPr/>
+          <a:lstStyle/>
+          <a:p>
+            <a:pPr>
+              <a:defRPr/>
+            </a:pPr>
+            <a:fld id="{8B2AE985-CEB1-47DB-AC87-FA613AA66B3B}" type="slidenum">
+              <a:rPr lang="en-US" smtClean="0"/>
+              <a:pPr>
+                <a:defRPr/>
+              </a:pPr>
+              <a:t>49</a:t>
+            </a:fld>
+            <a:endParaRPr lang="en-US" dirty="0"/>
+          </a:p>
+        </p:txBody>
+      </p:sp>
+    </p:spTree>
+  </p:cSld>
+  <p:clrMapOvr>
+    <a:masterClrMapping/>
+  </p:clrMapOvr>
+</p:notes>
+</file>
+
+<file path=ppt/notesSlides/notesSlide5.xml><?xml version="1.0" encoding="utf-8"?>
 <p:notes xmlns:a="http://schemas.openxmlformats.org/drawingml/2006/main" xmlns:r="http://schemas.openxmlformats.org/officeDocument/2006/relationships" xmlns:p="http://schemas.openxmlformats.org/presentationml/2006/main">
   <p:cSld>
     <p:spTree>
@@ -1003,7 +4699,7 @@
 </p:notes>
 </file>
 
-<file path=ppt/notesSlides/notesSlide4.xml><?xml version="1.0" encoding="utf-8"?>
+<file path=ppt/notesSlides/notesSlide6.xml><?xml version="1.0" encoding="utf-8"?>
 <p:notes xmlns:a="http://schemas.openxmlformats.org/drawingml/2006/main" xmlns:r="http://schemas.openxmlformats.org/officeDocument/2006/relationships" xmlns:p="http://schemas.openxmlformats.org/presentationml/2006/main">
   <p:cSld>
     <p:spTree>
@@ -1136,7 +4832,7 @@
 </p:notes>
 </file>
 
-<file path=ppt/notesSlides/notesSlide5.xml><?xml version="1.0" encoding="utf-8"?>
+<file path=ppt/notesSlides/notesSlide7.xml><?xml version="1.0" encoding="utf-8"?>
 <p:notes xmlns:a="http://schemas.openxmlformats.org/drawingml/2006/main" xmlns:r="http://schemas.openxmlformats.org/officeDocument/2006/relationships" xmlns:p="http://schemas.openxmlformats.org/presentationml/2006/main">
   <p:cSld>
     <p:spTree>
@@ -1238,7 +4934,7 @@
 </p:notes>
 </file>
 
-<file path=ppt/notesSlides/notesSlide6.xml><?xml version="1.0" encoding="utf-8"?>
+<file path=ppt/notesSlides/notesSlide8.xml><?xml version="1.0" encoding="utf-8"?>
 <p:notes xmlns:a="http://schemas.openxmlformats.org/drawingml/2006/main" xmlns:r="http://schemas.openxmlformats.org/officeDocument/2006/relationships" xmlns:p="http://schemas.openxmlformats.org/presentationml/2006/main">
   <p:cSld>
     <p:spTree>
@@ -1340,7 +5036,7 @@
 </p:notes>
 </file>
 
-<file path=ppt/notesSlides/notesSlide7.xml><?xml version="1.0" encoding="utf-8"?>
+<file path=ppt/notesSlides/notesSlide9.xml><?xml version="1.0" encoding="utf-8"?>
 <p:notes xmlns:a="http://schemas.openxmlformats.org/drawingml/2006/main" xmlns:r="http://schemas.openxmlformats.org/officeDocument/2006/relationships" xmlns:p="http://schemas.openxmlformats.org/presentationml/2006/main">
   <p:cSld>
     <p:spTree>
@@ -1431,135 +5127,6 @@
               <a:t>9</a:t>
             </a:fld>
             <a:endParaRPr lang="en-US" dirty="0" smtClean="0"/>
-          </a:p>
-        </p:txBody>
-      </p:sp>
-    </p:spTree>
-  </p:cSld>
-  <p:clrMapOvr>
-    <a:masterClrMapping/>
-  </p:clrMapOvr>
-</p:notes>
-</file>
-
-<file path=ppt/notesSlides/notesSlide8.xml><?xml version="1.0" encoding="utf-8"?>
-<p:notes xmlns:a="http://schemas.openxmlformats.org/drawingml/2006/main" xmlns:r="http://schemas.openxmlformats.org/officeDocument/2006/relationships" xmlns:p="http://schemas.openxmlformats.org/presentationml/2006/main">
-  <p:cSld>
-    <p:spTree>
-      <p:nvGrpSpPr>
-        <p:cNvPr id="1" name=""/>
-        <p:cNvGrpSpPr/>
-        <p:nvPr/>
-      </p:nvGrpSpPr>
-      <p:grpSpPr>
-        <a:xfrm>
-          <a:off x="0" y="0"/>
-          <a:ext cx="0" cy="0"/>
-          <a:chOff x="0" y="0"/>
-          <a:chExt cx="0" cy="0"/>
-        </a:xfrm>
-      </p:grpSpPr>
-      <p:sp>
-        <p:nvSpPr>
-          <p:cNvPr id="55298" name="Rectangle 7"/>
-          <p:cNvSpPr>
-            <a:spLocks noGrp="1" noChangeArrowheads="1"/>
-          </p:cNvSpPr>
-          <p:nvPr>
-            <p:ph type="sldNum" sz="quarter" idx="5"/>
-          </p:nvPr>
-        </p:nvSpPr>
-        <p:spPr bwMode="auto">
-          <a:noFill/>
-          <a:ln>
-            <a:miter lim="800000"/>
-            <a:headEnd/>
-            <a:tailEnd/>
-          </a:ln>
-        </p:spPr>
-        <p:txBody>
-          <a:bodyPr wrap="square" numCol="1" anchorCtr="0" compatLnSpc="1">
-            <a:prstTxWarp prst="textNoShape">
-              <a:avLst/>
-            </a:prstTxWarp>
-          </a:bodyPr>
-          <a:lstStyle/>
-          <a:p>
-            <a:pPr fontAlgn="base">
-              <a:spcBef>
-                <a:spcPct val="0"/>
-              </a:spcBef>
-              <a:spcAft>
-                <a:spcPct val="0"/>
-              </a:spcAft>
-            </a:pPr>
-            <a:fld id="{7185C480-A9AC-4091-9762-70B9D1AADA10}" type="slidenum">
-              <a:rPr lang="en-US" smtClean="0">
-                <a:latin typeface="Arial" charset="0"/>
-              </a:rPr>
-              <a:pPr fontAlgn="base">
-                <a:spcBef>
-                  <a:spcPct val="0"/>
-                </a:spcBef>
-                <a:spcAft>
-                  <a:spcPct val="0"/>
-                </a:spcAft>
-              </a:pPr>
-              <a:t>11</a:t>
-            </a:fld>
-            <a:endParaRPr lang="en-US" dirty="0" smtClean="0">
-              <a:latin typeface="Arial" charset="0"/>
-            </a:endParaRPr>
-          </a:p>
-        </p:txBody>
-      </p:sp>
-      <p:sp>
-        <p:nvSpPr>
-          <p:cNvPr id="55299" name="Rectangle 2"/>
-          <p:cNvSpPr>
-            <a:spLocks noGrp="1" noRot="1" noChangeAspect="1" noChangeArrowheads="1" noTextEdit="1"/>
-          </p:cNvSpPr>
-          <p:nvPr>
-            <p:ph type="sldImg"/>
-          </p:nvPr>
-        </p:nvSpPr>
-        <p:spPr bwMode="auto">
-          <a:noFill/>
-          <a:ln>
-            <a:solidFill>
-              <a:srgbClr val="000000"/>
-            </a:solidFill>
-            <a:miter lim="800000"/>
-            <a:headEnd/>
-            <a:tailEnd/>
-          </a:ln>
-        </p:spPr>
-      </p:sp>
-      <p:sp>
-        <p:nvSpPr>
-          <p:cNvPr id="55300" name="Rectangle 3"/>
-          <p:cNvSpPr>
-            <a:spLocks noGrp="1" noChangeArrowheads="1"/>
-          </p:cNvSpPr>
-          <p:nvPr>
-            <p:ph type="body" idx="1"/>
-          </p:nvPr>
-        </p:nvSpPr>
-        <p:spPr bwMode="auto">
-          <a:noFill/>
-        </p:spPr>
-        <p:txBody>
-          <a:bodyPr wrap="square" numCol="1" anchor="t" anchorCtr="0" compatLnSpc="1">
-            <a:prstTxWarp prst="textNoShape">
-              <a:avLst/>
-            </a:prstTxWarp>
-          </a:bodyPr>
-          <a:lstStyle/>
-          <a:p>
-            <a:pPr eaLnBrk="1" hangingPunct="1"/>
-            <a:endParaRPr lang="en-US" dirty="0" smtClean="0">
-              <a:latin typeface="Arial" charset="0"/>
-            </a:endParaRPr>
           </a:p>
         </p:txBody>
       </p:sp>
@@ -2879,7 +6446,7 @@
         </p:xfrm>
         <a:graphic>
           <a:graphicData uri="http://schemas.openxmlformats.org/presentationml/2006/ole">
-            <p:oleObj spid="_x0000_s3074" name="Visio" r:id="rId5" imgW="6287074" imgH="6712626" progId="Visio.Drawing.11">
+            <p:oleObj spid="_x0000_s3074" name="Visio" r:id="rId5" imgW="6287074" imgH="6712626" progId="">
               <p:embed/>
             </p:oleObj>
           </a:graphicData>
@@ -2934,7 +6501,7 @@
         </p:xfrm>
         <a:graphic>
           <a:graphicData uri="http://schemas.openxmlformats.org/presentationml/2006/ole">
-            <p:oleObj spid="_x0000_s76801" name="Visio" r:id="rId3" imgW="6287074" imgH="6712626" progId="Visio.Drawing.11">
+            <p:oleObj spid="_x0000_s76801" name="Visio" r:id="rId4" imgW="6287074" imgH="6712626" progId="">
               <p:embed/>
             </p:oleObj>
           </a:graphicData>
@@ -7219,7 +10786,7 @@
           <p:nvPr/>
         </p:nvPicPr>
         <p:blipFill>
-          <a:blip r:embed="rId2" cstate="print"/>
+          <a:blip r:embed="rId3" cstate="print"/>
           <a:srcRect/>
           <a:stretch>
             <a:fillRect/>
@@ -16480,7 +20047,7 @@
         </p:xfrm>
         <a:graphic>
           <a:graphicData uri="http://schemas.openxmlformats.org/presentationml/2006/ole">
-            <p:oleObj spid="_x0000_s4098" name="Visio" r:id="rId3" imgW="5521247" imgH="2273570" progId="Visio.Drawing.11">
+            <p:oleObj spid="_x0000_s4098" name="Visio" r:id="rId4" imgW="5521247" imgH="2273570" progId="">
               <p:embed/>
             </p:oleObj>
           </a:graphicData>
@@ -17178,7 +20745,7 @@
         </p:xfrm>
         <a:graphic>
           <a:graphicData uri="http://schemas.openxmlformats.org/presentationml/2006/ole">
-            <p:oleObj spid="_x0000_s5123" name="Visio" r:id="rId3" imgW="5521247" imgH="2273570" progId="Visio.Drawing.11">
+            <p:oleObj spid="_x0000_s136194" name="Visio" r:id="rId4" imgW="5521264" imgH="2273528" progId="">
               <p:embed/>
             </p:oleObj>
           </a:graphicData>
@@ -17874,7 +21441,7 @@
         </p:xfrm>
         <a:graphic>
           <a:graphicData uri="http://schemas.openxmlformats.org/presentationml/2006/ole">
-            <p:oleObj spid="_x0000_s6147" name="Visio" r:id="rId3" imgW="5521247" imgH="2273570" progId="Visio.Drawing.11">
+            <p:oleObj spid="_x0000_s6147" name="Visio" r:id="rId4" imgW="5521247" imgH="2273570" progId="">
               <p:embed/>
             </p:oleObj>
           </a:graphicData>
@@ -18677,7 +22244,7 @@
         </p:xfrm>
         <a:graphic>
           <a:graphicData uri="http://schemas.openxmlformats.org/presentationml/2006/ole">
-            <p:oleObj spid="_x0000_s7170" name="Visio" r:id="rId3" imgW="5521196" imgH="2273588" progId="Visio.Drawing.11">
+            <p:oleObj spid="_x0000_s7170" name="Visio" r:id="rId4" imgW="5521196" imgH="2273588" progId="">
               <p:embed/>
             </p:oleObj>
           </a:graphicData>
@@ -44293,7 +47860,7 @@
         </p:xfrm>
         <a:graphic>
           <a:graphicData uri="http://schemas.openxmlformats.org/presentationml/2006/ole">
-            <p:oleObj spid="_x0000_s8194" name="Visio" r:id="rId3" imgW="5521247" imgH="2273570" progId="Visio.Drawing.11">
+            <p:oleObj spid="_x0000_s8194" name="Visio" r:id="rId4" imgW="5521247" imgH="2273570" progId="">
               <p:embed/>
             </p:oleObj>
           </a:graphicData>
@@ -45091,7 +48658,7 @@
             </a:pPr>
             <a:r>
               <a:rPr lang="en-US" sz="1400" dirty="0" smtClean="0">
-                <a:hlinkClick r:id="rId2" action="ppaction://hlinkfile"/>
+                <a:hlinkClick r:id="rId3" action="ppaction://hlinkfile"/>
               </a:rPr>
               <a:t>hyplnkRet_e</a:t>
             </a:r>
@@ -45101,7 +48668,7 @@
             </a:r>
             <a:r>
               <a:rPr lang="en-US" sz="1400" dirty="0" smtClean="0">
-                <a:hlinkClick r:id="rId3" action="ppaction://hlinkfile"/>
+                <a:hlinkClick r:id="rId4" action="ppaction://hlinkfile"/>
               </a:rPr>
               <a:t>Hyplnk_open</a:t>
             </a:r>
@@ -45111,7 +48678,7 @@
             </a:r>
             <a:r>
               <a:rPr lang="en-US" sz="1400" dirty="0" smtClean="0">
-                <a:hlinkClick r:id="rId4" action="ppaction://hlinkfile"/>
+                <a:hlinkClick r:id="rId5" action="ppaction://hlinkfile"/>
               </a:rPr>
               <a:t>Hyplnk_Handle</a:t>
             </a:r>
@@ -45144,7 +48711,7 @@
             </a:pPr>
             <a:r>
               <a:rPr lang="en-US" sz="1400" dirty="0" smtClean="0">
-                <a:hlinkClick r:id="rId2" action="ppaction://hlinkfile"/>
+                <a:hlinkClick r:id="rId3" action="ppaction://hlinkfile"/>
               </a:rPr>
               <a:t>hyplnkRet_e</a:t>
             </a:r>
@@ -45154,7 +48721,7 @@
             </a:r>
             <a:r>
               <a:rPr lang="en-US" sz="1400" dirty="0" smtClean="0">
-                <a:hlinkClick r:id="rId3" action="ppaction://hlinkfile"/>
+                <a:hlinkClick r:id="rId4" action="ppaction://hlinkfile"/>
               </a:rPr>
               <a:t>Hyplnk_close</a:t>
             </a:r>
@@ -45164,7 +48731,7 @@
             </a:r>
             <a:r>
               <a:rPr lang="en-US" sz="1400" dirty="0" smtClean="0">
-                <a:hlinkClick r:id="rId4" action="ppaction://hlinkfile"/>
+                <a:hlinkClick r:id="rId5" action="ppaction://hlinkfile"/>
               </a:rPr>
               <a:t>Hyplnk_Handle</a:t>
             </a:r>
@@ -45197,7 +48764,7 @@
             </a:pPr>
             <a:r>
               <a:rPr lang="en-US" sz="1400" dirty="0" smtClean="0">
-                <a:hlinkClick r:id="rId2" action="ppaction://hlinkfile"/>
+                <a:hlinkClick r:id="rId3" action="ppaction://hlinkfile"/>
               </a:rPr>
               <a:t>hyplnkRet_e</a:t>
             </a:r>
@@ -45207,7 +48774,7 @@
             </a:r>
             <a:r>
               <a:rPr lang="en-US" sz="1400" dirty="0" smtClean="0">
-                <a:hlinkClick r:id="rId3" action="ppaction://hlinkfile"/>
+                <a:hlinkClick r:id="rId4" action="ppaction://hlinkfile"/>
               </a:rPr>
               <a:t>Hyplnk_readRegs</a:t>
             </a:r>
@@ -45217,7 +48784,7 @@
             </a:r>
             <a:r>
               <a:rPr lang="en-US" sz="1400" dirty="0" smtClean="0">
-                <a:hlinkClick r:id="rId4" action="ppaction://hlinkfile"/>
+                <a:hlinkClick r:id="rId5" action="ppaction://hlinkfile"/>
               </a:rPr>
               <a:t>Hyplnk_Handle</a:t>
             </a:r>
@@ -45227,7 +48794,7 @@
             </a:r>
             <a:r>
               <a:rPr lang="en-US" sz="1400" dirty="0" smtClean="0">
-                <a:hlinkClick r:id="rId5" action="ppaction://hlinkfile"/>
+                <a:hlinkClick r:id="rId6" action="ppaction://hlinkfile"/>
               </a:rPr>
               <a:t>hyplnkLocation_e</a:t>
             </a:r>
@@ -45237,7 +48804,7 @@
             </a:r>
             <a:r>
               <a:rPr lang="en-US" sz="1400" dirty="0" smtClean="0">
-                <a:hlinkClick r:id="rId6" action="ppaction://hlinkfile"/>
+                <a:hlinkClick r:id="rId7" action="ppaction://hlinkfile"/>
               </a:rPr>
               <a:t>hyplnkRegisters_t</a:t>
             </a:r>
@@ -45262,7 +48829,7 @@
               <a:defRPr/>
             </a:pPr>
             <a:endParaRPr lang="en-US" sz="1400" dirty="0" smtClean="0">
-              <a:hlinkClick r:id="rId2" action="ppaction://hlinkfile"/>
+              <a:hlinkClick r:id="rId3" action="ppaction://hlinkfile"/>
             </a:endParaRPr>
           </a:p>
           <a:p>
@@ -45272,7 +48839,7 @@
             </a:pPr>
             <a:r>
               <a:rPr lang="en-US" sz="1400" dirty="0" smtClean="0">
-                <a:hlinkClick r:id="rId2" action="ppaction://hlinkfile"/>
+                <a:hlinkClick r:id="rId3" action="ppaction://hlinkfile"/>
               </a:rPr>
               <a:t>hyplnkRet_e</a:t>
             </a:r>
@@ -45282,7 +48849,7 @@
             </a:r>
             <a:r>
               <a:rPr lang="en-US" sz="1400" dirty="0" smtClean="0">
-                <a:hlinkClick r:id="rId3" action="ppaction://hlinkfile"/>
+                <a:hlinkClick r:id="rId4" action="ppaction://hlinkfile"/>
               </a:rPr>
               <a:t>Hyplnk_writeRegs</a:t>
             </a:r>
@@ -45292,7 +48859,7 @@
             </a:r>
             <a:r>
               <a:rPr lang="en-US" sz="1400" dirty="0" smtClean="0">
-                <a:hlinkClick r:id="rId4" action="ppaction://hlinkfile"/>
+                <a:hlinkClick r:id="rId5" action="ppaction://hlinkfile"/>
               </a:rPr>
               <a:t>Hyplnk_Handle</a:t>
             </a:r>
@@ -45302,7 +48869,7 @@
             </a:r>
             <a:r>
               <a:rPr lang="en-US" sz="1400" dirty="0" smtClean="0">
-                <a:hlinkClick r:id="rId5" action="ppaction://hlinkfile"/>
+                <a:hlinkClick r:id="rId6" action="ppaction://hlinkfile"/>
               </a:rPr>
               <a:t>hyplnkLocation_e</a:t>
             </a:r>
@@ -45312,7 +48879,7 @@
             </a:r>
             <a:r>
               <a:rPr lang="en-US" sz="1400" dirty="0" smtClean="0">
-                <a:hlinkClick r:id="rId6" action="ppaction://hlinkfile"/>
+                <a:hlinkClick r:id="rId7" action="ppaction://hlinkfile"/>
               </a:rPr>
               <a:t>hyplnkRegisters_t</a:t>
             </a:r>
@@ -45337,7 +48904,7 @@
               <a:defRPr/>
             </a:pPr>
             <a:endParaRPr lang="en-US" sz="1400" dirty="0" smtClean="0">
-              <a:hlinkClick r:id="rId2" action="ppaction://hlinkfile"/>
+              <a:hlinkClick r:id="rId3" action="ppaction://hlinkfile"/>
             </a:endParaRPr>
           </a:p>
           <a:p>
@@ -45347,7 +48914,7 @@
             </a:pPr>
             <a:r>
               <a:rPr lang="en-US" sz="1400" dirty="0" smtClean="0">
-                <a:hlinkClick r:id="rId2" action="ppaction://hlinkfile"/>
+                <a:hlinkClick r:id="rId3" action="ppaction://hlinkfile"/>
               </a:rPr>
               <a:t>hyplnkRet_e</a:t>
             </a:r>
@@ -45357,7 +48924,7 @@
             </a:r>
             <a:r>
               <a:rPr lang="en-US" sz="1400" dirty="0" smtClean="0">
-                <a:hlinkClick r:id="rId3" action="ppaction://hlinkfile"/>
+                <a:hlinkClick r:id="rId4" action="ppaction://hlinkfile"/>
               </a:rPr>
               <a:t>Hyplnk_getWindow</a:t>
             </a:r>
@@ -45367,7 +48934,7 @@
             </a:r>
             <a:r>
               <a:rPr lang="en-US" sz="1400" dirty="0" smtClean="0">
-                <a:hlinkClick r:id="rId4" action="ppaction://hlinkfile"/>
+                <a:hlinkClick r:id="rId5" action="ppaction://hlinkfile"/>
               </a:rPr>
               <a:t>Hyplnk_Handle</a:t>
             </a:r>
@@ -45404,7 +48971,7 @@
             </a:r>
             <a:r>
               <a:rPr lang="en-US" sz="1400" dirty="0" smtClean="0">
-                <a:hlinkClick r:id="rId3" action="ppaction://hlinkfile"/>
+                <a:hlinkClick r:id="rId4" action="ppaction://hlinkfile"/>
               </a:rPr>
               <a:t>Hyplnk_getVersion</a:t>
             </a:r>
@@ -45441,7 +49008,7 @@
             </a:r>
             <a:r>
               <a:rPr lang="en-US" sz="1400" dirty="0" smtClean="0">
-                <a:hlinkClick r:id="rId3" action="ppaction://hlinkfile"/>
+                <a:hlinkClick r:id="rId4" action="ppaction://hlinkfile"/>
               </a:rPr>
               <a:t>Hyplnk_getVersionStr</a:t>
             </a:r>
@@ -46671,7 +50238,7 @@
             </a:br>
             <a:r>
               <a:rPr lang="en-US" dirty="0" smtClean="0">
-                <a:hlinkClick r:id="rId2"/>
+                <a:hlinkClick r:id="rId3"/>
               </a:rPr>
               <a:t>http://www.ti.com/lit/SPRUGW8</a:t>
             </a:r>
@@ -46687,7 +50254,7 @@
             </a:br>
             <a:r>
               <a:rPr lang="en-US" dirty="0" smtClean="0">
-                <a:hlinkClick r:id="rId3"/>
+                <a:hlinkClick r:id="rId4"/>
               </a:rPr>
               <a:t>TI E2E Community</a:t>
             </a:r>
@@ -46772,7 +50339,7 @@
         </p:xfrm>
         <a:graphic>
           <a:graphicData uri="http://schemas.openxmlformats.org/presentationml/2006/ole">
-            <p:oleObj spid="_x0000_s1026" name="Visio" r:id="rId5" imgW="4661282" imgH="5207504" progId="Visio.Drawing.11">
+            <p:oleObj spid="_x0000_s1026" name="Visio" r:id="rId5" imgW="4661282" imgH="5207504" progId="">
               <p:embed/>
             </p:oleObj>
           </a:graphicData>
@@ -48152,7 +51719,7 @@
         </p:xfrm>
         <a:graphic>
           <a:graphicData uri="http://schemas.openxmlformats.org/presentationml/2006/ole">
-            <p:oleObj spid="_x0000_s2050" name="Visio" r:id="rId5" imgW="5254626" imgH="1834745" progId="Visio.Drawing.11">
+            <p:oleObj spid="_x0000_s2050" name="Visio" r:id="rId5" imgW="5254626" imgH="1834745" progId="">
               <p:embed/>
             </p:oleObj>
           </a:graphicData>
@@ -48444,7 +52011,7 @@
         </p:xfrm>
         <a:graphic>
           <a:graphicData uri="http://schemas.openxmlformats.org/presentationml/2006/ole">
-            <p:oleObj spid="_x0000_s50179" name="Visio" r:id="rId5" imgW="5254626" imgH="1834745" progId="Visio.Drawing.11">
+            <p:oleObj spid="_x0000_s50179" name="Visio" r:id="rId5" imgW="5254626" imgH="1834745" progId="">
               <p:embed/>
             </p:oleObj>
           </a:graphicData>

</xml_diff>

<commit_message>
Updates for Montreal Training
</commit_message>
<xml_diff>
--- a/slides/Intro to Hyperlink.pptx
+++ b/slides/Intro to Hyperlink.pptx
@@ -296,7 +296,7 @@
               <a:pPr>
                 <a:defRPr/>
               </a:pPr>
-              <a:t>5/15/2012</a:t>
+              <a:t>5/9/2012</a:t>
             </a:fld>
             <a:endParaRPr lang="en-US" dirty="0"/>
           </a:p>
@@ -6554,6 +6554,7 @@
               <a:rPr lang="en-US" sz="3600" b="0" dirty="0" smtClean="0"/>
               <a:t>HyperLink Interrupts Features</a:t>
             </a:r>
+            <a:endParaRPr lang="en-US" sz="3600" b="0" dirty="0" smtClean="0"/>
           </a:p>
         </p:txBody>
       </p:sp>
@@ -6589,17 +6590,8 @@
               <a:rPr lang="en-US" sz="2400" dirty="0" smtClean="0">
                 <a:latin typeface="+mj-lt"/>
               </a:rPr>
-              <a:t>Detection  - detected an interrupt to the HyperLink local device that was generated either as software interrupt (writing to interrupt register) or </a:t>
-            </a:r>
-            <a:r>
-              <a:rPr lang="en-US" sz="2400" smtClean="0">
-                <a:latin typeface="+mj-lt"/>
-              </a:rPr>
-              <a:t>as hardware </a:t>
-            </a:r>
-            <a:endParaRPr lang="en-US" sz="2400" dirty="0" smtClean="0">
-              <a:latin typeface="+mj-lt"/>
-            </a:endParaRPr>
+              <a:t>Detection  - detected an interrupt to the HyperLink local device that was generated either as software interrupt (writing to interrupt register) or as hardware </a:t>
+            </a:r>
           </a:p>
           <a:p>
             <a:pPr marL="514350" indent="-514350" eaLnBrk="1" fontAlgn="auto" hangingPunct="1">
@@ -6642,6 +6634,9 @@
               </a:rPr>
               <a:t>Generating – generate an interrupt in the local device</a:t>
             </a:r>
+            <a:endParaRPr lang="en-US" sz="2400" dirty="0" smtClean="0">
+              <a:latin typeface="+mj-lt"/>
+            </a:endParaRPr>
           </a:p>
           <a:p>
             <a:pPr marL="514350" indent="-514350" eaLnBrk="1" fontAlgn="auto" hangingPunct="1">

</xml_diff>